<commit_message>
Nueva versión de la tesis
</commit_message>
<xml_diff>
--- a/Estimación ciega de parámetros acústicos de un recinto - Ortiz.pptx
+++ b/Estimación ciega de parámetros acústicos de un recinto - Ortiz.pptx
@@ -5,24 +5,28 @@
     <p:sldMasterId id="2147483660" r:id="rId1"/>
   </p:sldMasterIdLst>
   <p:notesMasterIdLst>
-    <p:notesMasterId r:id="rId17"/>
+    <p:notesMasterId r:id="rId18"/>
   </p:notesMasterIdLst>
+  <p:handoutMasterIdLst>
+    <p:handoutMasterId r:id="rId19"/>
+  </p:handoutMasterIdLst>
   <p:sldIdLst>
     <p:sldId id="256" r:id="rId2"/>
     <p:sldId id="257" r:id="rId3"/>
-    <p:sldId id="259" r:id="rId4"/>
-    <p:sldId id="260" r:id="rId5"/>
-    <p:sldId id="261" r:id="rId6"/>
-    <p:sldId id="263" r:id="rId7"/>
-    <p:sldId id="264" r:id="rId8"/>
-    <p:sldId id="265" r:id="rId9"/>
-    <p:sldId id="267" r:id="rId10"/>
-    <p:sldId id="270" r:id="rId11"/>
-    <p:sldId id="271" r:id="rId12"/>
-    <p:sldId id="273" r:id="rId13"/>
-    <p:sldId id="268" r:id="rId14"/>
-    <p:sldId id="269" r:id="rId15"/>
-    <p:sldId id="266" r:id="rId16"/>
+    <p:sldId id="274" r:id="rId4"/>
+    <p:sldId id="259" r:id="rId5"/>
+    <p:sldId id="260" r:id="rId6"/>
+    <p:sldId id="261" r:id="rId7"/>
+    <p:sldId id="263" r:id="rId8"/>
+    <p:sldId id="264" r:id="rId9"/>
+    <p:sldId id="265" r:id="rId10"/>
+    <p:sldId id="267" r:id="rId11"/>
+    <p:sldId id="270" r:id="rId12"/>
+    <p:sldId id="271" r:id="rId13"/>
+    <p:sldId id="273" r:id="rId14"/>
+    <p:sldId id="268" r:id="rId15"/>
+    <p:sldId id="269" r:id="rId16"/>
+    <p:sldId id="266" r:id="rId17"/>
   </p:sldIdLst>
   <p:sldSz cx="9144000" cy="6858000" type="screen4x3"/>
   <p:notesSz cx="6858000" cy="9144000"/>
@@ -128,6 +132,7 @@
           <p14:sldIdLst>
             <p14:sldId id="256"/>
             <p14:sldId id="257"/>
+            <p14:sldId id="274"/>
             <p14:sldId id="259"/>
             <p14:sldId id="260"/>
             <p14:sldId id="261"/>
@@ -166,13 +171,583 @@
 <file path=ppt/revisionInfo.xml><?xml version="1.0" encoding="utf-8"?>
 <p1510:revInfo xmlns:a="http://schemas.openxmlformats.org/drawingml/2006/main" xmlns:r="http://schemas.openxmlformats.org/officeDocument/2006/relationships" xmlns:p1510="http://schemas.microsoft.com/office/powerpoint/2015/10/main">
   <p1510:revLst>
-    <p1510:client id="{9A9A14B1-9CA3-4CAE-AAC0-1E3A12D8E9A1}" v="76" dt="2022-06-27T13:59:55.675"/>
+    <p1510:client id="{55350F6E-B157-4641-AF2D-93DAFF1F0CF2}" v="21" dt="2023-06-14T20:24:45.609"/>
   </p1510:revLst>
 </p1510:revInfo>
 </file>
 
 <file path=ppt/changesInfos/changesInfo1.xml><?xml version="1.0" encoding="utf-8"?>
 <pc:chgInfo xmlns:a="http://schemas.openxmlformats.org/drawingml/2006/main" xmlns:r="http://schemas.openxmlformats.org/officeDocument/2006/relationships" xmlns:ac="http://schemas.microsoft.com/office/drawing/2013/main/command" xmlns:pc="http://schemas.microsoft.com/office/powerpoint/2013/main/command">
+  <pc:docChgLst>
+    <pc:chgData name="Maximiliano Ortiz" userId="90727fd8e92db46b" providerId="LiveId" clId="{55350F6E-B157-4641-AF2D-93DAFF1F0CF2}"/>
+    <pc:docChg chg="undo custSel addSld modSld modSection">
+      <pc:chgData name="Maximiliano Ortiz" userId="90727fd8e92db46b" providerId="LiveId" clId="{55350F6E-B157-4641-AF2D-93DAFF1F0CF2}" dt="2023-06-14T20:24:57.435" v="202" actId="14100"/>
+      <pc:docMkLst>
+        <pc:docMk/>
+      </pc:docMkLst>
+      <pc:sldChg chg="addSp delSp modSp mod">
+        <pc:chgData name="Maximiliano Ortiz" userId="90727fd8e92db46b" providerId="LiveId" clId="{55350F6E-B157-4641-AF2D-93DAFF1F0CF2}" dt="2023-06-14T18:37:56.709" v="120"/>
+        <pc:sldMkLst>
+          <pc:docMk/>
+          <pc:sldMk cId="2798663380" sldId="257"/>
+        </pc:sldMkLst>
+        <pc:spChg chg="add mod">
+          <ac:chgData name="Maximiliano Ortiz" userId="90727fd8e92db46b" providerId="LiveId" clId="{55350F6E-B157-4641-AF2D-93DAFF1F0CF2}" dt="2023-06-14T18:37:56.709" v="120"/>
+          <ac:spMkLst>
+            <pc:docMk/>
+            <pc:sldMk cId="2798663380" sldId="257"/>
+            <ac:spMk id="3" creationId="{F5A41ECF-230C-209F-3DA2-B83AD66E1F0C}"/>
+          </ac:spMkLst>
+        </pc:spChg>
+        <pc:spChg chg="add mod">
+          <ac:chgData name="Maximiliano Ortiz" userId="90727fd8e92db46b" providerId="LiveId" clId="{55350F6E-B157-4641-AF2D-93DAFF1F0CF2}" dt="2023-06-14T18:37:56.709" v="120"/>
+          <ac:spMkLst>
+            <pc:docMk/>
+            <pc:sldMk cId="2798663380" sldId="257"/>
+            <ac:spMk id="4" creationId="{8CFAC941-47A7-BF96-4382-4004824ECE4F}"/>
+          </ac:spMkLst>
+        </pc:spChg>
+        <pc:spChg chg="del mod">
+          <ac:chgData name="Maximiliano Ortiz" userId="90727fd8e92db46b" providerId="LiveId" clId="{55350F6E-B157-4641-AF2D-93DAFF1F0CF2}" dt="2023-06-14T18:35:14.498" v="42" actId="478"/>
+          <ac:spMkLst>
+            <pc:docMk/>
+            <pc:sldMk cId="2798663380" sldId="257"/>
+            <ac:spMk id="7" creationId="{051E5D3D-6639-2489-AC17-9938F9B994E6}"/>
+          </ac:spMkLst>
+        </pc:spChg>
+        <pc:spChg chg="del mod">
+          <ac:chgData name="Maximiliano Ortiz" userId="90727fd8e92db46b" providerId="LiveId" clId="{55350F6E-B157-4641-AF2D-93DAFF1F0CF2}" dt="2023-06-14T18:35:11.672" v="40" actId="478"/>
+          <ac:spMkLst>
+            <pc:docMk/>
+            <pc:sldMk cId="2798663380" sldId="257"/>
+            <ac:spMk id="9" creationId="{8B99ACB9-3382-59A6-5F8E-7148AF552558}"/>
+          </ac:spMkLst>
+        </pc:spChg>
+      </pc:sldChg>
+      <pc:sldChg chg="addSp delSp modSp mod">
+        <pc:chgData name="Maximiliano Ortiz" userId="90727fd8e92db46b" providerId="LiveId" clId="{55350F6E-B157-4641-AF2D-93DAFF1F0CF2}" dt="2023-06-14T18:38:00.745" v="121"/>
+        <pc:sldMkLst>
+          <pc:docMk/>
+          <pc:sldMk cId="2263933884" sldId="259"/>
+        </pc:sldMkLst>
+        <pc:spChg chg="add mod">
+          <ac:chgData name="Maximiliano Ortiz" userId="90727fd8e92db46b" providerId="LiveId" clId="{55350F6E-B157-4641-AF2D-93DAFF1F0CF2}" dt="2023-06-14T18:38:00.745" v="121"/>
+          <ac:spMkLst>
+            <pc:docMk/>
+            <pc:sldMk cId="2263933884" sldId="259"/>
+            <ac:spMk id="3" creationId="{8F8AD177-5EFD-992B-8766-BA58EEB4C747}"/>
+          </ac:spMkLst>
+        </pc:spChg>
+        <pc:spChg chg="add mod">
+          <ac:chgData name="Maximiliano Ortiz" userId="90727fd8e92db46b" providerId="LiveId" clId="{55350F6E-B157-4641-AF2D-93DAFF1F0CF2}" dt="2023-06-14T18:38:00.745" v="121"/>
+          <ac:spMkLst>
+            <pc:docMk/>
+            <pc:sldMk cId="2263933884" sldId="259"/>
+            <ac:spMk id="5" creationId="{6B27F31F-6887-F216-0B44-558D23210806}"/>
+          </ac:spMkLst>
+        </pc:spChg>
+        <pc:spChg chg="del">
+          <ac:chgData name="Maximiliano Ortiz" userId="90727fd8e92db46b" providerId="LiveId" clId="{55350F6E-B157-4641-AF2D-93DAFF1F0CF2}" dt="2023-06-14T18:35:18.243" v="43" actId="478"/>
+          <ac:spMkLst>
+            <pc:docMk/>
+            <pc:sldMk cId="2263933884" sldId="259"/>
+            <ac:spMk id="15" creationId="{F95FB158-6BB6-DF5F-3B3C-18B73D1EAE17}"/>
+          </ac:spMkLst>
+        </pc:spChg>
+        <pc:spChg chg="del">
+          <ac:chgData name="Maximiliano Ortiz" userId="90727fd8e92db46b" providerId="LiveId" clId="{55350F6E-B157-4641-AF2D-93DAFF1F0CF2}" dt="2023-06-14T18:35:19.778" v="44" actId="478"/>
+          <ac:spMkLst>
+            <pc:docMk/>
+            <pc:sldMk cId="2263933884" sldId="259"/>
+            <ac:spMk id="20" creationId="{F59E356E-FAC8-BD0A-E141-4512CAE7BF12}"/>
+          </ac:spMkLst>
+        </pc:spChg>
+      </pc:sldChg>
+      <pc:sldChg chg="addSp delSp modSp mod modNotes">
+        <pc:chgData name="Maximiliano Ortiz" userId="90727fd8e92db46b" providerId="LiveId" clId="{55350F6E-B157-4641-AF2D-93DAFF1F0CF2}" dt="2023-06-14T18:38:07.992" v="122"/>
+        <pc:sldMkLst>
+          <pc:docMk/>
+          <pc:sldMk cId="598161685" sldId="260"/>
+        </pc:sldMkLst>
+        <pc:spChg chg="add mod">
+          <ac:chgData name="Maximiliano Ortiz" userId="90727fd8e92db46b" providerId="LiveId" clId="{55350F6E-B157-4641-AF2D-93DAFF1F0CF2}" dt="2023-06-14T18:38:07.992" v="122"/>
+          <ac:spMkLst>
+            <pc:docMk/>
+            <pc:sldMk cId="598161685" sldId="260"/>
+            <ac:spMk id="3" creationId="{7DB21898-0A8F-CC20-5C02-105E7FCCD5A6}"/>
+          </ac:spMkLst>
+        </pc:spChg>
+        <pc:spChg chg="add mod">
+          <ac:chgData name="Maximiliano Ortiz" userId="90727fd8e92db46b" providerId="LiveId" clId="{55350F6E-B157-4641-AF2D-93DAFF1F0CF2}" dt="2023-06-14T18:38:07.992" v="122"/>
+          <ac:spMkLst>
+            <pc:docMk/>
+            <pc:sldMk cId="598161685" sldId="260"/>
+            <ac:spMk id="5" creationId="{F8B65A9B-709B-E2C9-13E0-5E1C822F32B2}"/>
+          </ac:spMkLst>
+        </pc:spChg>
+        <pc:spChg chg="del">
+          <ac:chgData name="Maximiliano Ortiz" userId="90727fd8e92db46b" providerId="LiveId" clId="{55350F6E-B157-4641-AF2D-93DAFF1F0CF2}" dt="2023-06-14T18:35:24.156" v="46" actId="478"/>
+          <ac:spMkLst>
+            <pc:docMk/>
+            <pc:sldMk cId="598161685" sldId="260"/>
+            <ac:spMk id="8" creationId="{70951CF3-5C7B-9AFC-0443-8D740B0B3655}"/>
+          </ac:spMkLst>
+        </pc:spChg>
+        <pc:spChg chg="del">
+          <ac:chgData name="Maximiliano Ortiz" userId="90727fd8e92db46b" providerId="LiveId" clId="{55350F6E-B157-4641-AF2D-93DAFF1F0CF2}" dt="2023-06-14T18:35:23.146" v="45" actId="478"/>
+          <ac:spMkLst>
+            <pc:docMk/>
+            <pc:sldMk cId="598161685" sldId="260"/>
+            <ac:spMk id="16" creationId="{D7FAEDE8-0D47-BC3B-E963-F50DD44F6CD3}"/>
+          </ac:spMkLst>
+        </pc:spChg>
+      </pc:sldChg>
+      <pc:sldChg chg="addSp delSp modSp mod modNotes">
+        <pc:chgData name="Maximiliano Ortiz" userId="90727fd8e92db46b" providerId="LiveId" clId="{55350F6E-B157-4641-AF2D-93DAFF1F0CF2}" dt="2023-06-14T18:38:14.022" v="123"/>
+        <pc:sldMkLst>
+          <pc:docMk/>
+          <pc:sldMk cId="169933952" sldId="261"/>
+        </pc:sldMkLst>
+        <pc:spChg chg="add mod">
+          <ac:chgData name="Maximiliano Ortiz" userId="90727fd8e92db46b" providerId="LiveId" clId="{55350F6E-B157-4641-AF2D-93DAFF1F0CF2}" dt="2023-06-14T18:38:14.022" v="123"/>
+          <ac:spMkLst>
+            <pc:docMk/>
+            <pc:sldMk cId="169933952" sldId="261"/>
+            <ac:spMk id="3" creationId="{134DF98A-8BED-AEA4-4371-3D12097987A2}"/>
+          </ac:spMkLst>
+        </pc:spChg>
+        <pc:spChg chg="add mod">
+          <ac:chgData name="Maximiliano Ortiz" userId="90727fd8e92db46b" providerId="LiveId" clId="{55350F6E-B157-4641-AF2D-93DAFF1F0CF2}" dt="2023-06-14T18:38:14.022" v="123"/>
+          <ac:spMkLst>
+            <pc:docMk/>
+            <pc:sldMk cId="169933952" sldId="261"/>
+            <ac:spMk id="4" creationId="{FBEA258F-5D84-F15A-67D9-5DDE44B50D3B}"/>
+          </ac:spMkLst>
+        </pc:spChg>
+        <pc:spChg chg="del">
+          <ac:chgData name="Maximiliano Ortiz" userId="90727fd8e92db46b" providerId="LiveId" clId="{55350F6E-B157-4641-AF2D-93DAFF1F0CF2}" dt="2023-06-14T18:35:28.706" v="47" actId="478"/>
+          <ac:spMkLst>
+            <pc:docMk/>
+            <pc:sldMk cId="169933952" sldId="261"/>
+            <ac:spMk id="8" creationId="{45F71739-7BA5-BC8E-8FDD-68ABE0BA3EA0}"/>
+          </ac:spMkLst>
+        </pc:spChg>
+        <pc:spChg chg="del">
+          <ac:chgData name="Maximiliano Ortiz" userId="90727fd8e92db46b" providerId="LiveId" clId="{55350F6E-B157-4641-AF2D-93DAFF1F0CF2}" dt="2023-06-14T18:35:29.507" v="48" actId="478"/>
+          <ac:spMkLst>
+            <pc:docMk/>
+            <pc:sldMk cId="169933952" sldId="261"/>
+            <ac:spMk id="9" creationId="{1BD7927E-5C50-AC36-2209-35F0904483D7}"/>
+          </ac:spMkLst>
+        </pc:spChg>
+      </pc:sldChg>
+      <pc:sldChg chg="addSp delSp modSp mod modNotes">
+        <pc:chgData name="Maximiliano Ortiz" userId="90727fd8e92db46b" providerId="LiveId" clId="{55350F6E-B157-4641-AF2D-93DAFF1F0CF2}" dt="2023-06-14T18:37:43.418" v="119" actId="1076"/>
+        <pc:sldMkLst>
+          <pc:docMk/>
+          <pc:sldMk cId="2770050518" sldId="263"/>
+        </pc:sldMkLst>
+        <pc:spChg chg="add del mod">
+          <ac:chgData name="Maximiliano Ortiz" userId="90727fd8e92db46b" providerId="LiveId" clId="{55350F6E-B157-4641-AF2D-93DAFF1F0CF2}" dt="2023-06-14T18:37:43.418" v="119" actId="1076"/>
+          <ac:spMkLst>
+            <pc:docMk/>
+            <pc:sldMk cId="2770050518" sldId="263"/>
+            <ac:spMk id="9" creationId="{2765C29A-70AD-780F-9626-8AF547A9F993}"/>
+          </ac:spMkLst>
+        </pc:spChg>
+        <pc:spChg chg="add del mod">
+          <ac:chgData name="Maximiliano Ortiz" userId="90727fd8e92db46b" providerId="LiveId" clId="{55350F6E-B157-4641-AF2D-93DAFF1F0CF2}" dt="2023-06-14T18:37:12.598" v="109" actId="14100"/>
+          <ac:spMkLst>
+            <pc:docMk/>
+            <pc:sldMk cId="2770050518" sldId="263"/>
+            <ac:spMk id="10" creationId="{E356B0F7-0A9C-6630-0C12-0AF43A341E5E}"/>
+          </ac:spMkLst>
+        </pc:spChg>
+      </pc:sldChg>
+      <pc:sldChg chg="addSp delSp modSp mod modNotes">
+        <pc:chgData name="Maximiliano Ortiz" userId="90727fd8e92db46b" providerId="LiveId" clId="{55350F6E-B157-4641-AF2D-93DAFF1F0CF2}" dt="2023-06-14T18:38:23.136" v="126"/>
+        <pc:sldMkLst>
+          <pc:docMk/>
+          <pc:sldMk cId="4200603665" sldId="264"/>
+        </pc:sldMkLst>
+        <pc:spChg chg="add mod">
+          <ac:chgData name="Maximiliano Ortiz" userId="90727fd8e92db46b" providerId="LiveId" clId="{55350F6E-B157-4641-AF2D-93DAFF1F0CF2}" dt="2023-06-14T18:38:23.136" v="126"/>
+          <ac:spMkLst>
+            <pc:docMk/>
+            <pc:sldMk cId="4200603665" sldId="264"/>
+            <ac:spMk id="3" creationId="{AB0FA8D8-86FB-9669-8EDE-3997E2086571}"/>
+          </ac:spMkLst>
+        </pc:spChg>
+        <pc:spChg chg="add mod">
+          <ac:chgData name="Maximiliano Ortiz" userId="90727fd8e92db46b" providerId="LiveId" clId="{55350F6E-B157-4641-AF2D-93DAFF1F0CF2}" dt="2023-06-14T18:38:23.136" v="126"/>
+          <ac:spMkLst>
+            <pc:docMk/>
+            <pc:sldMk cId="4200603665" sldId="264"/>
+            <ac:spMk id="4" creationId="{0AAC7D00-FEEE-BA76-753A-FF2DAFA95A8C}"/>
+          </ac:spMkLst>
+        </pc:spChg>
+        <pc:spChg chg="add del">
+          <ac:chgData name="Maximiliano Ortiz" userId="90727fd8e92db46b" providerId="LiveId" clId="{55350F6E-B157-4641-AF2D-93DAFF1F0CF2}" dt="2023-06-14T18:38:22.555" v="125" actId="478"/>
+          <ac:spMkLst>
+            <pc:docMk/>
+            <pc:sldMk cId="4200603665" sldId="264"/>
+            <ac:spMk id="7" creationId="{E2E48A0F-B76E-9AF8-B47A-DF5188BB551B}"/>
+          </ac:spMkLst>
+        </pc:spChg>
+        <pc:spChg chg="add del">
+          <ac:chgData name="Maximiliano Ortiz" userId="90727fd8e92db46b" providerId="LiveId" clId="{55350F6E-B157-4641-AF2D-93DAFF1F0CF2}" dt="2023-06-14T18:38:20.597" v="124" actId="478"/>
+          <ac:spMkLst>
+            <pc:docMk/>
+            <pc:sldMk cId="4200603665" sldId="264"/>
+            <ac:spMk id="8" creationId="{9DD52BCB-3729-6CE6-34E6-229B4CD7855B}"/>
+          </ac:spMkLst>
+        </pc:spChg>
+      </pc:sldChg>
+      <pc:sldChg chg="addSp delSp modSp mod modNotes">
+        <pc:chgData name="Maximiliano Ortiz" userId="90727fd8e92db46b" providerId="LiveId" clId="{55350F6E-B157-4641-AF2D-93DAFF1F0CF2}" dt="2023-06-14T18:38:31.335" v="129"/>
+        <pc:sldMkLst>
+          <pc:docMk/>
+          <pc:sldMk cId="833963141" sldId="265"/>
+        </pc:sldMkLst>
+        <pc:spChg chg="add mod">
+          <ac:chgData name="Maximiliano Ortiz" userId="90727fd8e92db46b" providerId="LiveId" clId="{55350F6E-B157-4641-AF2D-93DAFF1F0CF2}" dt="2023-06-14T18:38:31.335" v="129"/>
+          <ac:spMkLst>
+            <pc:docMk/>
+            <pc:sldMk cId="833963141" sldId="265"/>
+            <ac:spMk id="3" creationId="{38FAFEF7-5DD7-7444-8C06-551DBFA1D622}"/>
+          </ac:spMkLst>
+        </pc:spChg>
+        <pc:spChg chg="add mod">
+          <ac:chgData name="Maximiliano Ortiz" userId="90727fd8e92db46b" providerId="LiveId" clId="{55350F6E-B157-4641-AF2D-93DAFF1F0CF2}" dt="2023-06-14T18:38:31.335" v="129"/>
+          <ac:spMkLst>
+            <pc:docMk/>
+            <pc:sldMk cId="833963141" sldId="265"/>
+            <ac:spMk id="4" creationId="{EDB496EE-9678-5DD8-78F2-C8B6271FD9F1}"/>
+          </ac:spMkLst>
+        </pc:spChg>
+        <pc:spChg chg="add del">
+          <ac:chgData name="Maximiliano Ortiz" userId="90727fd8e92db46b" providerId="LiveId" clId="{55350F6E-B157-4641-AF2D-93DAFF1F0CF2}" dt="2023-06-14T18:38:28.460" v="127" actId="478"/>
+          <ac:spMkLst>
+            <pc:docMk/>
+            <pc:sldMk cId="833963141" sldId="265"/>
+            <ac:spMk id="12" creationId="{01B5CAA3-0AAB-AFC9-F542-739C94F658B1}"/>
+          </ac:spMkLst>
+        </pc:spChg>
+        <pc:spChg chg="add del">
+          <ac:chgData name="Maximiliano Ortiz" userId="90727fd8e92db46b" providerId="LiveId" clId="{55350F6E-B157-4641-AF2D-93DAFF1F0CF2}" dt="2023-06-14T18:38:30.252" v="128" actId="478"/>
+          <ac:spMkLst>
+            <pc:docMk/>
+            <pc:sldMk cId="833963141" sldId="265"/>
+            <ac:spMk id="15" creationId="{831A801F-7ED6-697C-D510-D1C00F597B94}"/>
+          </ac:spMkLst>
+        </pc:spChg>
+      </pc:sldChg>
+      <pc:sldChg chg="modSp mod modNotes">
+        <pc:chgData name="Maximiliano Ortiz" userId="90727fd8e92db46b" providerId="LiveId" clId="{55350F6E-B157-4641-AF2D-93DAFF1F0CF2}" dt="2023-06-14T18:40:03.644" v="170" actId="20577"/>
+        <pc:sldMkLst>
+          <pc:docMk/>
+          <pc:sldMk cId="544870803" sldId="266"/>
+        </pc:sldMkLst>
+        <pc:spChg chg="mod">
+          <ac:chgData name="Maximiliano Ortiz" userId="90727fd8e92db46b" providerId="LiveId" clId="{55350F6E-B157-4641-AF2D-93DAFF1F0CF2}" dt="2023-06-14T18:40:03.644" v="170" actId="20577"/>
+          <ac:spMkLst>
+            <pc:docMk/>
+            <pc:sldMk cId="544870803" sldId="266"/>
+            <ac:spMk id="14" creationId="{00000000-0000-0000-0000-000000000000}"/>
+          </ac:spMkLst>
+        </pc:spChg>
+      </pc:sldChg>
+      <pc:sldChg chg="addSp delSp modSp mod modNotes">
+        <pc:chgData name="Maximiliano Ortiz" userId="90727fd8e92db46b" providerId="LiveId" clId="{55350F6E-B157-4641-AF2D-93DAFF1F0CF2}" dt="2023-06-14T18:38:41.191" v="132"/>
+        <pc:sldMkLst>
+          <pc:docMk/>
+          <pc:sldMk cId="2531326761" sldId="267"/>
+        </pc:sldMkLst>
+        <pc:spChg chg="add mod">
+          <ac:chgData name="Maximiliano Ortiz" userId="90727fd8e92db46b" providerId="LiveId" clId="{55350F6E-B157-4641-AF2D-93DAFF1F0CF2}" dt="2023-06-14T18:38:41.191" v="132"/>
+          <ac:spMkLst>
+            <pc:docMk/>
+            <pc:sldMk cId="2531326761" sldId="267"/>
+            <ac:spMk id="3" creationId="{A1152254-2BF5-312D-6EFC-E589138AA9A0}"/>
+          </ac:spMkLst>
+        </pc:spChg>
+        <pc:spChg chg="add mod">
+          <ac:chgData name="Maximiliano Ortiz" userId="90727fd8e92db46b" providerId="LiveId" clId="{55350F6E-B157-4641-AF2D-93DAFF1F0CF2}" dt="2023-06-14T18:38:41.191" v="132"/>
+          <ac:spMkLst>
+            <pc:docMk/>
+            <pc:sldMk cId="2531326761" sldId="267"/>
+            <ac:spMk id="4" creationId="{FA786B70-333B-F8BA-76DB-94FB01392416}"/>
+          </ac:spMkLst>
+        </pc:spChg>
+        <pc:spChg chg="add del">
+          <ac:chgData name="Maximiliano Ortiz" userId="90727fd8e92db46b" providerId="LiveId" clId="{55350F6E-B157-4641-AF2D-93DAFF1F0CF2}" dt="2023-06-14T18:38:40.820" v="131" actId="478"/>
+          <ac:spMkLst>
+            <pc:docMk/>
+            <pc:sldMk cId="2531326761" sldId="267"/>
+            <ac:spMk id="17" creationId="{0BA84367-D9E9-B9BD-883E-22B688BB9D7C}"/>
+          </ac:spMkLst>
+        </pc:spChg>
+        <pc:spChg chg="add del">
+          <ac:chgData name="Maximiliano Ortiz" userId="90727fd8e92db46b" providerId="LiveId" clId="{55350F6E-B157-4641-AF2D-93DAFF1F0CF2}" dt="2023-06-14T18:38:39.196" v="130" actId="478"/>
+          <ac:spMkLst>
+            <pc:docMk/>
+            <pc:sldMk cId="2531326761" sldId="267"/>
+            <ac:spMk id="18" creationId="{766EA470-71D4-F2B0-B289-D6FAD29EC2D1}"/>
+          </ac:spMkLst>
+        </pc:spChg>
+      </pc:sldChg>
+      <pc:sldChg chg="addSp delSp modSp mod modNotes">
+        <pc:chgData name="Maximiliano Ortiz" userId="90727fd8e92db46b" providerId="LiveId" clId="{55350F6E-B157-4641-AF2D-93DAFF1F0CF2}" dt="2023-06-14T18:39:01.272" v="140"/>
+        <pc:sldMkLst>
+          <pc:docMk/>
+          <pc:sldMk cId="395277970" sldId="268"/>
+        </pc:sldMkLst>
+        <pc:spChg chg="add mod">
+          <ac:chgData name="Maximiliano Ortiz" userId="90727fd8e92db46b" providerId="LiveId" clId="{55350F6E-B157-4641-AF2D-93DAFF1F0CF2}" dt="2023-06-14T18:39:01.272" v="140"/>
+          <ac:spMkLst>
+            <pc:docMk/>
+            <pc:sldMk cId="395277970" sldId="268"/>
+            <ac:spMk id="4" creationId="{26601290-9789-5E48-DB0E-7CA2DE0BEBED}"/>
+          </ac:spMkLst>
+        </pc:spChg>
+        <pc:spChg chg="add mod">
+          <ac:chgData name="Maximiliano Ortiz" userId="90727fd8e92db46b" providerId="LiveId" clId="{55350F6E-B157-4641-AF2D-93DAFF1F0CF2}" dt="2023-06-14T18:39:01.272" v="140"/>
+          <ac:spMkLst>
+            <pc:docMk/>
+            <pc:sldMk cId="395277970" sldId="268"/>
+            <ac:spMk id="5" creationId="{E48432E8-B56A-3708-CF3F-198F2D171E3F}"/>
+          </ac:spMkLst>
+        </pc:spChg>
+        <pc:spChg chg="add del">
+          <ac:chgData name="Maximiliano Ortiz" userId="90727fd8e92db46b" providerId="LiveId" clId="{55350F6E-B157-4641-AF2D-93DAFF1F0CF2}" dt="2023-06-14T18:39:00.812" v="139" actId="478"/>
+          <ac:spMkLst>
+            <pc:docMk/>
+            <pc:sldMk cId="395277970" sldId="268"/>
+            <ac:spMk id="9" creationId="{4FA0FD9C-715F-9271-B596-5D8A9C7E5A75}"/>
+          </ac:spMkLst>
+        </pc:spChg>
+        <pc:spChg chg="add del">
+          <ac:chgData name="Maximiliano Ortiz" userId="90727fd8e92db46b" providerId="LiveId" clId="{55350F6E-B157-4641-AF2D-93DAFF1F0CF2}" dt="2023-06-14T18:39:00.812" v="139" actId="478"/>
+          <ac:spMkLst>
+            <pc:docMk/>
+            <pc:sldMk cId="395277970" sldId="268"/>
+            <ac:spMk id="17" creationId="{4F84EEF4-C408-F3EA-88B1-929CDA5BF7DE}"/>
+          </ac:spMkLst>
+        </pc:spChg>
+      </pc:sldChg>
+      <pc:sldChg chg="addSp delSp modSp mod modNotes">
+        <pc:chgData name="Maximiliano Ortiz" userId="90727fd8e92db46b" providerId="LiveId" clId="{55350F6E-B157-4641-AF2D-93DAFF1F0CF2}" dt="2023-06-14T18:39:07.689" v="142"/>
+        <pc:sldMkLst>
+          <pc:docMk/>
+          <pc:sldMk cId="1437445692" sldId="269"/>
+        </pc:sldMkLst>
+        <pc:spChg chg="add mod">
+          <ac:chgData name="Maximiliano Ortiz" userId="90727fd8e92db46b" providerId="LiveId" clId="{55350F6E-B157-4641-AF2D-93DAFF1F0CF2}" dt="2023-06-14T18:39:07.689" v="142"/>
+          <ac:spMkLst>
+            <pc:docMk/>
+            <pc:sldMk cId="1437445692" sldId="269"/>
+            <ac:spMk id="3" creationId="{8E69783E-D3C9-58AC-AE36-12862C11C450}"/>
+          </ac:spMkLst>
+        </pc:spChg>
+        <pc:spChg chg="add mod">
+          <ac:chgData name="Maximiliano Ortiz" userId="90727fd8e92db46b" providerId="LiveId" clId="{55350F6E-B157-4641-AF2D-93DAFF1F0CF2}" dt="2023-06-14T18:39:07.689" v="142"/>
+          <ac:spMkLst>
+            <pc:docMk/>
+            <pc:sldMk cId="1437445692" sldId="269"/>
+            <ac:spMk id="4" creationId="{AC501578-F6D4-97D9-2554-34E8BD1DE7E0}"/>
+          </ac:spMkLst>
+        </pc:spChg>
+        <pc:spChg chg="add del">
+          <ac:chgData name="Maximiliano Ortiz" userId="90727fd8e92db46b" providerId="LiveId" clId="{55350F6E-B157-4641-AF2D-93DAFF1F0CF2}" dt="2023-06-14T18:39:07.156" v="141" actId="478"/>
+          <ac:spMkLst>
+            <pc:docMk/>
+            <pc:sldMk cId="1437445692" sldId="269"/>
+            <ac:spMk id="8" creationId="{D884D199-63AD-0D0F-E8DE-AADDB43500CB}"/>
+          </ac:spMkLst>
+        </pc:spChg>
+        <pc:spChg chg="add del">
+          <ac:chgData name="Maximiliano Ortiz" userId="90727fd8e92db46b" providerId="LiveId" clId="{55350F6E-B157-4641-AF2D-93DAFF1F0CF2}" dt="2023-06-14T18:39:07.156" v="141" actId="478"/>
+          <ac:spMkLst>
+            <pc:docMk/>
+            <pc:sldMk cId="1437445692" sldId="269"/>
+            <ac:spMk id="17" creationId="{4F84EEF4-C408-F3EA-88B1-929CDA5BF7DE}"/>
+          </ac:spMkLst>
+        </pc:spChg>
+      </pc:sldChg>
+      <pc:sldChg chg="addSp delSp modSp mod modNotes">
+        <pc:chgData name="Maximiliano Ortiz" userId="90727fd8e92db46b" providerId="LiveId" clId="{55350F6E-B157-4641-AF2D-93DAFF1F0CF2}" dt="2023-06-14T18:38:46.125" v="134"/>
+        <pc:sldMkLst>
+          <pc:docMk/>
+          <pc:sldMk cId="3485872060" sldId="270"/>
+        </pc:sldMkLst>
+        <pc:spChg chg="add mod">
+          <ac:chgData name="Maximiliano Ortiz" userId="90727fd8e92db46b" providerId="LiveId" clId="{55350F6E-B157-4641-AF2D-93DAFF1F0CF2}" dt="2023-06-14T18:38:46.125" v="134"/>
+          <ac:spMkLst>
+            <pc:docMk/>
+            <pc:sldMk cId="3485872060" sldId="270"/>
+            <ac:spMk id="3" creationId="{BC931BCD-6B3E-AB1B-BD3F-DC2B0FAB8E5A}"/>
+          </ac:spMkLst>
+        </pc:spChg>
+        <pc:spChg chg="add mod">
+          <ac:chgData name="Maximiliano Ortiz" userId="90727fd8e92db46b" providerId="LiveId" clId="{55350F6E-B157-4641-AF2D-93DAFF1F0CF2}" dt="2023-06-14T18:38:46.125" v="134"/>
+          <ac:spMkLst>
+            <pc:docMk/>
+            <pc:sldMk cId="3485872060" sldId="270"/>
+            <ac:spMk id="4" creationId="{19CD5712-1580-B6B1-772B-3A1D2B0D8F58}"/>
+          </ac:spMkLst>
+        </pc:spChg>
+        <pc:spChg chg="add del">
+          <ac:chgData name="Maximiliano Ortiz" userId="90727fd8e92db46b" providerId="LiveId" clId="{55350F6E-B157-4641-AF2D-93DAFF1F0CF2}" dt="2023-06-14T18:38:45.828" v="133" actId="478"/>
+          <ac:spMkLst>
+            <pc:docMk/>
+            <pc:sldMk cId="3485872060" sldId="270"/>
+            <ac:spMk id="17" creationId="{0BA84367-D9E9-B9BD-883E-22B688BB9D7C}"/>
+          </ac:spMkLst>
+        </pc:spChg>
+        <pc:spChg chg="add del">
+          <ac:chgData name="Maximiliano Ortiz" userId="90727fd8e92db46b" providerId="LiveId" clId="{55350F6E-B157-4641-AF2D-93DAFF1F0CF2}" dt="2023-06-14T18:38:45.828" v="133" actId="478"/>
+          <ac:spMkLst>
+            <pc:docMk/>
+            <pc:sldMk cId="3485872060" sldId="270"/>
+            <ac:spMk id="18" creationId="{766EA470-71D4-F2B0-B289-D6FAD29EC2D1}"/>
+          </ac:spMkLst>
+        </pc:spChg>
+      </pc:sldChg>
+      <pc:sldChg chg="addSp delSp modSp mod modNotes">
+        <pc:chgData name="Maximiliano Ortiz" userId="90727fd8e92db46b" providerId="LiveId" clId="{55350F6E-B157-4641-AF2D-93DAFF1F0CF2}" dt="2023-06-14T18:38:51.566" v="136"/>
+        <pc:sldMkLst>
+          <pc:docMk/>
+          <pc:sldMk cId="491779741" sldId="271"/>
+        </pc:sldMkLst>
+        <pc:spChg chg="add mod">
+          <ac:chgData name="Maximiliano Ortiz" userId="90727fd8e92db46b" providerId="LiveId" clId="{55350F6E-B157-4641-AF2D-93DAFF1F0CF2}" dt="2023-06-14T18:38:51.566" v="136"/>
+          <ac:spMkLst>
+            <pc:docMk/>
+            <pc:sldMk cId="491779741" sldId="271"/>
+            <ac:spMk id="3" creationId="{D17E761C-E045-93A7-3C07-CD53FB292EBA}"/>
+          </ac:spMkLst>
+        </pc:spChg>
+        <pc:spChg chg="add mod">
+          <ac:chgData name="Maximiliano Ortiz" userId="90727fd8e92db46b" providerId="LiveId" clId="{55350F6E-B157-4641-AF2D-93DAFF1F0CF2}" dt="2023-06-14T18:38:51.566" v="136"/>
+          <ac:spMkLst>
+            <pc:docMk/>
+            <pc:sldMk cId="491779741" sldId="271"/>
+            <ac:spMk id="4" creationId="{FF52CD35-4D8D-A7E2-E107-B0DBBB1A2D9B}"/>
+          </ac:spMkLst>
+        </pc:spChg>
+        <pc:spChg chg="add del">
+          <ac:chgData name="Maximiliano Ortiz" userId="90727fd8e92db46b" providerId="LiveId" clId="{55350F6E-B157-4641-AF2D-93DAFF1F0CF2}" dt="2023-06-14T18:38:51.029" v="135" actId="478"/>
+          <ac:spMkLst>
+            <pc:docMk/>
+            <pc:sldMk cId="491779741" sldId="271"/>
+            <ac:spMk id="17" creationId="{0BA84367-D9E9-B9BD-883E-22B688BB9D7C}"/>
+          </ac:spMkLst>
+        </pc:spChg>
+        <pc:spChg chg="add del">
+          <ac:chgData name="Maximiliano Ortiz" userId="90727fd8e92db46b" providerId="LiveId" clId="{55350F6E-B157-4641-AF2D-93DAFF1F0CF2}" dt="2023-06-14T18:38:51.029" v="135" actId="478"/>
+          <ac:spMkLst>
+            <pc:docMk/>
+            <pc:sldMk cId="491779741" sldId="271"/>
+            <ac:spMk id="18" creationId="{766EA470-71D4-F2B0-B289-D6FAD29EC2D1}"/>
+          </ac:spMkLst>
+        </pc:spChg>
+      </pc:sldChg>
+      <pc:sldChg chg="addSp delSp modSp mod modNotes">
+        <pc:chgData name="Maximiliano Ortiz" userId="90727fd8e92db46b" providerId="LiveId" clId="{55350F6E-B157-4641-AF2D-93DAFF1F0CF2}" dt="2023-06-14T18:38:56.471" v="138"/>
+        <pc:sldMkLst>
+          <pc:docMk/>
+          <pc:sldMk cId="4218508425" sldId="273"/>
+        </pc:sldMkLst>
+        <pc:spChg chg="add mod">
+          <ac:chgData name="Maximiliano Ortiz" userId="90727fd8e92db46b" providerId="LiveId" clId="{55350F6E-B157-4641-AF2D-93DAFF1F0CF2}" dt="2023-06-14T18:38:56.471" v="138"/>
+          <ac:spMkLst>
+            <pc:docMk/>
+            <pc:sldMk cId="4218508425" sldId="273"/>
+            <ac:spMk id="3" creationId="{E04CAB81-9904-3781-90C7-016480F2CF2B}"/>
+          </ac:spMkLst>
+        </pc:spChg>
+        <pc:spChg chg="add mod">
+          <ac:chgData name="Maximiliano Ortiz" userId="90727fd8e92db46b" providerId="LiveId" clId="{55350F6E-B157-4641-AF2D-93DAFF1F0CF2}" dt="2023-06-14T18:38:56.471" v="138"/>
+          <ac:spMkLst>
+            <pc:docMk/>
+            <pc:sldMk cId="4218508425" sldId="273"/>
+            <ac:spMk id="4" creationId="{34CA8687-7107-2B87-4B68-F71DE22F2245}"/>
+          </ac:spMkLst>
+        </pc:spChg>
+        <pc:spChg chg="add del">
+          <ac:chgData name="Maximiliano Ortiz" userId="90727fd8e92db46b" providerId="LiveId" clId="{55350F6E-B157-4641-AF2D-93DAFF1F0CF2}" dt="2023-06-14T18:38:56.082" v="137" actId="478"/>
+          <ac:spMkLst>
+            <pc:docMk/>
+            <pc:sldMk cId="4218508425" sldId="273"/>
+            <ac:spMk id="17" creationId="{0BA84367-D9E9-B9BD-883E-22B688BB9D7C}"/>
+          </ac:spMkLst>
+        </pc:spChg>
+        <pc:spChg chg="add del">
+          <ac:chgData name="Maximiliano Ortiz" userId="90727fd8e92db46b" providerId="LiveId" clId="{55350F6E-B157-4641-AF2D-93DAFF1F0CF2}" dt="2023-06-14T18:38:56.082" v="137" actId="478"/>
+          <ac:spMkLst>
+            <pc:docMk/>
+            <pc:sldMk cId="4218508425" sldId="273"/>
+            <ac:spMk id="18" creationId="{766EA470-71D4-F2B0-B289-D6FAD29EC2D1}"/>
+          </ac:spMkLst>
+        </pc:spChg>
+      </pc:sldChg>
+      <pc:sldChg chg="addSp delSp modSp add mod">
+        <pc:chgData name="Maximiliano Ortiz" userId="90727fd8e92db46b" providerId="LiveId" clId="{55350F6E-B157-4641-AF2D-93DAFF1F0CF2}" dt="2023-06-14T20:24:57.435" v="202" actId="14100"/>
+        <pc:sldMkLst>
+          <pc:docMk/>
+          <pc:sldMk cId="1767026035" sldId="274"/>
+        </pc:sldMkLst>
+        <pc:spChg chg="del">
+          <ac:chgData name="Maximiliano Ortiz" userId="90727fd8e92db46b" providerId="LiveId" clId="{55350F6E-B157-4641-AF2D-93DAFF1F0CF2}" dt="2023-06-14T20:21:40.384" v="172" actId="478"/>
+          <ac:spMkLst>
+            <pc:docMk/>
+            <pc:sldMk cId="1767026035" sldId="274"/>
+            <ac:spMk id="2" creationId="{6AD68EBF-CA66-5DF2-2FA7-CB2BB497BFED}"/>
+          </ac:spMkLst>
+        </pc:spChg>
+        <pc:picChg chg="del">
+          <ac:chgData name="Maximiliano Ortiz" userId="90727fd8e92db46b" providerId="LiveId" clId="{55350F6E-B157-4641-AF2D-93DAFF1F0CF2}" dt="2023-06-14T20:21:44.158" v="174" actId="478"/>
+          <ac:picMkLst>
+            <pc:docMk/>
+            <pc:sldMk cId="1767026035" sldId="274"/>
+            <ac:picMk id="5" creationId="{575B2D1D-EE2D-53A5-CAD6-428D042E8E7F}"/>
+          </ac:picMkLst>
+        </pc:picChg>
+        <pc:picChg chg="add del mod">
+          <ac:chgData name="Maximiliano Ortiz" userId="90727fd8e92db46b" providerId="LiveId" clId="{55350F6E-B157-4641-AF2D-93DAFF1F0CF2}" dt="2023-06-14T20:22:39.185" v="184" actId="478"/>
+          <ac:picMkLst>
+            <pc:docMk/>
+            <pc:sldMk cId="1767026035" sldId="274"/>
+            <ac:picMk id="7" creationId="{CB7F9086-4277-AF55-95B2-394D5D5AE172}"/>
+          </ac:picMkLst>
+        </pc:picChg>
+        <pc:picChg chg="add del mod">
+          <ac:chgData name="Maximiliano Ortiz" userId="90727fd8e92db46b" providerId="LiveId" clId="{55350F6E-B157-4641-AF2D-93DAFF1F0CF2}" dt="2023-06-14T20:24:38.184" v="195" actId="478"/>
+          <ac:picMkLst>
+            <pc:docMk/>
+            <pc:sldMk cId="1767026035" sldId="274"/>
+            <ac:picMk id="9" creationId="{0E3DD695-5D66-AE0D-A521-9EA1CDC4ACBB}"/>
+          </ac:picMkLst>
+        </pc:picChg>
+        <pc:picChg chg="add mod">
+          <ac:chgData name="Maximiliano Ortiz" userId="90727fd8e92db46b" providerId="LiveId" clId="{55350F6E-B157-4641-AF2D-93DAFF1F0CF2}" dt="2023-06-14T20:24:57.435" v="202" actId="14100"/>
+          <ac:picMkLst>
+            <pc:docMk/>
+            <pc:sldMk cId="1767026035" sldId="274"/>
+            <ac:picMk id="11" creationId="{6DA58D7C-13D7-7A7F-7DDB-F92D7D3CCAE3}"/>
+          </ac:picMkLst>
+        </pc:picChg>
+        <pc:picChg chg="del">
+          <ac:chgData name="Maximiliano Ortiz" userId="90727fd8e92db46b" providerId="LiveId" clId="{55350F6E-B157-4641-AF2D-93DAFF1F0CF2}" dt="2023-06-14T20:21:43.687" v="173" actId="478"/>
+          <ac:picMkLst>
+            <pc:docMk/>
+            <pc:sldMk cId="1767026035" sldId="274"/>
+            <ac:picMk id="1030" creationId="{BB64784E-8508-DF6C-0317-9E46D9240BA9}"/>
+          </ac:picMkLst>
+        </pc:picChg>
+      </pc:sldChg>
+    </pc:docChg>
+  </pc:docChgLst>
   <pc:docChgLst>
     <pc:chgData name="Maximiliano Ortiz" userId="90727fd8e92db46b" providerId="LiveId" clId="{ED3D7938-00CD-4EF8-87CD-6C8CC28A6A82}"/>
     <pc:docChg chg="undo custSel addSld delSld modSld">
@@ -1666,6 +2241,195 @@
     </pc:docChg>
   </pc:docChgLst>
 </pc:chgInfo>
+</file>
+
+<file path=ppt/handoutMasters/handoutMaster1.xml><?xml version="1.0" encoding="utf-8"?>
+<p:handoutMaster xmlns:a="http://schemas.openxmlformats.org/drawingml/2006/main" xmlns:r="http://schemas.openxmlformats.org/officeDocument/2006/relationships" xmlns:p="http://schemas.openxmlformats.org/presentationml/2006/main">
+  <p:cSld>
+    <p:bg>
+      <p:bgRef idx="1001">
+        <a:schemeClr val="bg1"/>
+      </p:bgRef>
+    </p:bg>
+    <p:spTree>
+      <p:nvGrpSpPr>
+        <p:cNvPr id="1" name=""/>
+        <p:cNvGrpSpPr/>
+        <p:nvPr/>
+      </p:nvGrpSpPr>
+      <p:grpSpPr>
+        <a:xfrm>
+          <a:off x="0" y="0"/>
+          <a:ext cx="0" cy="0"/>
+          <a:chOff x="0" y="0"/>
+          <a:chExt cx="0" cy="0"/>
+        </a:xfrm>
+      </p:grpSpPr>
+      <p:sp>
+        <p:nvSpPr>
+          <p:cNvPr id="2" name="Marcador de encabezado 1">
+            <a:extLst>
+              <a:ext uri="{FF2B5EF4-FFF2-40B4-BE49-F238E27FC236}">
+                <a16:creationId xmlns:a16="http://schemas.microsoft.com/office/drawing/2014/main" id="{F6E05B64-D6C9-4BE3-2F46-C0254023FD24}"/>
+              </a:ext>
+            </a:extLst>
+          </p:cNvPr>
+          <p:cNvSpPr>
+            <a:spLocks noGrp="1"/>
+          </p:cNvSpPr>
+          <p:nvPr>
+            <p:ph type="hdr" sz="quarter"/>
+          </p:nvPr>
+        </p:nvSpPr>
+        <p:spPr>
+          <a:xfrm>
+            <a:off x="0" y="0"/>
+            <a:ext cx="2971800" cy="458788"/>
+          </a:xfrm>
+          <a:prstGeom prst="rect">
+            <a:avLst/>
+          </a:prstGeom>
+        </p:spPr>
+        <p:txBody>
+          <a:bodyPr vert="horz" lIns="91440" tIns="45720" rIns="91440" bIns="45720" rtlCol="0"/>
+          <a:lstStyle>
+            <a:lvl1pPr algn="l">
+              <a:defRPr sz="1200"/>
+            </a:lvl1pPr>
+          </a:lstStyle>
+          <a:p>
+            <a:endParaRPr lang="es-AR"/>
+          </a:p>
+        </p:txBody>
+      </p:sp>
+      <p:sp>
+        <p:nvSpPr>
+          <p:cNvPr id="3" name="Marcador de fecha 2">
+            <a:extLst>
+              <a:ext uri="{FF2B5EF4-FFF2-40B4-BE49-F238E27FC236}">
+                <a16:creationId xmlns:a16="http://schemas.microsoft.com/office/drawing/2014/main" id="{110F42FD-56BB-8D6F-4AE2-1E390E4BEECD}"/>
+              </a:ext>
+            </a:extLst>
+          </p:cNvPr>
+          <p:cNvSpPr>
+            <a:spLocks noGrp="1"/>
+          </p:cNvSpPr>
+          <p:nvPr>
+            <p:ph type="dt" sz="quarter" idx="1"/>
+          </p:nvPr>
+        </p:nvSpPr>
+        <p:spPr>
+          <a:xfrm>
+            <a:off x="3884613" y="0"/>
+            <a:ext cx="2971800" cy="458788"/>
+          </a:xfrm>
+          <a:prstGeom prst="rect">
+            <a:avLst/>
+          </a:prstGeom>
+        </p:spPr>
+        <p:txBody>
+          <a:bodyPr vert="horz" lIns="91440" tIns="45720" rIns="91440" bIns="45720" rtlCol="0"/>
+          <a:lstStyle>
+            <a:lvl1pPr algn="r">
+              <a:defRPr sz="1200"/>
+            </a:lvl1pPr>
+          </a:lstStyle>
+          <a:p>
+            <a:fld id="{3DA1D10F-A789-4115-AD49-46209CB5313F}" type="datetimeFigureOut">
+              <a:rPr lang="es-AR" smtClean="0"/>
+              <a:t>14/6/2023</a:t>
+            </a:fld>
+            <a:endParaRPr lang="es-AR"/>
+          </a:p>
+        </p:txBody>
+      </p:sp>
+      <p:sp>
+        <p:nvSpPr>
+          <p:cNvPr id="4" name="Marcador de pie de página 3">
+            <a:extLst>
+              <a:ext uri="{FF2B5EF4-FFF2-40B4-BE49-F238E27FC236}">
+                <a16:creationId xmlns:a16="http://schemas.microsoft.com/office/drawing/2014/main" id="{5635A4B7-3244-F753-04F7-6B3BCD26CB42}"/>
+              </a:ext>
+            </a:extLst>
+          </p:cNvPr>
+          <p:cNvSpPr>
+            <a:spLocks noGrp="1"/>
+          </p:cNvSpPr>
+          <p:nvPr>
+            <p:ph type="ftr" sz="quarter" idx="2"/>
+          </p:nvPr>
+        </p:nvSpPr>
+        <p:spPr>
+          <a:xfrm>
+            <a:off x="0" y="8685213"/>
+            <a:ext cx="2971800" cy="458787"/>
+          </a:xfrm>
+          <a:prstGeom prst="rect">
+            <a:avLst/>
+          </a:prstGeom>
+        </p:spPr>
+        <p:txBody>
+          <a:bodyPr vert="horz" lIns="91440" tIns="45720" rIns="91440" bIns="45720" rtlCol="0" anchor="b"/>
+          <a:lstStyle>
+            <a:lvl1pPr algn="l">
+              <a:defRPr sz="1200"/>
+            </a:lvl1pPr>
+          </a:lstStyle>
+          <a:p>
+            <a:endParaRPr lang="es-AR"/>
+          </a:p>
+        </p:txBody>
+      </p:sp>
+      <p:sp>
+        <p:nvSpPr>
+          <p:cNvPr id="5" name="Marcador de número de diapositiva 4">
+            <a:extLst>
+              <a:ext uri="{FF2B5EF4-FFF2-40B4-BE49-F238E27FC236}">
+                <a16:creationId xmlns:a16="http://schemas.microsoft.com/office/drawing/2014/main" id="{96971A62-5FD8-3ACD-62A4-356CEDCB84E2}"/>
+              </a:ext>
+            </a:extLst>
+          </p:cNvPr>
+          <p:cNvSpPr>
+            <a:spLocks noGrp="1"/>
+          </p:cNvSpPr>
+          <p:nvPr>
+            <p:ph type="sldNum" sz="quarter" idx="3"/>
+          </p:nvPr>
+        </p:nvSpPr>
+        <p:spPr>
+          <a:xfrm>
+            <a:off x="3884613" y="8685213"/>
+            <a:ext cx="2971800" cy="458787"/>
+          </a:xfrm>
+          <a:prstGeom prst="rect">
+            <a:avLst/>
+          </a:prstGeom>
+        </p:spPr>
+        <p:txBody>
+          <a:bodyPr vert="horz" lIns="91440" tIns="45720" rIns="91440" bIns="45720" rtlCol="0" anchor="b"/>
+          <a:lstStyle>
+            <a:lvl1pPr algn="r">
+              <a:defRPr sz="1200"/>
+            </a:lvl1pPr>
+          </a:lstStyle>
+          <a:p>
+            <a:fld id="{0D14F188-1BA1-474C-A809-D465D57E116C}" type="slidenum">
+              <a:rPr lang="es-AR" smtClean="0"/>
+              <a:t>‹Nº›</a:t>
+            </a:fld>
+            <a:endParaRPr lang="es-AR"/>
+          </a:p>
+        </p:txBody>
+      </p:sp>
+    </p:spTree>
+    <p:extLst>
+      <p:ext uri="{BB962C8B-B14F-4D97-AF65-F5344CB8AC3E}">
+        <p14:creationId xmlns:p14="http://schemas.microsoft.com/office/powerpoint/2010/main" val="697421275"/>
+      </p:ext>
+    </p:extLst>
+  </p:cSld>
+  <p:clrMap bg1="lt1" tx1="dk1" bg2="lt2" tx2="dk2" accent1="accent1" accent2="accent2" accent3="accent3" accent4="accent4" accent5="accent5" accent6="accent6" hlink="hlink" folHlink="folHlink"/>
+</p:handoutMaster>
 </file>
 
 <file path=ppt/notesMasters/notesMaster1.xml><?xml version="1.0" encoding="utf-8"?>
@@ -1750,7 +2514,7 @@
           <a:p>
             <a:fld id="{161A04E9-9810-4C50-BE6C-759F515D9783}" type="datetimeFigureOut">
               <a:rPr lang="es-ES" smtClean="0"/>
-              <a:t>27/06/2022</a:t>
+              <a:t>14/06/2023</a:t>
             </a:fld>
             <a:endParaRPr lang="es-ES"/>
           </a:p>
@@ -2082,7 +2846,7 @@
           <a:p>
             <a:fld id="{970303AB-70CE-4CAE-8152-1E178FCC9B79}" type="slidenum">
               <a:rPr lang="es-ES" smtClean="0"/>
-              <a:t>4</a:t>
+              <a:t>5</a:t>
             </a:fld>
             <a:endParaRPr lang="es-ES"/>
           </a:p>
@@ -2166,7 +2930,7 @@
           <a:p>
             <a:fld id="{970303AB-70CE-4CAE-8152-1E178FCC9B79}" type="slidenum">
               <a:rPr lang="es-ES" smtClean="0"/>
-              <a:t>13</a:t>
+              <a:t>14</a:t>
             </a:fld>
             <a:endParaRPr lang="es-ES"/>
           </a:p>
@@ -2250,7 +3014,7 @@
           <a:p>
             <a:fld id="{970303AB-70CE-4CAE-8152-1E178FCC9B79}" type="slidenum">
               <a:rPr lang="es-ES" smtClean="0"/>
-              <a:t>14</a:t>
+              <a:t>15</a:t>
             </a:fld>
             <a:endParaRPr lang="es-ES"/>
           </a:p>
@@ -2334,7 +3098,7 @@
           <a:p>
             <a:fld id="{970303AB-70CE-4CAE-8152-1E178FCC9B79}" type="slidenum">
               <a:rPr lang="es-ES" smtClean="0"/>
-              <a:t>15</a:t>
+              <a:t>16</a:t>
             </a:fld>
             <a:endParaRPr lang="es-ES"/>
           </a:p>
@@ -2418,7 +3182,7 @@
           <a:p>
             <a:fld id="{970303AB-70CE-4CAE-8152-1E178FCC9B79}" type="slidenum">
               <a:rPr lang="es-ES" smtClean="0"/>
-              <a:t>5</a:t>
+              <a:t>6</a:t>
             </a:fld>
             <a:endParaRPr lang="es-ES"/>
           </a:p>
@@ -2502,7 +3266,7 @@
           <a:p>
             <a:fld id="{970303AB-70CE-4CAE-8152-1E178FCC9B79}" type="slidenum">
               <a:rPr lang="es-ES" smtClean="0"/>
-              <a:t>6</a:t>
+              <a:t>7</a:t>
             </a:fld>
             <a:endParaRPr lang="es-ES"/>
           </a:p>
@@ -2586,7 +3350,7 @@
           <a:p>
             <a:fld id="{970303AB-70CE-4CAE-8152-1E178FCC9B79}" type="slidenum">
               <a:rPr lang="es-ES" smtClean="0"/>
-              <a:t>7</a:t>
+              <a:t>8</a:t>
             </a:fld>
             <a:endParaRPr lang="es-ES"/>
           </a:p>
@@ -2670,7 +3434,7 @@
           <a:p>
             <a:fld id="{970303AB-70CE-4CAE-8152-1E178FCC9B79}" type="slidenum">
               <a:rPr lang="es-ES" smtClean="0"/>
-              <a:t>8</a:t>
+              <a:t>9</a:t>
             </a:fld>
             <a:endParaRPr lang="es-ES"/>
           </a:p>
@@ -2754,7 +3518,7 @@
           <a:p>
             <a:fld id="{970303AB-70CE-4CAE-8152-1E178FCC9B79}" type="slidenum">
               <a:rPr lang="es-ES" smtClean="0"/>
-              <a:t>9</a:t>
+              <a:t>10</a:t>
             </a:fld>
             <a:endParaRPr lang="es-ES"/>
           </a:p>
@@ -2838,7 +3602,7 @@
           <a:p>
             <a:fld id="{970303AB-70CE-4CAE-8152-1E178FCC9B79}" type="slidenum">
               <a:rPr lang="es-ES" smtClean="0"/>
-              <a:t>10</a:t>
+              <a:t>11</a:t>
             </a:fld>
             <a:endParaRPr lang="es-ES"/>
           </a:p>
@@ -2922,7 +3686,7 @@
           <a:p>
             <a:fld id="{970303AB-70CE-4CAE-8152-1E178FCC9B79}" type="slidenum">
               <a:rPr lang="es-ES" smtClean="0"/>
-              <a:t>11</a:t>
+              <a:t>12</a:t>
             </a:fld>
             <a:endParaRPr lang="es-ES"/>
           </a:p>
@@ -3006,7 +3770,7 @@
           <a:p>
             <a:fld id="{970303AB-70CE-4CAE-8152-1E178FCC9B79}" type="slidenum">
               <a:rPr lang="es-ES" smtClean="0"/>
-              <a:t>12</a:t>
+              <a:t>13</a:t>
             </a:fld>
             <a:endParaRPr lang="es-ES"/>
           </a:p>
@@ -3180,7 +3944,7 @@
           <a:p>
             <a:fld id="{4C866B5A-9294-407F-B016-7E4AD22DE525}" type="datetimeFigureOut">
               <a:rPr lang="es-ES" smtClean="0"/>
-              <a:t>27/06/2022</a:t>
+              <a:t>14/06/2023</a:t>
             </a:fld>
             <a:endParaRPr lang="es-ES"/>
           </a:p>
@@ -5577,7 +6341,7 @@
           <a:p>
             <a:r>
               <a:rPr lang="es-ES" dirty="0"/>
-              <a:t>Estimación del C50 para la banda de 1 kHz:</a:t>
+              <a:t>Estimación del T30 para la banda de 1 kHz:</a:t>
             </a:r>
           </a:p>
         </p:txBody>
@@ -5828,12 +6592,106 @@
           </a:p>
         </p:txBody>
       </p:sp>
-      <p:sp>
-        <p:nvSpPr>
-          <p:cNvPr id="17" name="Rectángulo 16">
+      <p:pic>
+        <p:nvPicPr>
+          <p:cNvPr id="2050" name="Picture 2">
             <a:extLst>
               <a:ext uri="{FF2B5EF4-FFF2-40B4-BE49-F238E27FC236}">
-                <a16:creationId xmlns:a16="http://schemas.microsoft.com/office/drawing/2014/main" id="{0BA84367-D9E9-B9BD-883E-22B688BB9D7C}"/>
+                <a16:creationId xmlns:a16="http://schemas.microsoft.com/office/drawing/2014/main" id="{FF0055B1-6FE4-EB32-8D33-87129ECB5836}"/>
+              </a:ext>
+            </a:extLst>
+          </p:cNvPr>
+          <p:cNvPicPr>
+            <a:picLocks noChangeAspect="1" noChangeArrowheads="1"/>
+          </p:cNvPicPr>
+          <p:nvPr/>
+        </p:nvPicPr>
+        <p:blipFill>
+          <a:blip r:embed="rId3">
+            <a:extLst>
+              <a:ext uri="{28A0092B-C50C-407E-A947-70E740481C1C}">
+                <a14:useLocalDpi xmlns:a14="http://schemas.microsoft.com/office/drawing/2010/main" val="0"/>
+              </a:ext>
+            </a:extLst>
+          </a:blip>
+          <a:srcRect/>
+          <a:stretch>
+            <a:fillRect/>
+          </a:stretch>
+        </p:blipFill>
+        <p:spPr bwMode="auto">
+          <a:xfrm>
+            <a:off x="4597037" y="1949216"/>
+            <a:ext cx="4295443" cy="4176947"/>
+          </a:xfrm>
+          <a:prstGeom prst="rect">
+            <a:avLst/>
+          </a:prstGeom>
+          <a:noFill/>
+          <a:extLst>
+            <a:ext uri="{909E8E84-426E-40DD-AFC4-6F175D3DCCD1}">
+              <a14:hiddenFill xmlns:a14="http://schemas.microsoft.com/office/drawing/2010/main">
+                <a:solidFill>
+                  <a:srgbClr val="FFFFFF"/>
+                </a:solidFill>
+              </a14:hiddenFill>
+            </a:ext>
+          </a:extLst>
+        </p:spPr>
+      </p:pic>
+      <p:pic>
+        <p:nvPicPr>
+          <p:cNvPr id="2052" name="Picture 4">
+            <a:extLst>
+              <a:ext uri="{FF2B5EF4-FFF2-40B4-BE49-F238E27FC236}">
+                <a16:creationId xmlns:a16="http://schemas.microsoft.com/office/drawing/2014/main" id="{4811F066-EB59-6349-C2D7-10CF08457AB1}"/>
+              </a:ext>
+            </a:extLst>
+          </p:cNvPr>
+          <p:cNvPicPr>
+            <a:picLocks noChangeAspect="1" noChangeArrowheads="1"/>
+          </p:cNvPicPr>
+          <p:nvPr/>
+        </p:nvPicPr>
+        <p:blipFill>
+          <a:blip r:embed="rId4">
+            <a:extLst>
+              <a:ext uri="{28A0092B-C50C-407E-A947-70E740481C1C}">
+                <a14:useLocalDpi xmlns:a14="http://schemas.microsoft.com/office/drawing/2010/main" val="0"/>
+              </a:ext>
+            </a:extLst>
+          </a:blip>
+          <a:srcRect/>
+          <a:stretch>
+            <a:fillRect/>
+          </a:stretch>
+        </p:blipFill>
+        <p:spPr bwMode="auto">
+          <a:xfrm>
+            <a:off x="214928" y="1816179"/>
+            <a:ext cx="4262365" cy="4346997"/>
+          </a:xfrm>
+          <a:prstGeom prst="rect">
+            <a:avLst/>
+          </a:prstGeom>
+          <a:noFill/>
+          <a:extLst>
+            <a:ext uri="{909E8E84-426E-40DD-AFC4-6F175D3DCCD1}">
+              <a14:hiddenFill xmlns:a14="http://schemas.microsoft.com/office/drawing/2010/main">
+                <a:solidFill>
+                  <a:srgbClr val="FFFFFF"/>
+                </a:solidFill>
+              </a14:hiddenFill>
+            </a:ext>
+          </a:extLst>
+        </p:spPr>
+      </p:pic>
+      <p:sp>
+        <p:nvSpPr>
+          <p:cNvPr id="3" name="Rectángulo 2">
+            <a:extLst>
+              <a:ext uri="{FF2B5EF4-FFF2-40B4-BE49-F238E27FC236}">
+                <a16:creationId xmlns:a16="http://schemas.microsoft.com/office/drawing/2014/main" id="{A1152254-2BF5-312D-6EFC-E589138AA9A0}"/>
               </a:ext>
             </a:extLst>
           </p:cNvPr>
@@ -5842,8 +6700,8 @@
         </p:nvSpPr>
         <p:spPr bwMode="auto">
           <a:xfrm>
-            <a:off x="7596336" y="6417331"/>
-            <a:ext cx="1152128" cy="316557"/>
+            <a:off x="7236296" y="6381327"/>
+            <a:ext cx="1691680" cy="388565"/>
           </a:xfrm>
           <a:prstGeom prst="rect">
             <a:avLst/>
@@ -5870,7 +6728,7 @@
           </a:bodyPr>
           <a:lstStyle/>
           <a:p>
-            <a:pPr marL="0" marR="0" indent="0" algn="l" defTabSz="914400" rtl="0" eaLnBrk="1" fontAlgn="base" latinLnBrk="0" hangingPunct="1">
+            <a:pPr marL="0" marR="0" indent="0" algn="r" defTabSz="914400" rtl="0" eaLnBrk="1" fontAlgn="base" latinLnBrk="0" hangingPunct="1">
               <a:lnSpc>
                 <a:spcPct val="100000"/>
               </a:lnSpc>
@@ -5891,7 +6749,7 @@
                 <a:latin typeface="Verdana" pitchFamily="34" charset="0"/>
                 <a:ea typeface="ＭＳ Ｐゴシック" pitchFamily="50" charset="-128"/>
               </a:rPr>
-              <a:t>10</a:t>
+              <a:t>6</a:t>
             </a:r>
             <a:r>
               <a:rPr kumimoji="1" lang="es-AR" sz="1400" b="0" i="0" u="none" strike="noStrike" cap="none" normalizeH="0" baseline="0" dirty="0">
@@ -5912,10 +6770,10 @@
       </p:sp>
       <p:sp>
         <p:nvSpPr>
-          <p:cNvPr id="18" name="Rectángulo 17">
+          <p:cNvPr id="4" name="Rectángulo 3">
             <a:extLst>
               <a:ext uri="{FF2B5EF4-FFF2-40B4-BE49-F238E27FC236}">
-                <a16:creationId xmlns:a16="http://schemas.microsoft.com/office/drawing/2014/main" id="{766EA470-71D4-F2B0-B289-D6FAD29EC2D1}"/>
+                <a16:creationId xmlns:a16="http://schemas.microsoft.com/office/drawing/2014/main" id="{FA786B70-333B-F8BA-76DB-94FB01392416}"/>
               </a:ext>
             </a:extLst>
           </p:cNvPr>
@@ -5925,7 +6783,7 @@
         <p:spPr bwMode="auto">
           <a:xfrm>
             <a:off x="107504" y="6381328"/>
-            <a:ext cx="5328592" cy="388565"/>
+            <a:ext cx="7128792" cy="388565"/>
           </a:xfrm>
           <a:prstGeom prst="rect">
             <a:avLst/>
@@ -5980,8 +6838,306 @@
                 <a:latin typeface="Verdana" pitchFamily="34" charset="0"/>
                 <a:ea typeface="ＭＳ Ｐゴシック" pitchFamily="50" charset="-128"/>
               </a:rPr>
-              <a:t>Estimación ciega de parámetros acústicos de un recinto</a:t>
-            </a:r>
+              <a:t>Maximiliano Ortiz - Estimación ciega de parámetros acústicos de un recinto</a:t>
+            </a:r>
+          </a:p>
+        </p:txBody>
+      </p:sp>
+    </p:spTree>
+    <p:extLst>
+      <p:ext uri="{BB962C8B-B14F-4D97-AF65-F5344CB8AC3E}">
+        <p14:creationId xmlns:p14="http://schemas.microsoft.com/office/powerpoint/2010/main" val="2531326761"/>
+      </p:ext>
+    </p:extLst>
+  </p:cSld>
+  <p:clrMapOvr>
+    <a:masterClrMapping/>
+  </p:clrMapOvr>
+</p:sld>
+</file>
+
+<file path=ppt/slides/slide11.xml><?xml version="1.0" encoding="utf-8"?>
+<p:sld xmlns:a="http://schemas.openxmlformats.org/drawingml/2006/main" xmlns:r="http://schemas.openxmlformats.org/officeDocument/2006/relationships" xmlns:p="http://schemas.openxmlformats.org/presentationml/2006/main">
+  <p:cSld>
+    <p:spTree>
+      <p:nvGrpSpPr>
+        <p:cNvPr id="1" name=""/>
+        <p:cNvGrpSpPr/>
+        <p:nvPr/>
+      </p:nvGrpSpPr>
+      <p:grpSpPr>
+        <a:xfrm>
+          <a:off x="0" y="0"/>
+          <a:ext cx="0" cy="0"/>
+          <a:chOff x="0" y="0"/>
+          <a:chExt cx="0" cy="0"/>
+        </a:xfrm>
+      </p:grpSpPr>
+      <p:sp>
+        <p:nvSpPr>
+          <p:cNvPr id="14" name="13 Marcador de contenido"/>
+          <p:cNvSpPr>
+            <a:spLocks noGrp="1"/>
+          </p:cNvSpPr>
+          <p:nvPr>
+            <p:ph idx="1"/>
+          </p:nvPr>
+        </p:nvSpPr>
+        <p:spPr/>
+        <p:txBody>
+          <a:bodyPr/>
+          <a:lstStyle/>
+          <a:p>
+            <a:r>
+              <a:rPr lang="es-ES" dirty="0"/>
+              <a:t>Estimación del C50 para la banda de 1 kHz:</a:t>
+            </a:r>
+          </a:p>
+        </p:txBody>
+      </p:sp>
+      <p:sp>
+        <p:nvSpPr>
+          <p:cNvPr id="13" name="12 Título"/>
+          <p:cNvSpPr>
+            <a:spLocks noGrp="1"/>
+          </p:cNvSpPr>
+          <p:nvPr>
+            <p:ph type="title"/>
+          </p:nvPr>
+        </p:nvSpPr>
+        <p:spPr/>
+        <p:txBody>
+          <a:bodyPr/>
+          <a:lstStyle/>
+          <a:p>
+            <a:r>
+              <a:rPr lang="es-ES" dirty="0"/>
+              <a:t>Resultados: estimación de parámetros</a:t>
+            </a:r>
+          </a:p>
+        </p:txBody>
+      </p:sp>
+      <p:sp>
+        <p:nvSpPr>
+          <p:cNvPr id="2" name="AutoShape 2">
+            <a:extLst>
+              <a:ext uri="{FF2B5EF4-FFF2-40B4-BE49-F238E27FC236}">
+                <a16:creationId xmlns:a16="http://schemas.microsoft.com/office/drawing/2014/main" id="{6AD68EBF-CA66-5DF2-2FA7-CB2BB497BFED}"/>
+              </a:ext>
+            </a:extLst>
+          </p:cNvPr>
+          <p:cNvSpPr>
+            <a:spLocks noChangeAspect="1" noChangeArrowheads="1"/>
+          </p:cNvSpPr>
+          <p:nvPr/>
+        </p:nvSpPr>
+        <p:spPr bwMode="auto">
+          <a:xfrm>
+            <a:off x="4419600" y="3276600"/>
+            <a:ext cx="304800" cy="304800"/>
+          </a:xfrm>
+          <a:prstGeom prst="rect">
+            <a:avLst/>
+          </a:prstGeom>
+          <a:noFill/>
+          <a:extLst>
+            <a:ext uri="{909E8E84-426E-40DD-AFC4-6F175D3DCCD1}">
+              <a14:hiddenFill xmlns:a14="http://schemas.microsoft.com/office/drawing/2010/main">
+                <a:solidFill>
+                  <a:srgbClr val="FFFFFF"/>
+                </a:solidFill>
+              </a14:hiddenFill>
+            </a:ext>
+          </a:extLst>
+        </p:spPr>
+        <p:txBody>
+          <a:bodyPr vert="horz" wrap="square" lIns="91440" tIns="45720" rIns="91440" bIns="45720" numCol="1" anchor="t" anchorCtr="0" compatLnSpc="1">
+            <a:prstTxWarp prst="textNoShape">
+              <a:avLst/>
+            </a:prstTxWarp>
+          </a:bodyPr>
+          <a:lstStyle/>
+          <a:p>
+            <a:endParaRPr lang="es-AR"/>
+          </a:p>
+        </p:txBody>
+      </p:sp>
+      <p:sp>
+        <p:nvSpPr>
+          <p:cNvPr id="10" name="CuadroTexto 9">
+            <a:extLst>
+              <a:ext uri="{FF2B5EF4-FFF2-40B4-BE49-F238E27FC236}">
+                <a16:creationId xmlns:a16="http://schemas.microsoft.com/office/drawing/2014/main" id="{49D115F4-A2BB-EB93-BDE5-D5FABE94B949}"/>
+              </a:ext>
+            </a:extLst>
+          </p:cNvPr>
+          <p:cNvSpPr txBox="1"/>
+          <p:nvPr/>
+        </p:nvSpPr>
+        <p:spPr>
+          <a:xfrm>
+            <a:off x="6211728" y="5650698"/>
+            <a:ext cx="1656184" cy="261610"/>
+          </a:xfrm>
+          <a:prstGeom prst="rect">
+            <a:avLst/>
+          </a:prstGeom>
+          <a:noFill/>
+        </p:spPr>
+        <p:txBody>
+          <a:bodyPr wrap="square" rtlCol="0">
+            <a:spAutoFit/>
+          </a:bodyPr>
+          <a:lstStyle/>
+          <a:p>
+            <a:r>
+              <a:rPr lang="es-AR" sz="1100" dirty="0"/>
+              <a:t>Diferencia</a:t>
+            </a:r>
+          </a:p>
+        </p:txBody>
+      </p:sp>
+      <p:sp>
+        <p:nvSpPr>
+          <p:cNvPr id="11" name="Rectángulo 10">
+            <a:extLst>
+              <a:ext uri="{FF2B5EF4-FFF2-40B4-BE49-F238E27FC236}">
+                <a16:creationId xmlns:a16="http://schemas.microsoft.com/office/drawing/2014/main" id="{3BDB8411-DAA6-2B56-D29F-E1E5DBA383E0}"/>
+              </a:ext>
+            </a:extLst>
+          </p:cNvPr>
+          <p:cNvSpPr/>
+          <p:nvPr/>
+        </p:nvSpPr>
+        <p:spPr bwMode="auto">
+          <a:xfrm>
+            <a:off x="6193298" y="5733256"/>
+            <a:ext cx="792088" cy="142599"/>
+          </a:xfrm>
+          <a:prstGeom prst="rect">
+            <a:avLst/>
+          </a:prstGeom>
+          <a:solidFill>
+            <a:schemeClr val="bg1"/>
+          </a:solidFill>
+          <a:ln w="9525" cap="flat" cmpd="sng" algn="ctr">
+            <a:solidFill>
+              <a:schemeClr val="bg1"/>
+            </a:solidFill>
+            <a:prstDash val="solid"/>
+            <a:round/>
+            <a:headEnd type="none" w="med" len="med"/>
+            <a:tailEnd type="none" w="med" len="med"/>
+          </a:ln>
+          <a:effectLst/>
+        </p:spPr>
+        <p:txBody>
+          <a:bodyPr vert="horz" wrap="square" lIns="91440" tIns="45720" rIns="91440" bIns="45720" numCol="1" rtlCol="0" anchor="t" anchorCtr="0" compatLnSpc="1">
+            <a:prstTxWarp prst="textNoShape">
+              <a:avLst/>
+            </a:prstTxWarp>
+          </a:bodyPr>
+          <a:lstStyle/>
+          <a:p>
+            <a:pPr marL="0" marR="0" indent="0" algn="l" defTabSz="914400" rtl="0" eaLnBrk="1" fontAlgn="base" latinLnBrk="0" hangingPunct="1">
+              <a:lnSpc>
+                <a:spcPct val="100000"/>
+              </a:lnSpc>
+              <a:spcBef>
+                <a:spcPct val="0"/>
+              </a:spcBef>
+              <a:spcAft>
+                <a:spcPct val="0"/>
+              </a:spcAft>
+              <a:buClrTx/>
+              <a:buSzTx/>
+              <a:buFontTx/>
+              <a:buNone/>
+              <a:tabLst/>
+            </a:pPr>
+            <a:endParaRPr kumimoji="1" lang="es-AR" sz="1800" b="0" i="0" u="none" strike="noStrike" cap="none" normalizeH="0" baseline="0" dirty="0">
+              <a:ln>
+                <a:noFill/>
+              </a:ln>
+              <a:solidFill>
+                <a:schemeClr val="tx1"/>
+              </a:solidFill>
+              <a:effectLst/>
+              <a:latin typeface="Verdana" pitchFamily="34" charset="0"/>
+              <a:ea typeface="ＭＳ Ｐゴシック" pitchFamily="50" charset="-128"/>
+            </a:endParaRPr>
+          </a:p>
+        </p:txBody>
+      </p:sp>
+      <p:sp>
+        <p:nvSpPr>
+          <p:cNvPr id="15" name="Rectángulo 14">
+            <a:extLst>
+              <a:ext uri="{FF2B5EF4-FFF2-40B4-BE49-F238E27FC236}">
+                <a16:creationId xmlns:a16="http://schemas.microsoft.com/office/drawing/2014/main" id="{9B6D7379-7B05-B7D3-44A4-E10C7373C3DA}"/>
+              </a:ext>
+            </a:extLst>
+          </p:cNvPr>
+          <p:cNvSpPr/>
+          <p:nvPr/>
+        </p:nvSpPr>
+        <p:spPr bwMode="auto">
+          <a:xfrm>
+            <a:off x="6012160" y="1988840"/>
+            <a:ext cx="1584176" cy="261610"/>
+          </a:xfrm>
+          <a:prstGeom prst="rect">
+            <a:avLst/>
+          </a:prstGeom>
+          <a:solidFill>
+            <a:schemeClr val="bg1"/>
+          </a:solidFill>
+          <a:ln w="9525" cap="flat" cmpd="sng" algn="ctr">
+            <a:solidFill>
+              <a:schemeClr val="bg1"/>
+            </a:solidFill>
+            <a:prstDash val="solid"/>
+            <a:round/>
+            <a:headEnd type="none" w="med" len="med"/>
+            <a:tailEnd type="none" w="med" len="med"/>
+          </a:ln>
+          <a:effectLst/>
+        </p:spPr>
+        <p:txBody>
+          <a:bodyPr vert="horz" wrap="square" lIns="91440" tIns="45720" rIns="91440" bIns="45720" numCol="1" rtlCol="0" anchor="t" anchorCtr="0" compatLnSpc="1">
+            <a:prstTxWarp prst="textNoShape">
+              <a:avLst/>
+            </a:prstTxWarp>
+          </a:bodyPr>
+          <a:lstStyle/>
+          <a:p>
+            <a:pPr marL="0" marR="0" indent="0" algn="l" defTabSz="914400" rtl="0" eaLnBrk="1" fontAlgn="base" latinLnBrk="0" hangingPunct="1">
+              <a:lnSpc>
+                <a:spcPct val="100000"/>
+              </a:lnSpc>
+              <a:spcBef>
+                <a:spcPct val="0"/>
+              </a:spcBef>
+              <a:spcAft>
+                <a:spcPct val="0"/>
+              </a:spcAft>
+              <a:buClrTx/>
+              <a:buSzTx/>
+              <a:buFontTx/>
+              <a:buNone/>
+              <a:tabLst/>
+            </a:pPr>
+            <a:endParaRPr kumimoji="1" lang="es-AR" sz="1800" b="0" i="0" u="none" strike="noStrike" cap="none" normalizeH="0" baseline="0">
+              <a:ln>
+                <a:noFill/>
+              </a:ln>
+              <a:solidFill>
+                <a:schemeClr val="tx1"/>
+              </a:solidFill>
+              <a:effectLst/>
+              <a:latin typeface="Verdana" pitchFamily="34" charset="0"/>
+              <a:ea typeface="ＭＳ Ｐゴシック" pitchFamily="50" charset="-128"/>
+            </a:endParaRPr>
           </a:p>
         </p:txBody>
       </p:sp>
@@ -6079,6 +7235,163 @@
           </a:extLst>
         </p:spPr>
       </p:pic>
+      <p:sp>
+        <p:nvSpPr>
+          <p:cNvPr id="3" name="Rectángulo 2">
+            <a:extLst>
+              <a:ext uri="{FF2B5EF4-FFF2-40B4-BE49-F238E27FC236}">
+                <a16:creationId xmlns:a16="http://schemas.microsoft.com/office/drawing/2014/main" id="{BC931BCD-6B3E-AB1B-BD3F-DC2B0FAB8E5A}"/>
+              </a:ext>
+            </a:extLst>
+          </p:cNvPr>
+          <p:cNvSpPr/>
+          <p:nvPr/>
+        </p:nvSpPr>
+        <p:spPr bwMode="auto">
+          <a:xfrm>
+            <a:off x="7236296" y="6381327"/>
+            <a:ext cx="1691680" cy="388565"/>
+          </a:xfrm>
+          <a:prstGeom prst="rect">
+            <a:avLst/>
+          </a:prstGeom>
+          <a:solidFill>
+            <a:schemeClr val="bg1"/>
+          </a:solidFill>
+          <a:ln w="9525" cap="flat" cmpd="sng" algn="ctr">
+            <a:solidFill>
+              <a:schemeClr val="bg1"/>
+            </a:solidFill>
+            <a:prstDash val="solid"/>
+            <a:round/>
+            <a:headEnd type="none" w="med" len="med"/>
+            <a:tailEnd type="none" w="med" len="med"/>
+          </a:ln>
+          <a:effectLst/>
+        </p:spPr>
+        <p:txBody>
+          <a:bodyPr vert="horz" wrap="square" lIns="91440" tIns="45720" rIns="91440" bIns="45720" numCol="1" rtlCol="0" anchor="t" anchorCtr="0" compatLnSpc="1">
+            <a:prstTxWarp prst="textNoShape">
+              <a:avLst/>
+            </a:prstTxWarp>
+          </a:bodyPr>
+          <a:lstStyle/>
+          <a:p>
+            <a:pPr marL="0" marR="0" indent="0" algn="r" defTabSz="914400" rtl="0" eaLnBrk="1" fontAlgn="base" latinLnBrk="0" hangingPunct="1">
+              <a:lnSpc>
+                <a:spcPct val="100000"/>
+              </a:lnSpc>
+              <a:spcBef>
+                <a:spcPct val="0"/>
+              </a:spcBef>
+              <a:spcAft>
+                <a:spcPct val="0"/>
+              </a:spcAft>
+              <a:buClrTx/>
+              <a:buSzTx/>
+              <a:buFontTx/>
+              <a:buNone/>
+              <a:tabLst/>
+            </a:pPr>
+            <a:r>
+              <a:rPr kumimoji="1" lang="es-AR" sz="1400" dirty="0">
+                <a:latin typeface="Verdana" pitchFamily="34" charset="0"/>
+                <a:ea typeface="ＭＳ Ｐゴシック" pitchFamily="50" charset="-128"/>
+              </a:rPr>
+              <a:t>6</a:t>
+            </a:r>
+            <a:r>
+              <a:rPr kumimoji="1" lang="es-AR" sz="1400" b="0" i="0" u="none" strike="noStrike" cap="none" normalizeH="0" baseline="0" dirty="0">
+                <a:ln>
+                  <a:noFill/>
+                </a:ln>
+                <a:solidFill>
+                  <a:schemeClr val="tx1"/>
+                </a:solidFill>
+                <a:effectLst/>
+                <a:latin typeface="Verdana" pitchFamily="34" charset="0"/>
+                <a:ea typeface="ＭＳ Ｐゴシック" pitchFamily="50" charset="-128"/>
+              </a:rPr>
+              <a:t>/15</a:t>
+            </a:r>
+          </a:p>
+        </p:txBody>
+      </p:sp>
+      <p:sp>
+        <p:nvSpPr>
+          <p:cNvPr id="4" name="Rectángulo 3">
+            <a:extLst>
+              <a:ext uri="{FF2B5EF4-FFF2-40B4-BE49-F238E27FC236}">
+                <a16:creationId xmlns:a16="http://schemas.microsoft.com/office/drawing/2014/main" id="{19CD5712-1580-B6B1-772B-3A1D2B0D8F58}"/>
+              </a:ext>
+            </a:extLst>
+          </p:cNvPr>
+          <p:cNvSpPr/>
+          <p:nvPr/>
+        </p:nvSpPr>
+        <p:spPr bwMode="auto">
+          <a:xfrm>
+            <a:off x="107504" y="6381328"/>
+            <a:ext cx="7128792" cy="388565"/>
+          </a:xfrm>
+          <a:prstGeom prst="rect">
+            <a:avLst/>
+          </a:prstGeom>
+          <a:solidFill>
+            <a:schemeClr val="bg1"/>
+          </a:solidFill>
+          <a:ln w="9525" cap="flat" cmpd="sng" algn="ctr">
+            <a:solidFill>
+              <a:schemeClr val="bg1"/>
+            </a:solidFill>
+            <a:prstDash val="solid"/>
+            <a:round/>
+            <a:headEnd type="none" w="med" len="med"/>
+            <a:tailEnd type="none" w="med" len="med"/>
+          </a:ln>
+          <a:effectLst/>
+        </p:spPr>
+        <p:txBody>
+          <a:bodyPr vert="horz" wrap="square" lIns="91440" tIns="45720" rIns="91440" bIns="45720" numCol="1" rtlCol="0" anchor="t" anchorCtr="0" compatLnSpc="1">
+            <a:prstTxWarp prst="textNoShape">
+              <a:avLst/>
+            </a:prstTxWarp>
+          </a:bodyPr>
+          <a:lstStyle/>
+          <a:p>
+            <a:pPr marL="0" marR="0" indent="0" algn="l" defTabSz="914400" rtl="0" eaLnBrk="1" fontAlgn="base" latinLnBrk="0" hangingPunct="1">
+              <a:lnSpc>
+                <a:spcPct val="100000"/>
+              </a:lnSpc>
+              <a:spcBef>
+                <a:spcPct val="0"/>
+              </a:spcBef>
+              <a:spcAft>
+                <a:spcPct val="0"/>
+              </a:spcAft>
+              <a:buClrTx/>
+              <a:buSzTx/>
+              <a:buFontTx/>
+              <a:buNone/>
+              <a:tabLst/>
+            </a:pPr>
+            <a:r>
+              <a:rPr kumimoji="1" lang="es-AR" sz="1400" b="0" i="0" u="none" strike="noStrike" cap="none" normalizeH="0" baseline="0" dirty="0">
+                <a:ln>
+                  <a:noFill/>
+                </a:ln>
+                <a:solidFill>
+                  <a:schemeClr val="tx1"/>
+                </a:solidFill>
+                <a:effectLst/>
+                <a:latin typeface="Verdana" pitchFamily="34" charset="0"/>
+                <a:ea typeface="ＭＳ Ｐゴシック" pitchFamily="50" charset="-128"/>
+              </a:rPr>
+              <a:t>Maximiliano Ortiz - Estimación ciega de parámetros acústicos de un recinto</a:t>
+            </a:r>
+          </a:p>
+        </p:txBody>
+      </p:sp>
     </p:spTree>
     <p:extLst>
       <p:ext uri="{BB962C8B-B14F-4D97-AF65-F5344CB8AC3E}">
@@ -6092,7 +7405,7 @@
 </p:sld>
 </file>
 
-<file path=ppt/slides/slide11.xml><?xml version="1.0" encoding="utf-8"?>
+<file path=ppt/slides/slide12.xml><?xml version="1.0" encoding="utf-8"?>
 <p:sld xmlns:a="http://schemas.openxmlformats.org/drawingml/2006/main" xmlns:r="http://schemas.openxmlformats.org/officeDocument/2006/relationships" xmlns:p="http://schemas.openxmlformats.org/presentationml/2006/main">
   <p:cSld>
     <p:spTree>
@@ -6374,163 +7687,6 @@
               <a:latin typeface="Verdana" pitchFamily="34" charset="0"/>
               <a:ea typeface="ＭＳ Ｐゴシック" pitchFamily="50" charset="-128"/>
             </a:endParaRPr>
-          </a:p>
-        </p:txBody>
-      </p:sp>
-      <p:sp>
-        <p:nvSpPr>
-          <p:cNvPr id="17" name="Rectángulo 16">
-            <a:extLst>
-              <a:ext uri="{FF2B5EF4-FFF2-40B4-BE49-F238E27FC236}">
-                <a16:creationId xmlns:a16="http://schemas.microsoft.com/office/drawing/2014/main" id="{0BA84367-D9E9-B9BD-883E-22B688BB9D7C}"/>
-              </a:ext>
-            </a:extLst>
-          </p:cNvPr>
-          <p:cNvSpPr/>
-          <p:nvPr/>
-        </p:nvSpPr>
-        <p:spPr bwMode="auto">
-          <a:xfrm>
-            <a:off x="7596336" y="6417331"/>
-            <a:ext cx="1152128" cy="316557"/>
-          </a:xfrm>
-          <a:prstGeom prst="rect">
-            <a:avLst/>
-          </a:prstGeom>
-          <a:solidFill>
-            <a:schemeClr val="bg1"/>
-          </a:solidFill>
-          <a:ln w="9525" cap="flat" cmpd="sng" algn="ctr">
-            <a:solidFill>
-              <a:schemeClr val="bg1"/>
-            </a:solidFill>
-            <a:prstDash val="solid"/>
-            <a:round/>
-            <a:headEnd type="none" w="med" len="med"/>
-            <a:tailEnd type="none" w="med" len="med"/>
-          </a:ln>
-          <a:effectLst/>
-        </p:spPr>
-        <p:txBody>
-          <a:bodyPr vert="horz" wrap="square" lIns="91440" tIns="45720" rIns="91440" bIns="45720" numCol="1" rtlCol="0" anchor="t" anchorCtr="0" compatLnSpc="1">
-            <a:prstTxWarp prst="textNoShape">
-              <a:avLst/>
-            </a:prstTxWarp>
-          </a:bodyPr>
-          <a:lstStyle/>
-          <a:p>
-            <a:pPr marL="0" marR="0" indent="0" algn="l" defTabSz="914400" rtl="0" eaLnBrk="1" fontAlgn="base" latinLnBrk="0" hangingPunct="1">
-              <a:lnSpc>
-                <a:spcPct val="100000"/>
-              </a:lnSpc>
-              <a:spcBef>
-                <a:spcPct val="0"/>
-              </a:spcBef>
-              <a:spcAft>
-                <a:spcPct val="0"/>
-              </a:spcAft>
-              <a:buClrTx/>
-              <a:buSzTx/>
-              <a:buFontTx/>
-              <a:buNone/>
-              <a:tabLst/>
-            </a:pPr>
-            <a:r>
-              <a:rPr kumimoji="1" lang="es-AR" sz="1400" dirty="0">
-                <a:latin typeface="Verdana" pitchFamily="34" charset="0"/>
-                <a:ea typeface="ＭＳ Ｐゴシック" pitchFamily="50" charset="-128"/>
-              </a:rPr>
-              <a:t>11</a:t>
-            </a:r>
-            <a:r>
-              <a:rPr kumimoji="1" lang="es-AR" sz="1400" b="0" i="0" u="none" strike="noStrike" cap="none" normalizeH="0" baseline="0" dirty="0">
-                <a:ln>
-                  <a:noFill/>
-                </a:ln>
-                <a:solidFill>
-                  <a:schemeClr val="tx1"/>
-                </a:solidFill>
-                <a:effectLst/>
-                <a:latin typeface="Verdana" pitchFamily="34" charset="0"/>
-                <a:ea typeface="ＭＳ Ｐゴシック" pitchFamily="50" charset="-128"/>
-              </a:rPr>
-              <a:t>/15</a:t>
-            </a:r>
-          </a:p>
-        </p:txBody>
-      </p:sp>
-      <p:sp>
-        <p:nvSpPr>
-          <p:cNvPr id="18" name="Rectángulo 17">
-            <a:extLst>
-              <a:ext uri="{FF2B5EF4-FFF2-40B4-BE49-F238E27FC236}">
-                <a16:creationId xmlns:a16="http://schemas.microsoft.com/office/drawing/2014/main" id="{766EA470-71D4-F2B0-B289-D6FAD29EC2D1}"/>
-              </a:ext>
-            </a:extLst>
-          </p:cNvPr>
-          <p:cNvSpPr/>
-          <p:nvPr/>
-        </p:nvSpPr>
-        <p:spPr bwMode="auto">
-          <a:xfrm>
-            <a:off x="107504" y="6381328"/>
-            <a:ext cx="5328592" cy="388565"/>
-          </a:xfrm>
-          <a:prstGeom prst="rect">
-            <a:avLst/>
-          </a:prstGeom>
-          <a:solidFill>
-            <a:schemeClr val="bg1"/>
-          </a:solidFill>
-          <a:ln w="9525" cap="flat" cmpd="sng" algn="ctr">
-            <a:solidFill>
-              <a:schemeClr val="bg1"/>
-            </a:solidFill>
-            <a:prstDash val="solid"/>
-            <a:round/>
-            <a:headEnd type="none" w="med" len="med"/>
-            <a:tailEnd type="none" w="med" len="med"/>
-          </a:ln>
-          <a:effectLst/>
-        </p:spPr>
-        <p:txBody>
-          <a:bodyPr vert="horz" wrap="square" lIns="91440" tIns="45720" rIns="91440" bIns="45720" numCol="1" rtlCol="0" anchor="t" anchorCtr="0" compatLnSpc="1">
-            <a:prstTxWarp prst="textNoShape">
-              <a:avLst/>
-            </a:prstTxWarp>
-          </a:bodyPr>
-          <a:lstStyle/>
-          <a:p>
-            <a:pPr marL="0" marR="0" indent="0" algn="l" defTabSz="914400" rtl="0" eaLnBrk="1" fontAlgn="base" latinLnBrk="0" hangingPunct="1">
-              <a:lnSpc>
-                <a:spcPct val="100000"/>
-              </a:lnSpc>
-              <a:spcBef>
-                <a:spcPct val="0"/>
-              </a:spcBef>
-              <a:spcAft>
-                <a:spcPct val="0"/>
-              </a:spcAft>
-              <a:buClrTx/>
-              <a:buSzTx/>
-              <a:buFontTx/>
-              <a:buNone/>
-              <a:tabLst/>
-            </a:pPr>
-            <a:r>
-              <a:rPr kumimoji="1" lang="es-AR" sz="1400" b="0" i="0" u="none" strike="noStrike" cap="none" normalizeH="0" baseline="0" dirty="0">
-                <a:ln>
-                  <a:noFill/>
-                </a:ln>
-                <a:solidFill>
-                  <a:schemeClr val="tx1"/>
-                </a:solidFill>
-                <a:effectLst/>
-                <a:latin typeface="Verdana" pitchFamily="34" charset="0"/>
-                <a:ea typeface="ＭＳ Ｐゴシック" pitchFamily="50" charset="-128"/>
-              </a:rPr>
-              <a:t>Estimación ciega de parámetros acústicos de un recinto</a:t>
-            </a:r>
           </a:p>
         </p:txBody>
       </p:sp>
@@ -6628,6 +7784,163 @@
           </a:extLst>
         </p:spPr>
       </p:pic>
+      <p:sp>
+        <p:nvSpPr>
+          <p:cNvPr id="3" name="Rectángulo 2">
+            <a:extLst>
+              <a:ext uri="{FF2B5EF4-FFF2-40B4-BE49-F238E27FC236}">
+                <a16:creationId xmlns:a16="http://schemas.microsoft.com/office/drawing/2014/main" id="{D17E761C-E045-93A7-3C07-CD53FB292EBA}"/>
+              </a:ext>
+            </a:extLst>
+          </p:cNvPr>
+          <p:cNvSpPr/>
+          <p:nvPr/>
+        </p:nvSpPr>
+        <p:spPr bwMode="auto">
+          <a:xfrm>
+            <a:off x="7236296" y="6381327"/>
+            <a:ext cx="1691680" cy="388565"/>
+          </a:xfrm>
+          <a:prstGeom prst="rect">
+            <a:avLst/>
+          </a:prstGeom>
+          <a:solidFill>
+            <a:schemeClr val="bg1"/>
+          </a:solidFill>
+          <a:ln w="9525" cap="flat" cmpd="sng" algn="ctr">
+            <a:solidFill>
+              <a:schemeClr val="bg1"/>
+            </a:solidFill>
+            <a:prstDash val="solid"/>
+            <a:round/>
+            <a:headEnd type="none" w="med" len="med"/>
+            <a:tailEnd type="none" w="med" len="med"/>
+          </a:ln>
+          <a:effectLst/>
+        </p:spPr>
+        <p:txBody>
+          <a:bodyPr vert="horz" wrap="square" lIns="91440" tIns="45720" rIns="91440" bIns="45720" numCol="1" rtlCol="0" anchor="t" anchorCtr="0" compatLnSpc="1">
+            <a:prstTxWarp prst="textNoShape">
+              <a:avLst/>
+            </a:prstTxWarp>
+          </a:bodyPr>
+          <a:lstStyle/>
+          <a:p>
+            <a:pPr marL="0" marR="0" indent="0" algn="r" defTabSz="914400" rtl="0" eaLnBrk="1" fontAlgn="base" latinLnBrk="0" hangingPunct="1">
+              <a:lnSpc>
+                <a:spcPct val="100000"/>
+              </a:lnSpc>
+              <a:spcBef>
+                <a:spcPct val="0"/>
+              </a:spcBef>
+              <a:spcAft>
+                <a:spcPct val="0"/>
+              </a:spcAft>
+              <a:buClrTx/>
+              <a:buSzTx/>
+              <a:buFontTx/>
+              <a:buNone/>
+              <a:tabLst/>
+            </a:pPr>
+            <a:r>
+              <a:rPr kumimoji="1" lang="es-AR" sz="1400" dirty="0">
+                <a:latin typeface="Verdana" pitchFamily="34" charset="0"/>
+                <a:ea typeface="ＭＳ Ｐゴシック" pitchFamily="50" charset="-128"/>
+              </a:rPr>
+              <a:t>6</a:t>
+            </a:r>
+            <a:r>
+              <a:rPr kumimoji="1" lang="es-AR" sz="1400" b="0" i="0" u="none" strike="noStrike" cap="none" normalizeH="0" baseline="0" dirty="0">
+                <a:ln>
+                  <a:noFill/>
+                </a:ln>
+                <a:solidFill>
+                  <a:schemeClr val="tx1"/>
+                </a:solidFill>
+                <a:effectLst/>
+                <a:latin typeface="Verdana" pitchFamily="34" charset="0"/>
+                <a:ea typeface="ＭＳ Ｐゴシック" pitchFamily="50" charset="-128"/>
+              </a:rPr>
+              <a:t>/15</a:t>
+            </a:r>
+          </a:p>
+        </p:txBody>
+      </p:sp>
+      <p:sp>
+        <p:nvSpPr>
+          <p:cNvPr id="4" name="Rectángulo 3">
+            <a:extLst>
+              <a:ext uri="{FF2B5EF4-FFF2-40B4-BE49-F238E27FC236}">
+                <a16:creationId xmlns:a16="http://schemas.microsoft.com/office/drawing/2014/main" id="{FF52CD35-4D8D-A7E2-E107-B0DBBB1A2D9B}"/>
+              </a:ext>
+            </a:extLst>
+          </p:cNvPr>
+          <p:cNvSpPr/>
+          <p:nvPr/>
+        </p:nvSpPr>
+        <p:spPr bwMode="auto">
+          <a:xfrm>
+            <a:off x="107504" y="6381328"/>
+            <a:ext cx="7128792" cy="388565"/>
+          </a:xfrm>
+          <a:prstGeom prst="rect">
+            <a:avLst/>
+          </a:prstGeom>
+          <a:solidFill>
+            <a:schemeClr val="bg1"/>
+          </a:solidFill>
+          <a:ln w="9525" cap="flat" cmpd="sng" algn="ctr">
+            <a:solidFill>
+              <a:schemeClr val="bg1"/>
+            </a:solidFill>
+            <a:prstDash val="solid"/>
+            <a:round/>
+            <a:headEnd type="none" w="med" len="med"/>
+            <a:tailEnd type="none" w="med" len="med"/>
+          </a:ln>
+          <a:effectLst/>
+        </p:spPr>
+        <p:txBody>
+          <a:bodyPr vert="horz" wrap="square" lIns="91440" tIns="45720" rIns="91440" bIns="45720" numCol="1" rtlCol="0" anchor="t" anchorCtr="0" compatLnSpc="1">
+            <a:prstTxWarp prst="textNoShape">
+              <a:avLst/>
+            </a:prstTxWarp>
+          </a:bodyPr>
+          <a:lstStyle/>
+          <a:p>
+            <a:pPr marL="0" marR="0" indent="0" algn="l" defTabSz="914400" rtl="0" eaLnBrk="1" fontAlgn="base" latinLnBrk="0" hangingPunct="1">
+              <a:lnSpc>
+                <a:spcPct val="100000"/>
+              </a:lnSpc>
+              <a:spcBef>
+                <a:spcPct val="0"/>
+              </a:spcBef>
+              <a:spcAft>
+                <a:spcPct val="0"/>
+              </a:spcAft>
+              <a:buClrTx/>
+              <a:buSzTx/>
+              <a:buFontTx/>
+              <a:buNone/>
+              <a:tabLst/>
+            </a:pPr>
+            <a:r>
+              <a:rPr kumimoji="1" lang="es-AR" sz="1400" b="0" i="0" u="none" strike="noStrike" cap="none" normalizeH="0" baseline="0" dirty="0">
+                <a:ln>
+                  <a:noFill/>
+                </a:ln>
+                <a:solidFill>
+                  <a:schemeClr val="tx1"/>
+                </a:solidFill>
+                <a:effectLst/>
+                <a:latin typeface="Verdana" pitchFamily="34" charset="0"/>
+                <a:ea typeface="ＭＳ Ｐゴシック" pitchFamily="50" charset="-128"/>
+              </a:rPr>
+              <a:t>Maximiliano Ortiz - Estimación ciega de parámetros acústicos de un recinto</a:t>
+            </a:r>
+          </a:p>
+        </p:txBody>
+      </p:sp>
     </p:spTree>
     <p:extLst>
       <p:ext uri="{BB962C8B-B14F-4D97-AF65-F5344CB8AC3E}">
@@ -6641,7 +7954,7 @@
 </p:sld>
 </file>
 
-<file path=ppt/slides/slide12.xml><?xml version="1.0" encoding="utf-8"?>
+<file path=ppt/slides/slide13.xml><?xml version="1.0" encoding="utf-8"?>
 <p:sld xmlns:a="http://schemas.openxmlformats.org/drawingml/2006/main" xmlns:r="http://schemas.openxmlformats.org/officeDocument/2006/relationships" xmlns:p="http://schemas.openxmlformats.org/presentationml/2006/main">
   <p:cSld>
     <p:spTree>
@@ -6923,163 +8236,6 @@
               <a:latin typeface="Verdana" pitchFamily="34" charset="0"/>
               <a:ea typeface="ＭＳ Ｐゴシック" pitchFamily="50" charset="-128"/>
             </a:endParaRPr>
-          </a:p>
-        </p:txBody>
-      </p:sp>
-      <p:sp>
-        <p:nvSpPr>
-          <p:cNvPr id="17" name="Rectángulo 16">
-            <a:extLst>
-              <a:ext uri="{FF2B5EF4-FFF2-40B4-BE49-F238E27FC236}">
-                <a16:creationId xmlns:a16="http://schemas.microsoft.com/office/drawing/2014/main" id="{0BA84367-D9E9-B9BD-883E-22B688BB9D7C}"/>
-              </a:ext>
-            </a:extLst>
-          </p:cNvPr>
-          <p:cNvSpPr/>
-          <p:nvPr/>
-        </p:nvSpPr>
-        <p:spPr bwMode="auto">
-          <a:xfrm>
-            <a:off x="7596336" y="6417331"/>
-            <a:ext cx="1152128" cy="316557"/>
-          </a:xfrm>
-          <a:prstGeom prst="rect">
-            <a:avLst/>
-          </a:prstGeom>
-          <a:solidFill>
-            <a:schemeClr val="bg1"/>
-          </a:solidFill>
-          <a:ln w="9525" cap="flat" cmpd="sng" algn="ctr">
-            <a:solidFill>
-              <a:schemeClr val="bg1"/>
-            </a:solidFill>
-            <a:prstDash val="solid"/>
-            <a:round/>
-            <a:headEnd type="none" w="med" len="med"/>
-            <a:tailEnd type="none" w="med" len="med"/>
-          </a:ln>
-          <a:effectLst/>
-        </p:spPr>
-        <p:txBody>
-          <a:bodyPr vert="horz" wrap="square" lIns="91440" tIns="45720" rIns="91440" bIns="45720" numCol="1" rtlCol="0" anchor="t" anchorCtr="0" compatLnSpc="1">
-            <a:prstTxWarp prst="textNoShape">
-              <a:avLst/>
-            </a:prstTxWarp>
-          </a:bodyPr>
-          <a:lstStyle/>
-          <a:p>
-            <a:pPr marL="0" marR="0" indent="0" algn="l" defTabSz="914400" rtl="0" eaLnBrk="1" fontAlgn="base" latinLnBrk="0" hangingPunct="1">
-              <a:lnSpc>
-                <a:spcPct val="100000"/>
-              </a:lnSpc>
-              <a:spcBef>
-                <a:spcPct val="0"/>
-              </a:spcBef>
-              <a:spcAft>
-                <a:spcPct val="0"/>
-              </a:spcAft>
-              <a:buClrTx/>
-              <a:buSzTx/>
-              <a:buFontTx/>
-              <a:buNone/>
-              <a:tabLst/>
-            </a:pPr>
-            <a:r>
-              <a:rPr kumimoji="1" lang="es-AR" sz="1400" dirty="0">
-                <a:latin typeface="Verdana" pitchFamily="34" charset="0"/>
-                <a:ea typeface="ＭＳ Ｐゴシック" pitchFamily="50" charset="-128"/>
-              </a:rPr>
-              <a:t>12</a:t>
-            </a:r>
-            <a:r>
-              <a:rPr kumimoji="1" lang="es-AR" sz="1400" b="0" i="0" u="none" strike="noStrike" cap="none" normalizeH="0" baseline="0" dirty="0">
-                <a:ln>
-                  <a:noFill/>
-                </a:ln>
-                <a:solidFill>
-                  <a:schemeClr val="tx1"/>
-                </a:solidFill>
-                <a:effectLst/>
-                <a:latin typeface="Verdana" pitchFamily="34" charset="0"/>
-                <a:ea typeface="ＭＳ Ｐゴシック" pitchFamily="50" charset="-128"/>
-              </a:rPr>
-              <a:t>/15</a:t>
-            </a:r>
-          </a:p>
-        </p:txBody>
-      </p:sp>
-      <p:sp>
-        <p:nvSpPr>
-          <p:cNvPr id="18" name="Rectángulo 17">
-            <a:extLst>
-              <a:ext uri="{FF2B5EF4-FFF2-40B4-BE49-F238E27FC236}">
-                <a16:creationId xmlns:a16="http://schemas.microsoft.com/office/drawing/2014/main" id="{766EA470-71D4-F2B0-B289-D6FAD29EC2D1}"/>
-              </a:ext>
-            </a:extLst>
-          </p:cNvPr>
-          <p:cNvSpPr/>
-          <p:nvPr/>
-        </p:nvSpPr>
-        <p:spPr bwMode="auto">
-          <a:xfrm>
-            <a:off x="107504" y="6381328"/>
-            <a:ext cx="5328592" cy="388565"/>
-          </a:xfrm>
-          <a:prstGeom prst="rect">
-            <a:avLst/>
-          </a:prstGeom>
-          <a:solidFill>
-            <a:schemeClr val="bg1"/>
-          </a:solidFill>
-          <a:ln w="9525" cap="flat" cmpd="sng" algn="ctr">
-            <a:solidFill>
-              <a:schemeClr val="bg1"/>
-            </a:solidFill>
-            <a:prstDash val="solid"/>
-            <a:round/>
-            <a:headEnd type="none" w="med" len="med"/>
-            <a:tailEnd type="none" w="med" len="med"/>
-          </a:ln>
-          <a:effectLst/>
-        </p:spPr>
-        <p:txBody>
-          <a:bodyPr vert="horz" wrap="square" lIns="91440" tIns="45720" rIns="91440" bIns="45720" numCol="1" rtlCol="0" anchor="t" anchorCtr="0" compatLnSpc="1">
-            <a:prstTxWarp prst="textNoShape">
-              <a:avLst/>
-            </a:prstTxWarp>
-          </a:bodyPr>
-          <a:lstStyle/>
-          <a:p>
-            <a:pPr marL="0" marR="0" indent="0" algn="l" defTabSz="914400" rtl="0" eaLnBrk="1" fontAlgn="base" latinLnBrk="0" hangingPunct="1">
-              <a:lnSpc>
-                <a:spcPct val="100000"/>
-              </a:lnSpc>
-              <a:spcBef>
-                <a:spcPct val="0"/>
-              </a:spcBef>
-              <a:spcAft>
-                <a:spcPct val="0"/>
-              </a:spcAft>
-              <a:buClrTx/>
-              <a:buSzTx/>
-              <a:buFontTx/>
-              <a:buNone/>
-              <a:tabLst/>
-            </a:pPr>
-            <a:r>
-              <a:rPr kumimoji="1" lang="es-AR" sz="1400" b="0" i="0" u="none" strike="noStrike" cap="none" normalizeH="0" baseline="0" dirty="0">
-                <a:ln>
-                  <a:noFill/>
-                </a:ln>
-                <a:solidFill>
-                  <a:schemeClr val="tx1"/>
-                </a:solidFill>
-                <a:effectLst/>
-                <a:latin typeface="Verdana" pitchFamily="34" charset="0"/>
-                <a:ea typeface="ＭＳ Ｐゴシック" pitchFamily="50" charset="-128"/>
-              </a:rPr>
-              <a:t>Estimación ciega de parámetros acústicos de un recinto</a:t>
-            </a:r>
           </a:p>
         </p:txBody>
       </p:sp>
@@ -7177,6 +8333,163 @@
           </a:extLst>
         </p:spPr>
       </p:pic>
+      <p:sp>
+        <p:nvSpPr>
+          <p:cNvPr id="3" name="Rectángulo 2">
+            <a:extLst>
+              <a:ext uri="{FF2B5EF4-FFF2-40B4-BE49-F238E27FC236}">
+                <a16:creationId xmlns:a16="http://schemas.microsoft.com/office/drawing/2014/main" id="{E04CAB81-9904-3781-90C7-016480F2CF2B}"/>
+              </a:ext>
+            </a:extLst>
+          </p:cNvPr>
+          <p:cNvSpPr/>
+          <p:nvPr/>
+        </p:nvSpPr>
+        <p:spPr bwMode="auto">
+          <a:xfrm>
+            <a:off x="7236296" y="6381327"/>
+            <a:ext cx="1691680" cy="388565"/>
+          </a:xfrm>
+          <a:prstGeom prst="rect">
+            <a:avLst/>
+          </a:prstGeom>
+          <a:solidFill>
+            <a:schemeClr val="bg1"/>
+          </a:solidFill>
+          <a:ln w="9525" cap="flat" cmpd="sng" algn="ctr">
+            <a:solidFill>
+              <a:schemeClr val="bg1"/>
+            </a:solidFill>
+            <a:prstDash val="solid"/>
+            <a:round/>
+            <a:headEnd type="none" w="med" len="med"/>
+            <a:tailEnd type="none" w="med" len="med"/>
+          </a:ln>
+          <a:effectLst/>
+        </p:spPr>
+        <p:txBody>
+          <a:bodyPr vert="horz" wrap="square" lIns="91440" tIns="45720" rIns="91440" bIns="45720" numCol="1" rtlCol="0" anchor="t" anchorCtr="0" compatLnSpc="1">
+            <a:prstTxWarp prst="textNoShape">
+              <a:avLst/>
+            </a:prstTxWarp>
+          </a:bodyPr>
+          <a:lstStyle/>
+          <a:p>
+            <a:pPr marL="0" marR="0" indent="0" algn="r" defTabSz="914400" rtl="0" eaLnBrk="1" fontAlgn="base" latinLnBrk="0" hangingPunct="1">
+              <a:lnSpc>
+                <a:spcPct val="100000"/>
+              </a:lnSpc>
+              <a:spcBef>
+                <a:spcPct val="0"/>
+              </a:spcBef>
+              <a:spcAft>
+                <a:spcPct val="0"/>
+              </a:spcAft>
+              <a:buClrTx/>
+              <a:buSzTx/>
+              <a:buFontTx/>
+              <a:buNone/>
+              <a:tabLst/>
+            </a:pPr>
+            <a:r>
+              <a:rPr kumimoji="1" lang="es-AR" sz="1400" dirty="0">
+                <a:latin typeface="Verdana" pitchFamily="34" charset="0"/>
+                <a:ea typeface="ＭＳ Ｐゴシック" pitchFamily="50" charset="-128"/>
+              </a:rPr>
+              <a:t>6</a:t>
+            </a:r>
+            <a:r>
+              <a:rPr kumimoji="1" lang="es-AR" sz="1400" b="0" i="0" u="none" strike="noStrike" cap="none" normalizeH="0" baseline="0" dirty="0">
+                <a:ln>
+                  <a:noFill/>
+                </a:ln>
+                <a:solidFill>
+                  <a:schemeClr val="tx1"/>
+                </a:solidFill>
+                <a:effectLst/>
+                <a:latin typeface="Verdana" pitchFamily="34" charset="0"/>
+                <a:ea typeface="ＭＳ Ｐゴシック" pitchFamily="50" charset="-128"/>
+              </a:rPr>
+              <a:t>/15</a:t>
+            </a:r>
+          </a:p>
+        </p:txBody>
+      </p:sp>
+      <p:sp>
+        <p:nvSpPr>
+          <p:cNvPr id="4" name="Rectángulo 3">
+            <a:extLst>
+              <a:ext uri="{FF2B5EF4-FFF2-40B4-BE49-F238E27FC236}">
+                <a16:creationId xmlns:a16="http://schemas.microsoft.com/office/drawing/2014/main" id="{34CA8687-7107-2B87-4B68-F71DE22F2245}"/>
+              </a:ext>
+            </a:extLst>
+          </p:cNvPr>
+          <p:cNvSpPr/>
+          <p:nvPr/>
+        </p:nvSpPr>
+        <p:spPr bwMode="auto">
+          <a:xfrm>
+            <a:off x="107504" y="6381328"/>
+            <a:ext cx="7128792" cy="388565"/>
+          </a:xfrm>
+          <a:prstGeom prst="rect">
+            <a:avLst/>
+          </a:prstGeom>
+          <a:solidFill>
+            <a:schemeClr val="bg1"/>
+          </a:solidFill>
+          <a:ln w="9525" cap="flat" cmpd="sng" algn="ctr">
+            <a:solidFill>
+              <a:schemeClr val="bg1"/>
+            </a:solidFill>
+            <a:prstDash val="solid"/>
+            <a:round/>
+            <a:headEnd type="none" w="med" len="med"/>
+            <a:tailEnd type="none" w="med" len="med"/>
+          </a:ln>
+          <a:effectLst/>
+        </p:spPr>
+        <p:txBody>
+          <a:bodyPr vert="horz" wrap="square" lIns="91440" tIns="45720" rIns="91440" bIns="45720" numCol="1" rtlCol="0" anchor="t" anchorCtr="0" compatLnSpc="1">
+            <a:prstTxWarp prst="textNoShape">
+              <a:avLst/>
+            </a:prstTxWarp>
+          </a:bodyPr>
+          <a:lstStyle/>
+          <a:p>
+            <a:pPr marL="0" marR="0" indent="0" algn="l" defTabSz="914400" rtl="0" eaLnBrk="1" fontAlgn="base" latinLnBrk="0" hangingPunct="1">
+              <a:lnSpc>
+                <a:spcPct val="100000"/>
+              </a:lnSpc>
+              <a:spcBef>
+                <a:spcPct val="0"/>
+              </a:spcBef>
+              <a:spcAft>
+                <a:spcPct val="0"/>
+              </a:spcAft>
+              <a:buClrTx/>
+              <a:buSzTx/>
+              <a:buFontTx/>
+              <a:buNone/>
+              <a:tabLst/>
+            </a:pPr>
+            <a:r>
+              <a:rPr kumimoji="1" lang="es-AR" sz="1400" b="0" i="0" u="none" strike="noStrike" cap="none" normalizeH="0" baseline="0" dirty="0">
+                <a:ln>
+                  <a:noFill/>
+                </a:ln>
+                <a:solidFill>
+                  <a:schemeClr val="tx1"/>
+                </a:solidFill>
+                <a:effectLst/>
+                <a:latin typeface="Verdana" pitchFamily="34" charset="0"/>
+                <a:ea typeface="ＭＳ Ｐゴシック" pitchFamily="50" charset="-128"/>
+              </a:rPr>
+              <a:t>Maximiliano Ortiz - Estimación ciega de parámetros acústicos de un recinto</a:t>
+            </a:r>
+          </a:p>
+        </p:txBody>
+      </p:sp>
     </p:spTree>
     <p:extLst>
       <p:ext uri="{BB962C8B-B14F-4D97-AF65-F5344CB8AC3E}">
@@ -7190,7 +8503,7 @@
 </p:sld>
 </file>
 
-<file path=ppt/slides/slide13.xml><?xml version="1.0" encoding="utf-8"?>
+<file path=ppt/slides/slide14.xml><?xml version="1.0" encoding="utf-8"?>
 <p:sld xmlns:a="http://schemas.openxmlformats.org/drawingml/2006/main" xmlns:r="http://schemas.openxmlformats.org/officeDocument/2006/relationships" xmlns:p="http://schemas.openxmlformats.org/presentationml/2006/main">
   <p:cSld>
     <p:spTree>
@@ -8995,10 +10308,10 @@
       </p:graphicFrame>
       <p:sp>
         <p:nvSpPr>
-          <p:cNvPr id="17" name="Rectángulo 16">
+          <p:cNvPr id="4" name="Rectángulo 3">
             <a:extLst>
               <a:ext uri="{FF2B5EF4-FFF2-40B4-BE49-F238E27FC236}">
-                <a16:creationId xmlns:a16="http://schemas.microsoft.com/office/drawing/2014/main" id="{4F84EEF4-C408-F3EA-88B1-929CDA5BF7DE}"/>
+                <a16:creationId xmlns:a16="http://schemas.microsoft.com/office/drawing/2014/main" id="{26601290-9789-5E48-DB0E-7CA2DE0BEBED}"/>
               </a:ext>
             </a:extLst>
           </p:cNvPr>
@@ -9007,8 +10320,8 @@
         </p:nvSpPr>
         <p:spPr bwMode="auto">
           <a:xfrm>
-            <a:off x="7596336" y="6417331"/>
-            <a:ext cx="1152128" cy="316557"/>
+            <a:off x="7236296" y="6381327"/>
+            <a:ext cx="1691680" cy="388565"/>
           </a:xfrm>
           <a:prstGeom prst="rect">
             <a:avLst/>
@@ -9035,7 +10348,7 @@
           </a:bodyPr>
           <a:lstStyle/>
           <a:p>
-            <a:pPr marL="0" marR="0" indent="0" algn="l" defTabSz="914400" rtl="0" eaLnBrk="1" fontAlgn="base" latinLnBrk="0" hangingPunct="1">
+            <a:pPr marL="0" marR="0" indent="0" algn="r" defTabSz="914400" rtl="0" eaLnBrk="1" fontAlgn="base" latinLnBrk="0" hangingPunct="1">
               <a:lnSpc>
                 <a:spcPct val="100000"/>
               </a:lnSpc>
@@ -9056,7 +10369,7 @@
                 <a:latin typeface="Verdana" pitchFamily="34" charset="0"/>
                 <a:ea typeface="ＭＳ Ｐゴシック" pitchFamily="50" charset="-128"/>
               </a:rPr>
-              <a:t>13</a:t>
+              <a:t>6</a:t>
             </a:r>
             <a:r>
               <a:rPr kumimoji="1" lang="es-AR" sz="1400" b="0" i="0" u="none" strike="noStrike" cap="none" normalizeH="0" baseline="0" dirty="0">
@@ -9077,10 +10390,10 @@
       </p:sp>
       <p:sp>
         <p:nvSpPr>
-          <p:cNvPr id="9" name="Rectángulo 8">
+          <p:cNvPr id="5" name="Rectángulo 4">
             <a:extLst>
               <a:ext uri="{FF2B5EF4-FFF2-40B4-BE49-F238E27FC236}">
-                <a16:creationId xmlns:a16="http://schemas.microsoft.com/office/drawing/2014/main" id="{4FA0FD9C-715F-9271-B596-5D8A9C7E5A75}"/>
+                <a16:creationId xmlns:a16="http://schemas.microsoft.com/office/drawing/2014/main" id="{E48432E8-B56A-3708-CF3F-198F2D171E3F}"/>
               </a:ext>
             </a:extLst>
           </p:cNvPr>
@@ -9090,7 +10403,7 @@
         <p:spPr bwMode="auto">
           <a:xfrm>
             <a:off x="107504" y="6381328"/>
-            <a:ext cx="5328592" cy="388565"/>
+            <a:ext cx="7128792" cy="388565"/>
           </a:xfrm>
           <a:prstGeom prst="rect">
             <a:avLst/>
@@ -9145,7 +10458,7 @@
                 <a:latin typeface="Verdana" pitchFamily="34" charset="0"/>
                 <a:ea typeface="ＭＳ Ｐゴシック" pitchFamily="50" charset="-128"/>
               </a:rPr>
-              <a:t>Estimación ciega de parámetros acústicos de un recinto</a:t>
+              <a:t>Maximiliano Ortiz - Estimación ciega de parámetros acústicos de un recinto</a:t>
             </a:r>
           </a:p>
         </p:txBody>
@@ -9163,7 +10476,7 @@
 </p:sld>
 </file>
 
-<file path=ppt/slides/slide14.xml><?xml version="1.0" encoding="utf-8"?>
+<file path=ppt/slides/slide15.xml><?xml version="1.0" encoding="utf-8"?>
 <p:sld xmlns:a="http://schemas.openxmlformats.org/drawingml/2006/main" xmlns:r="http://schemas.openxmlformats.org/officeDocument/2006/relationships" xmlns:p="http://schemas.openxmlformats.org/presentationml/2006/main">
   <p:cSld>
     <p:spTree>
@@ -9383,10 +10696,10 @@
       </p:sp>
       <p:sp>
         <p:nvSpPr>
-          <p:cNvPr id="17" name="Rectángulo 16">
+          <p:cNvPr id="3" name="Rectángulo 2">
             <a:extLst>
               <a:ext uri="{FF2B5EF4-FFF2-40B4-BE49-F238E27FC236}">
-                <a16:creationId xmlns:a16="http://schemas.microsoft.com/office/drawing/2014/main" id="{4F84EEF4-C408-F3EA-88B1-929CDA5BF7DE}"/>
+                <a16:creationId xmlns:a16="http://schemas.microsoft.com/office/drawing/2014/main" id="{8E69783E-D3C9-58AC-AE36-12862C11C450}"/>
               </a:ext>
             </a:extLst>
           </p:cNvPr>
@@ -9395,8 +10708,8 @@
         </p:nvSpPr>
         <p:spPr bwMode="auto">
           <a:xfrm>
-            <a:off x="7596336" y="6417331"/>
-            <a:ext cx="1152128" cy="316557"/>
+            <a:off x="7236296" y="6381327"/>
+            <a:ext cx="1691680" cy="388565"/>
           </a:xfrm>
           <a:prstGeom prst="rect">
             <a:avLst/>
@@ -9423,7 +10736,7 @@
           </a:bodyPr>
           <a:lstStyle/>
           <a:p>
-            <a:pPr marL="0" marR="0" indent="0" algn="l" defTabSz="914400" rtl="0" eaLnBrk="1" fontAlgn="base" latinLnBrk="0" hangingPunct="1">
+            <a:pPr marL="0" marR="0" indent="0" algn="r" defTabSz="914400" rtl="0" eaLnBrk="1" fontAlgn="base" latinLnBrk="0" hangingPunct="1">
               <a:lnSpc>
                 <a:spcPct val="100000"/>
               </a:lnSpc>
@@ -9444,7 +10757,7 @@
                 <a:latin typeface="Verdana" pitchFamily="34" charset="0"/>
                 <a:ea typeface="ＭＳ Ｐゴシック" pitchFamily="50" charset="-128"/>
               </a:rPr>
-              <a:t>14</a:t>
+              <a:t>6</a:t>
             </a:r>
             <a:r>
               <a:rPr kumimoji="1" lang="es-AR" sz="1400" b="0" i="0" u="none" strike="noStrike" cap="none" normalizeH="0" baseline="0" dirty="0">
@@ -9465,10 +10778,10 @@
       </p:sp>
       <p:sp>
         <p:nvSpPr>
-          <p:cNvPr id="8" name="Rectángulo 7">
+          <p:cNvPr id="4" name="Rectángulo 3">
             <a:extLst>
               <a:ext uri="{FF2B5EF4-FFF2-40B4-BE49-F238E27FC236}">
-                <a16:creationId xmlns:a16="http://schemas.microsoft.com/office/drawing/2014/main" id="{D884D199-63AD-0D0F-E8DE-AADDB43500CB}"/>
+                <a16:creationId xmlns:a16="http://schemas.microsoft.com/office/drawing/2014/main" id="{AC501578-F6D4-97D9-2554-34E8BD1DE7E0}"/>
               </a:ext>
             </a:extLst>
           </p:cNvPr>
@@ -9478,7 +10791,7 @@
         <p:spPr bwMode="auto">
           <a:xfrm>
             <a:off x="107504" y="6381328"/>
-            <a:ext cx="5328592" cy="388565"/>
+            <a:ext cx="7128792" cy="388565"/>
           </a:xfrm>
           <a:prstGeom prst="rect">
             <a:avLst/>
@@ -9533,7 +10846,7 @@
                 <a:latin typeface="Verdana" pitchFamily="34" charset="0"/>
                 <a:ea typeface="ＭＳ Ｐゴシック" pitchFamily="50" charset="-128"/>
               </a:rPr>
-              <a:t>Estimación ciega de parámetros acústicos de un recinto</a:t>
+              <a:t>Maximiliano Ortiz - Estimación ciega de parámetros acústicos de un recinto</a:t>
             </a:r>
           </a:p>
         </p:txBody>
@@ -9551,7 +10864,7 @@
 </p:sld>
 </file>
 
-<file path=ppt/slides/slide15.xml><?xml version="1.0" encoding="utf-8"?>
+<file path=ppt/slides/slide16.xml><?xml version="1.0" encoding="utf-8"?>
 <p:sld xmlns:a="http://schemas.openxmlformats.org/drawingml/2006/main" xmlns:r="http://schemas.openxmlformats.org/officeDocument/2006/relationships" xmlns:p="http://schemas.openxmlformats.org/presentationml/2006/main">
   <p:cSld>
     <p:spTree>
@@ -9606,7 +10919,7 @@
             </a:pPr>
             <a:r>
               <a:rPr lang="es-ES" sz="4800" dirty="0"/>
-              <a:t>Muchas Gracias!</a:t>
+              <a:t>¡Muchas gracias por su atención!</a:t>
             </a:r>
           </a:p>
           <a:p>
@@ -9621,7 +10934,7 @@
             </a:pPr>
             <a:r>
               <a:rPr lang="es-ES" sz="3200" dirty="0"/>
-              <a:t>Alguna consulta?</a:t>
+              <a:t>¿Alguna consulta?</a:t>
             </a:r>
           </a:p>
           <a:p>
@@ -9636,7 +10949,7 @@
             </a:pPr>
             <a:r>
               <a:rPr lang="es-ES" sz="1800" dirty="0"/>
-              <a:t>Maxiaortiz22@gmail.com</a:t>
+              <a:t>maxiaortiz22@gmail.com</a:t>
             </a:r>
           </a:p>
         </p:txBody>
@@ -10212,10 +11525,10 @@
       </p:pic>
       <p:sp>
         <p:nvSpPr>
-          <p:cNvPr id="7" name="Rectángulo 6">
+          <p:cNvPr id="3" name="Rectángulo 2">
             <a:extLst>
               <a:ext uri="{FF2B5EF4-FFF2-40B4-BE49-F238E27FC236}">
-                <a16:creationId xmlns:a16="http://schemas.microsoft.com/office/drawing/2014/main" id="{051E5D3D-6639-2489-AC17-9938F9B994E6}"/>
+                <a16:creationId xmlns:a16="http://schemas.microsoft.com/office/drawing/2014/main" id="{F5A41ECF-230C-209F-3DA2-B83AD66E1F0C}"/>
               </a:ext>
             </a:extLst>
           </p:cNvPr>
@@ -10224,8 +11537,8 @@
         </p:nvSpPr>
         <p:spPr bwMode="auto">
           <a:xfrm>
-            <a:off x="7596336" y="6417331"/>
-            <a:ext cx="1152128" cy="316557"/>
+            <a:off x="7236296" y="6381327"/>
+            <a:ext cx="1691680" cy="388565"/>
           </a:xfrm>
           <a:prstGeom prst="rect">
             <a:avLst/>
@@ -10252,7 +11565,7 @@
           </a:bodyPr>
           <a:lstStyle/>
           <a:p>
-            <a:pPr marL="0" marR="0" indent="0" algn="l" defTabSz="914400" rtl="0" eaLnBrk="1" fontAlgn="base" latinLnBrk="0" hangingPunct="1">
+            <a:pPr marL="0" marR="0" indent="0" algn="r" defTabSz="914400" rtl="0" eaLnBrk="1" fontAlgn="base" latinLnBrk="0" hangingPunct="1">
               <a:lnSpc>
                 <a:spcPct val="100000"/>
               </a:lnSpc>
@@ -10269,6 +11582,13 @@
               <a:tabLst/>
             </a:pPr>
             <a:r>
+              <a:rPr kumimoji="1" lang="es-AR" sz="1400" dirty="0">
+                <a:latin typeface="Verdana" pitchFamily="34" charset="0"/>
+                <a:ea typeface="ＭＳ Ｐゴシック" pitchFamily="50" charset="-128"/>
+              </a:rPr>
+              <a:t>6</a:t>
+            </a:r>
+            <a:r>
               <a:rPr kumimoji="1" lang="es-AR" sz="1400" b="0" i="0" u="none" strike="noStrike" cap="none" normalizeH="0" baseline="0" dirty="0">
                 <a:ln>
                   <a:noFill/>
@@ -10280,17 +11600,17 @@
                 <a:latin typeface="Verdana" pitchFamily="34" charset="0"/>
                 <a:ea typeface="ＭＳ Ｐゴシック" pitchFamily="50" charset="-128"/>
               </a:rPr>
-              <a:t>2/15</a:t>
+              <a:t>/15</a:t>
             </a:r>
           </a:p>
         </p:txBody>
       </p:sp>
       <p:sp>
         <p:nvSpPr>
-          <p:cNvPr id="9" name="Rectángulo 8">
+          <p:cNvPr id="4" name="Rectángulo 3">
             <a:extLst>
               <a:ext uri="{FF2B5EF4-FFF2-40B4-BE49-F238E27FC236}">
-                <a16:creationId xmlns:a16="http://schemas.microsoft.com/office/drawing/2014/main" id="{8B99ACB9-3382-59A6-5F8E-7148AF552558}"/>
+                <a16:creationId xmlns:a16="http://schemas.microsoft.com/office/drawing/2014/main" id="{8CFAC941-47A7-BF96-4382-4004824ECE4F}"/>
               </a:ext>
             </a:extLst>
           </p:cNvPr>
@@ -10300,7 +11620,7 @@
         <p:spPr bwMode="auto">
           <a:xfrm>
             <a:off x="107504" y="6381328"/>
-            <a:ext cx="5328592" cy="388565"/>
+            <a:ext cx="7128792" cy="388565"/>
           </a:xfrm>
           <a:prstGeom prst="rect">
             <a:avLst/>
@@ -10355,7 +11675,7 @@
                 <a:latin typeface="Verdana" pitchFamily="34" charset="0"/>
                 <a:ea typeface="ＭＳ Ｐゴシック" pitchFamily="50" charset="-128"/>
               </a:rPr>
-              <a:t>Estimación ciega de parámetros acústicos de un recinto</a:t>
+              <a:t>Maximiliano Ortiz - Estimación ciega de parámetros acústicos de un recinto</a:t>
             </a:r>
           </a:p>
         </p:txBody>
@@ -10374,6 +11694,353 @@
 </file>
 
 <file path=ppt/slides/slide3.xml><?xml version="1.0" encoding="utf-8"?>
+<p:sld xmlns:a="http://schemas.openxmlformats.org/drawingml/2006/main" xmlns:r="http://schemas.openxmlformats.org/officeDocument/2006/relationships" xmlns:p="http://schemas.openxmlformats.org/presentationml/2006/main">
+  <p:cSld>
+    <p:spTree>
+      <p:nvGrpSpPr>
+        <p:cNvPr id="1" name=""/>
+        <p:cNvGrpSpPr/>
+        <p:nvPr/>
+      </p:nvGrpSpPr>
+      <p:grpSpPr>
+        <a:xfrm>
+          <a:off x="0" y="0"/>
+          <a:ext cx="0" cy="0"/>
+          <a:chOff x="0" y="0"/>
+          <a:chExt cx="0" cy="0"/>
+        </a:xfrm>
+      </p:grpSpPr>
+      <p:sp>
+        <p:nvSpPr>
+          <p:cNvPr id="14" name="13 Marcador de contenido"/>
+          <p:cNvSpPr>
+            <a:spLocks noGrp="1"/>
+          </p:cNvSpPr>
+          <p:nvPr>
+            <p:ph idx="1"/>
+          </p:nvPr>
+        </p:nvSpPr>
+        <p:spPr/>
+        <p:txBody>
+          <a:bodyPr/>
+          <a:lstStyle/>
+          <a:p>
+            <a:r>
+              <a:rPr lang="es-ES" dirty="0"/>
+              <a:t>Parámetros acústicos:</a:t>
+            </a:r>
+          </a:p>
+          <a:p>
+            <a:pPr lvl="1"/>
+            <a:r>
+              <a:rPr lang="es-ES" dirty="0"/>
+              <a:t>Brindan </a:t>
+            </a:r>
+            <a:r>
+              <a:rPr lang="es-ES" b="1" dirty="0"/>
+              <a:t>información objetiva</a:t>
+            </a:r>
+            <a:r>
+              <a:rPr lang="es-ES" dirty="0"/>
+              <a:t> sobre las </a:t>
+            </a:r>
+            <a:r>
+              <a:rPr lang="es-ES" b="1" dirty="0"/>
+              <a:t>características acústicas </a:t>
+            </a:r>
+            <a:r>
+              <a:rPr lang="es-ES" dirty="0"/>
+              <a:t>de un recinto.</a:t>
+            </a:r>
+          </a:p>
+          <a:p>
+            <a:pPr lvl="1"/>
+            <a:r>
+              <a:rPr lang="es-ES" dirty="0"/>
+              <a:t>Dependen de la obtención de la </a:t>
+            </a:r>
+            <a:r>
+              <a:rPr lang="es-ES" b="1" dirty="0"/>
+              <a:t>respuesta al impulso de la sala (RIR)</a:t>
+            </a:r>
+          </a:p>
+          <a:p>
+            <a:pPr lvl="1"/>
+            <a:r>
+              <a:rPr lang="es-ES" dirty="0"/>
+              <a:t>Obtener una RIR puede ser muy </a:t>
+            </a:r>
+            <a:r>
+              <a:rPr lang="es-ES" b="1" dirty="0"/>
+              <a:t>costoso</a:t>
+            </a:r>
+            <a:r>
+              <a:rPr lang="es-ES" dirty="0"/>
+              <a:t> y no siempre es posible su generación.</a:t>
+            </a:r>
+          </a:p>
+          <a:p>
+            <a:pPr lvl="1"/>
+            <a:r>
+              <a:rPr lang="es-ES" dirty="0"/>
+              <a:t>La medición de la </a:t>
+            </a:r>
+            <a:r>
+              <a:rPr lang="es-ES" b="1" dirty="0"/>
+              <a:t>RIR</a:t>
+            </a:r>
+            <a:r>
+              <a:rPr lang="es-ES" dirty="0"/>
+              <a:t> se ve fuertemente </a:t>
+            </a:r>
+            <a:r>
+              <a:rPr lang="es-ES" b="1" dirty="0"/>
+              <a:t>afectada</a:t>
+            </a:r>
+            <a:r>
+              <a:rPr lang="es-ES" dirty="0"/>
+              <a:t> por las condiciones de </a:t>
+            </a:r>
+            <a:r>
+              <a:rPr lang="es-ES" b="1" dirty="0"/>
+              <a:t>ruido de fondo </a:t>
+            </a:r>
+            <a:r>
+              <a:rPr lang="es-ES" dirty="0"/>
+              <a:t>en el recinto.</a:t>
+            </a:r>
+          </a:p>
+        </p:txBody>
+      </p:sp>
+      <p:sp>
+        <p:nvSpPr>
+          <p:cNvPr id="13" name="12 Título"/>
+          <p:cNvSpPr>
+            <a:spLocks noGrp="1"/>
+          </p:cNvSpPr>
+          <p:nvPr>
+            <p:ph type="title"/>
+          </p:nvPr>
+        </p:nvSpPr>
+        <p:spPr/>
+        <p:txBody>
+          <a:bodyPr/>
+          <a:lstStyle/>
+          <a:p>
+            <a:r>
+              <a:rPr lang="es-ES" dirty="0"/>
+              <a:t>Problemática</a:t>
+            </a:r>
+          </a:p>
+        </p:txBody>
+      </p:sp>
+      <p:sp>
+        <p:nvSpPr>
+          <p:cNvPr id="3" name="Rectángulo 2">
+            <a:extLst>
+              <a:ext uri="{FF2B5EF4-FFF2-40B4-BE49-F238E27FC236}">
+                <a16:creationId xmlns:a16="http://schemas.microsoft.com/office/drawing/2014/main" id="{F5A41ECF-230C-209F-3DA2-B83AD66E1F0C}"/>
+              </a:ext>
+            </a:extLst>
+          </p:cNvPr>
+          <p:cNvSpPr/>
+          <p:nvPr/>
+        </p:nvSpPr>
+        <p:spPr bwMode="auto">
+          <a:xfrm>
+            <a:off x="7236296" y="6381327"/>
+            <a:ext cx="1691680" cy="388565"/>
+          </a:xfrm>
+          <a:prstGeom prst="rect">
+            <a:avLst/>
+          </a:prstGeom>
+          <a:solidFill>
+            <a:schemeClr val="bg1"/>
+          </a:solidFill>
+          <a:ln w="9525" cap="flat" cmpd="sng" algn="ctr">
+            <a:solidFill>
+              <a:schemeClr val="bg1"/>
+            </a:solidFill>
+            <a:prstDash val="solid"/>
+            <a:round/>
+            <a:headEnd type="none" w="med" len="med"/>
+            <a:tailEnd type="none" w="med" len="med"/>
+          </a:ln>
+          <a:effectLst/>
+        </p:spPr>
+        <p:txBody>
+          <a:bodyPr vert="horz" wrap="square" lIns="91440" tIns="45720" rIns="91440" bIns="45720" numCol="1" rtlCol="0" anchor="t" anchorCtr="0" compatLnSpc="1">
+            <a:prstTxWarp prst="textNoShape">
+              <a:avLst/>
+            </a:prstTxWarp>
+          </a:bodyPr>
+          <a:lstStyle/>
+          <a:p>
+            <a:pPr marL="0" marR="0" indent="0" algn="r" defTabSz="914400" rtl="0" eaLnBrk="1" fontAlgn="base" latinLnBrk="0" hangingPunct="1">
+              <a:lnSpc>
+                <a:spcPct val="100000"/>
+              </a:lnSpc>
+              <a:spcBef>
+                <a:spcPct val="0"/>
+              </a:spcBef>
+              <a:spcAft>
+                <a:spcPct val="0"/>
+              </a:spcAft>
+              <a:buClrTx/>
+              <a:buSzTx/>
+              <a:buFontTx/>
+              <a:buNone/>
+              <a:tabLst/>
+            </a:pPr>
+            <a:r>
+              <a:rPr kumimoji="1" lang="es-AR" sz="1400" dirty="0">
+                <a:latin typeface="Verdana" pitchFamily="34" charset="0"/>
+                <a:ea typeface="ＭＳ Ｐゴシック" pitchFamily="50" charset="-128"/>
+              </a:rPr>
+              <a:t>6</a:t>
+            </a:r>
+            <a:r>
+              <a:rPr kumimoji="1" lang="es-AR" sz="1400" b="0" i="0" u="none" strike="noStrike" cap="none" normalizeH="0" baseline="0" dirty="0">
+                <a:ln>
+                  <a:noFill/>
+                </a:ln>
+                <a:solidFill>
+                  <a:schemeClr val="tx1"/>
+                </a:solidFill>
+                <a:effectLst/>
+                <a:latin typeface="Verdana" pitchFamily="34" charset="0"/>
+                <a:ea typeface="ＭＳ Ｐゴシック" pitchFamily="50" charset="-128"/>
+              </a:rPr>
+              <a:t>/15</a:t>
+            </a:r>
+          </a:p>
+        </p:txBody>
+      </p:sp>
+      <p:sp>
+        <p:nvSpPr>
+          <p:cNvPr id="4" name="Rectángulo 3">
+            <a:extLst>
+              <a:ext uri="{FF2B5EF4-FFF2-40B4-BE49-F238E27FC236}">
+                <a16:creationId xmlns:a16="http://schemas.microsoft.com/office/drawing/2014/main" id="{8CFAC941-47A7-BF96-4382-4004824ECE4F}"/>
+              </a:ext>
+            </a:extLst>
+          </p:cNvPr>
+          <p:cNvSpPr/>
+          <p:nvPr/>
+        </p:nvSpPr>
+        <p:spPr bwMode="auto">
+          <a:xfrm>
+            <a:off x="107504" y="6381328"/>
+            <a:ext cx="7128792" cy="388565"/>
+          </a:xfrm>
+          <a:prstGeom prst="rect">
+            <a:avLst/>
+          </a:prstGeom>
+          <a:solidFill>
+            <a:schemeClr val="bg1"/>
+          </a:solidFill>
+          <a:ln w="9525" cap="flat" cmpd="sng" algn="ctr">
+            <a:solidFill>
+              <a:schemeClr val="bg1"/>
+            </a:solidFill>
+            <a:prstDash val="solid"/>
+            <a:round/>
+            <a:headEnd type="none" w="med" len="med"/>
+            <a:tailEnd type="none" w="med" len="med"/>
+          </a:ln>
+          <a:effectLst/>
+        </p:spPr>
+        <p:txBody>
+          <a:bodyPr vert="horz" wrap="square" lIns="91440" tIns="45720" rIns="91440" bIns="45720" numCol="1" rtlCol="0" anchor="t" anchorCtr="0" compatLnSpc="1">
+            <a:prstTxWarp prst="textNoShape">
+              <a:avLst/>
+            </a:prstTxWarp>
+          </a:bodyPr>
+          <a:lstStyle/>
+          <a:p>
+            <a:pPr marL="0" marR="0" indent="0" algn="l" defTabSz="914400" rtl="0" eaLnBrk="1" fontAlgn="base" latinLnBrk="0" hangingPunct="1">
+              <a:lnSpc>
+                <a:spcPct val="100000"/>
+              </a:lnSpc>
+              <a:spcBef>
+                <a:spcPct val="0"/>
+              </a:spcBef>
+              <a:spcAft>
+                <a:spcPct val="0"/>
+              </a:spcAft>
+              <a:buClrTx/>
+              <a:buSzTx/>
+              <a:buFontTx/>
+              <a:buNone/>
+              <a:tabLst/>
+            </a:pPr>
+            <a:r>
+              <a:rPr kumimoji="1" lang="es-AR" sz="1400" b="0" i="0" u="none" strike="noStrike" cap="none" normalizeH="0" baseline="0" dirty="0">
+                <a:ln>
+                  <a:noFill/>
+                </a:ln>
+                <a:solidFill>
+                  <a:schemeClr val="tx1"/>
+                </a:solidFill>
+                <a:effectLst/>
+                <a:latin typeface="Verdana" pitchFamily="34" charset="0"/>
+                <a:ea typeface="ＭＳ Ｐゴシック" pitchFamily="50" charset="-128"/>
+              </a:rPr>
+              <a:t>Maximiliano Ortiz - Estimación ciega de parámetros acústicos de un recinto</a:t>
+            </a:r>
+          </a:p>
+        </p:txBody>
+      </p:sp>
+      <p:pic>
+        <p:nvPicPr>
+          <p:cNvPr id="11" name="Imagen 10" descr="Patrón de fondo">
+            <a:extLst>
+              <a:ext uri="{FF2B5EF4-FFF2-40B4-BE49-F238E27FC236}">
+                <a16:creationId xmlns:a16="http://schemas.microsoft.com/office/drawing/2014/main" id="{6DA58D7C-13D7-7A7F-7DDB-F92D7D3CCAE3}"/>
+              </a:ext>
+            </a:extLst>
+          </p:cNvPr>
+          <p:cNvPicPr>
+            <a:picLocks noChangeAspect="1"/>
+          </p:cNvPicPr>
+          <p:nvPr/>
+        </p:nvPicPr>
+        <p:blipFill>
+          <a:blip r:embed="rId2">
+            <a:extLst>
+              <a:ext uri="{28A0092B-C50C-407E-A947-70E740481C1C}">
+                <a14:useLocalDpi xmlns:a14="http://schemas.microsoft.com/office/drawing/2010/main" val="0"/>
+              </a:ext>
+            </a:extLst>
+          </a:blip>
+          <a:stretch>
+            <a:fillRect/>
+          </a:stretch>
+        </p:blipFill>
+        <p:spPr>
+          <a:xfrm>
+            <a:off x="1524000" y="3537012"/>
+            <a:ext cx="2903984" cy="2177988"/>
+          </a:xfrm>
+          <a:prstGeom prst="rect">
+            <a:avLst/>
+          </a:prstGeom>
+        </p:spPr>
+      </p:pic>
+    </p:spTree>
+    <p:extLst>
+      <p:ext uri="{BB962C8B-B14F-4D97-AF65-F5344CB8AC3E}">
+        <p14:creationId xmlns:p14="http://schemas.microsoft.com/office/powerpoint/2010/main" val="1767026035"/>
+      </p:ext>
+    </p:extLst>
+  </p:cSld>
+  <p:clrMapOvr>
+    <a:masterClrMapping/>
+  </p:clrMapOvr>
+</p:sld>
+</file>
+
+<file path=ppt/slides/slide4.xml><?xml version="1.0" encoding="utf-8"?>
 <p:sld xmlns:a="http://schemas.openxmlformats.org/drawingml/2006/main" xmlns:r="http://schemas.openxmlformats.org/officeDocument/2006/relationships" xmlns:p="http://schemas.openxmlformats.org/presentationml/2006/main">
   <p:cSld>
     <p:spTree>
@@ -10708,10 +12375,10 @@
       </p:cxnSp>
       <p:sp>
         <p:nvSpPr>
-          <p:cNvPr id="20" name="Rectángulo 19">
+          <p:cNvPr id="3" name="Rectángulo 2">
             <a:extLst>
               <a:ext uri="{FF2B5EF4-FFF2-40B4-BE49-F238E27FC236}">
-                <a16:creationId xmlns:a16="http://schemas.microsoft.com/office/drawing/2014/main" id="{F59E356E-FAC8-BD0A-E141-4512CAE7BF12}"/>
+                <a16:creationId xmlns:a16="http://schemas.microsoft.com/office/drawing/2014/main" id="{8F8AD177-5EFD-992B-8766-BA58EEB4C747}"/>
               </a:ext>
             </a:extLst>
           </p:cNvPr>
@@ -10720,8 +12387,8 @@
         </p:nvSpPr>
         <p:spPr bwMode="auto">
           <a:xfrm>
-            <a:off x="7596336" y="6417331"/>
-            <a:ext cx="1152128" cy="316557"/>
+            <a:off x="7236296" y="6381327"/>
+            <a:ext cx="1691680" cy="388565"/>
           </a:xfrm>
           <a:prstGeom prst="rect">
             <a:avLst/>
@@ -10748,7 +12415,7 @@
           </a:bodyPr>
           <a:lstStyle/>
           <a:p>
-            <a:pPr marL="0" marR="0" indent="0" algn="l" defTabSz="914400" rtl="0" eaLnBrk="1" fontAlgn="base" latinLnBrk="0" hangingPunct="1">
+            <a:pPr marL="0" marR="0" indent="0" algn="r" defTabSz="914400" rtl="0" eaLnBrk="1" fontAlgn="base" latinLnBrk="0" hangingPunct="1">
               <a:lnSpc>
                 <a:spcPct val="100000"/>
               </a:lnSpc>
@@ -10769,7 +12436,7 @@
                 <a:latin typeface="Verdana" pitchFamily="34" charset="0"/>
                 <a:ea typeface="ＭＳ Ｐゴシック" pitchFamily="50" charset="-128"/>
               </a:rPr>
-              <a:t>3</a:t>
+              <a:t>6</a:t>
             </a:r>
             <a:r>
               <a:rPr kumimoji="1" lang="es-AR" sz="1400" b="0" i="0" u="none" strike="noStrike" cap="none" normalizeH="0" baseline="0" dirty="0">
@@ -10790,10 +12457,10 @@
       </p:sp>
       <p:sp>
         <p:nvSpPr>
-          <p:cNvPr id="15" name="Rectángulo 14">
+          <p:cNvPr id="5" name="Rectángulo 4">
             <a:extLst>
               <a:ext uri="{FF2B5EF4-FFF2-40B4-BE49-F238E27FC236}">
-                <a16:creationId xmlns:a16="http://schemas.microsoft.com/office/drawing/2014/main" id="{F95FB158-6BB6-DF5F-3B3C-18B73D1EAE17}"/>
+                <a16:creationId xmlns:a16="http://schemas.microsoft.com/office/drawing/2014/main" id="{6B27F31F-6887-F216-0B44-558D23210806}"/>
               </a:ext>
             </a:extLst>
           </p:cNvPr>
@@ -10803,7 +12470,7 @@
         <p:spPr bwMode="auto">
           <a:xfrm>
             <a:off x="107504" y="6381328"/>
-            <a:ext cx="5328592" cy="388565"/>
+            <a:ext cx="7128792" cy="388565"/>
           </a:xfrm>
           <a:prstGeom prst="rect">
             <a:avLst/>
@@ -10858,7 +12525,7 @@
                 <a:latin typeface="Verdana" pitchFamily="34" charset="0"/>
                 <a:ea typeface="ＭＳ Ｐゴシック" pitchFamily="50" charset="-128"/>
               </a:rPr>
-              <a:t>Estimación ciega de parámetros acústicos de un recinto</a:t>
+              <a:t>Maximiliano Ortiz - Estimación ciega de parámetros acústicos de un recinto</a:t>
             </a:r>
           </a:p>
         </p:txBody>
@@ -10876,7 +12543,7 @@
 </p:sld>
 </file>
 
-<file path=ppt/slides/slide4.xml><?xml version="1.0" encoding="utf-8"?>
+<file path=ppt/slides/slide5.xml><?xml version="1.0" encoding="utf-8"?>
 <p:sld xmlns:a="http://schemas.openxmlformats.org/drawingml/2006/main" xmlns:r="http://schemas.openxmlformats.org/officeDocument/2006/relationships" xmlns:p="http://schemas.openxmlformats.org/presentationml/2006/main">
   <p:cSld>
     <p:spTree>
@@ -11014,88 +12681,6 @@
           <a:lstStyle/>
           <a:p>
             <a:endParaRPr lang="es-AR"/>
-          </a:p>
-        </p:txBody>
-      </p:sp>
-      <p:sp>
-        <p:nvSpPr>
-          <p:cNvPr id="16" name="Rectángulo 15">
-            <a:extLst>
-              <a:ext uri="{FF2B5EF4-FFF2-40B4-BE49-F238E27FC236}">
-                <a16:creationId xmlns:a16="http://schemas.microsoft.com/office/drawing/2014/main" id="{D7FAEDE8-0D47-BC3B-E963-F50DD44F6CD3}"/>
-              </a:ext>
-            </a:extLst>
-          </p:cNvPr>
-          <p:cNvSpPr/>
-          <p:nvPr/>
-        </p:nvSpPr>
-        <p:spPr bwMode="auto">
-          <a:xfrm>
-            <a:off x="7596336" y="6417331"/>
-            <a:ext cx="1152128" cy="316557"/>
-          </a:xfrm>
-          <a:prstGeom prst="rect">
-            <a:avLst/>
-          </a:prstGeom>
-          <a:solidFill>
-            <a:schemeClr val="bg1"/>
-          </a:solidFill>
-          <a:ln w="9525" cap="flat" cmpd="sng" algn="ctr">
-            <a:solidFill>
-              <a:schemeClr val="bg1"/>
-            </a:solidFill>
-            <a:prstDash val="solid"/>
-            <a:round/>
-            <a:headEnd type="none" w="med" len="med"/>
-            <a:tailEnd type="none" w="med" len="med"/>
-          </a:ln>
-          <a:effectLst/>
-        </p:spPr>
-        <p:txBody>
-          <a:bodyPr vert="horz" wrap="square" lIns="91440" tIns="45720" rIns="91440" bIns="45720" numCol="1" rtlCol="0" anchor="t" anchorCtr="0" compatLnSpc="1">
-            <a:prstTxWarp prst="textNoShape">
-              <a:avLst/>
-            </a:prstTxWarp>
-          </a:bodyPr>
-          <a:lstStyle/>
-          <a:p>
-            <a:pPr marL="0" marR="0" indent="0" algn="l" defTabSz="914400" rtl="0" eaLnBrk="1" fontAlgn="base" latinLnBrk="0" hangingPunct="1">
-              <a:lnSpc>
-                <a:spcPct val="100000"/>
-              </a:lnSpc>
-              <a:spcBef>
-                <a:spcPct val="0"/>
-              </a:spcBef>
-              <a:spcAft>
-                <a:spcPct val="0"/>
-              </a:spcAft>
-              <a:buClrTx/>
-              <a:buSzTx/>
-              <a:buFontTx/>
-              <a:buNone/>
-              <a:tabLst/>
-            </a:pPr>
-            <a:r>
-              <a:rPr kumimoji="1" lang="es-AR" sz="1400" dirty="0">
-                <a:latin typeface="Verdana" pitchFamily="34" charset="0"/>
-                <a:ea typeface="ＭＳ Ｐゴシック" pitchFamily="50" charset="-128"/>
-              </a:rPr>
-              <a:t>4</a:t>
-            </a:r>
-            <a:r>
-              <a:rPr kumimoji="1" lang="es-AR" sz="1400" b="0" i="0" u="none" strike="noStrike" cap="none" normalizeH="0" baseline="0" dirty="0">
-                <a:ln>
-                  <a:noFill/>
-                </a:ln>
-                <a:solidFill>
-                  <a:schemeClr val="tx1"/>
-                </a:solidFill>
-                <a:effectLst/>
-                <a:latin typeface="Verdana" pitchFamily="34" charset="0"/>
-                <a:ea typeface="ＭＳ Ｐゴシック" pitchFamily="50" charset="-128"/>
-              </a:rPr>
-              <a:t>/15</a:t>
-            </a:r>
           </a:p>
         </p:txBody>
       </p:sp>
@@ -11137,10 +12722,10 @@
       </p:pic>
       <p:sp>
         <p:nvSpPr>
-          <p:cNvPr id="8" name="Rectángulo 7">
+          <p:cNvPr id="3" name="Rectángulo 2">
             <a:extLst>
               <a:ext uri="{FF2B5EF4-FFF2-40B4-BE49-F238E27FC236}">
-                <a16:creationId xmlns:a16="http://schemas.microsoft.com/office/drawing/2014/main" id="{70951CF3-5C7B-9AFC-0443-8D740B0B3655}"/>
+                <a16:creationId xmlns:a16="http://schemas.microsoft.com/office/drawing/2014/main" id="{7DB21898-0A8F-CC20-5C02-105E7FCCD5A6}"/>
               </a:ext>
             </a:extLst>
           </p:cNvPr>
@@ -11149,8 +12734,8 @@
         </p:nvSpPr>
         <p:spPr bwMode="auto">
           <a:xfrm>
-            <a:off x="107504" y="6381328"/>
-            <a:ext cx="5328592" cy="388565"/>
+            <a:off x="7236296" y="6381327"/>
+            <a:ext cx="1691680" cy="388565"/>
           </a:xfrm>
           <a:prstGeom prst="rect">
             <a:avLst/>
@@ -11177,6 +12762,88 @@
           </a:bodyPr>
           <a:lstStyle/>
           <a:p>
+            <a:pPr marL="0" marR="0" indent="0" algn="r" defTabSz="914400" rtl="0" eaLnBrk="1" fontAlgn="base" latinLnBrk="0" hangingPunct="1">
+              <a:lnSpc>
+                <a:spcPct val="100000"/>
+              </a:lnSpc>
+              <a:spcBef>
+                <a:spcPct val="0"/>
+              </a:spcBef>
+              <a:spcAft>
+                <a:spcPct val="0"/>
+              </a:spcAft>
+              <a:buClrTx/>
+              <a:buSzTx/>
+              <a:buFontTx/>
+              <a:buNone/>
+              <a:tabLst/>
+            </a:pPr>
+            <a:r>
+              <a:rPr kumimoji="1" lang="es-AR" sz="1400" dirty="0">
+                <a:latin typeface="Verdana" pitchFamily="34" charset="0"/>
+                <a:ea typeface="ＭＳ Ｐゴシック" pitchFamily="50" charset="-128"/>
+              </a:rPr>
+              <a:t>6</a:t>
+            </a:r>
+            <a:r>
+              <a:rPr kumimoji="1" lang="es-AR" sz="1400" b="0" i="0" u="none" strike="noStrike" cap="none" normalizeH="0" baseline="0" dirty="0">
+                <a:ln>
+                  <a:noFill/>
+                </a:ln>
+                <a:solidFill>
+                  <a:schemeClr val="tx1"/>
+                </a:solidFill>
+                <a:effectLst/>
+                <a:latin typeface="Verdana" pitchFamily="34" charset="0"/>
+                <a:ea typeface="ＭＳ Ｐゴシック" pitchFamily="50" charset="-128"/>
+              </a:rPr>
+              <a:t>/15</a:t>
+            </a:r>
+          </a:p>
+        </p:txBody>
+      </p:sp>
+      <p:sp>
+        <p:nvSpPr>
+          <p:cNvPr id="5" name="Rectángulo 4">
+            <a:extLst>
+              <a:ext uri="{FF2B5EF4-FFF2-40B4-BE49-F238E27FC236}">
+                <a16:creationId xmlns:a16="http://schemas.microsoft.com/office/drawing/2014/main" id="{F8B65A9B-709B-E2C9-13E0-5E1C822F32B2}"/>
+              </a:ext>
+            </a:extLst>
+          </p:cNvPr>
+          <p:cNvSpPr/>
+          <p:nvPr/>
+        </p:nvSpPr>
+        <p:spPr bwMode="auto">
+          <a:xfrm>
+            <a:off x="107504" y="6381328"/>
+            <a:ext cx="7128792" cy="388565"/>
+          </a:xfrm>
+          <a:prstGeom prst="rect">
+            <a:avLst/>
+          </a:prstGeom>
+          <a:solidFill>
+            <a:schemeClr val="bg1"/>
+          </a:solidFill>
+          <a:ln w="9525" cap="flat" cmpd="sng" algn="ctr">
+            <a:solidFill>
+              <a:schemeClr val="bg1"/>
+            </a:solidFill>
+            <a:prstDash val="solid"/>
+            <a:round/>
+            <a:headEnd type="none" w="med" len="med"/>
+            <a:tailEnd type="none" w="med" len="med"/>
+          </a:ln>
+          <a:effectLst/>
+        </p:spPr>
+        <p:txBody>
+          <a:bodyPr vert="horz" wrap="square" lIns="91440" tIns="45720" rIns="91440" bIns="45720" numCol="1" rtlCol="0" anchor="t" anchorCtr="0" compatLnSpc="1">
+            <a:prstTxWarp prst="textNoShape">
+              <a:avLst/>
+            </a:prstTxWarp>
+          </a:bodyPr>
+          <a:lstStyle/>
+          <a:p>
             <a:pPr marL="0" marR="0" indent="0" algn="l" defTabSz="914400" rtl="0" eaLnBrk="1" fontAlgn="base" latinLnBrk="0" hangingPunct="1">
               <a:lnSpc>
                 <a:spcPct val="100000"/>
@@ -11205,7 +12872,7 @@
                 <a:latin typeface="Verdana" pitchFamily="34" charset="0"/>
                 <a:ea typeface="ＭＳ Ｐゴシック" pitchFamily="50" charset="-128"/>
               </a:rPr>
-              <a:t>Estimación ciega de parámetros acústicos de un recinto</a:t>
+              <a:t>Maximiliano Ortiz - Estimación ciega de parámetros acústicos de un recinto</a:t>
             </a:r>
           </a:p>
         </p:txBody>
@@ -11223,7 +12890,7 @@
 </p:sld>
 </file>
 
-<file path=ppt/slides/slide5.xml><?xml version="1.0" encoding="utf-8"?>
+<file path=ppt/slides/slide6.xml><?xml version="1.0" encoding="utf-8"?>
 <p:sld xmlns:a="http://schemas.openxmlformats.org/drawingml/2006/main" xmlns:r="http://schemas.openxmlformats.org/officeDocument/2006/relationships" xmlns:p="http://schemas.openxmlformats.org/presentationml/2006/main">
   <p:cSld>
     <p:spTree>
@@ -11326,163 +12993,6 @@
           <a:lstStyle/>
           <a:p>
             <a:endParaRPr lang="es-AR"/>
-          </a:p>
-        </p:txBody>
-      </p:sp>
-      <p:sp>
-        <p:nvSpPr>
-          <p:cNvPr id="8" name="Rectángulo 7">
-            <a:extLst>
-              <a:ext uri="{FF2B5EF4-FFF2-40B4-BE49-F238E27FC236}">
-                <a16:creationId xmlns:a16="http://schemas.microsoft.com/office/drawing/2014/main" id="{45F71739-7BA5-BC8E-8FDD-68ABE0BA3EA0}"/>
-              </a:ext>
-            </a:extLst>
-          </p:cNvPr>
-          <p:cNvSpPr/>
-          <p:nvPr/>
-        </p:nvSpPr>
-        <p:spPr bwMode="auto">
-          <a:xfrm>
-            <a:off x="107504" y="6381328"/>
-            <a:ext cx="5328592" cy="388565"/>
-          </a:xfrm>
-          <a:prstGeom prst="rect">
-            <a:avLst/>
-          </a:prstGeom>
-          <a:solidFill>
-            <a:schemeClr val="bg1"/>
-          </a:solidFill>
-          <a:ln w="9525" cap="flat" cmpd="sng" algn="ctr">
-            <a:solidFill>
-              <a:schemeClr val="bg1"/>
-            </a:solidFill>
-            <a:prstDash val="solid"/>
-            <a:round/>
-            <a:headEnd type="none" w="med" len="med"/>
-            <a:tailEnd type="none" w="med" len="med"/>
-          </a:ln>
-          <a:effectLst/>
-        </p:spPr>
-        <p:txBody>
-          <a:bodyPr vert="horz" wrap="square" lIns="91440" tIns="45720" rIns="91440" bIns="45720" numCol="1" rtlCol="0" anchor="t" anchorCtr="0" compatLnSpc="1">
-            <a:prstTxWarp prst="textNoShape">
-              <a:avLst/>
-            </a:prstTxWarp>
-          </a:bodyPr>
-          <a:lstStyle/>
-          <a:p>
-            <a:pPr marL="0" marR="0" indent="0" algn="l" defTabSz="914400" rtl="0" eaLnBrk="1" fontAlgn="base" latinLnBrk="0" hangingPunct="1">
-              <a:lnSpc>
-                <a:spcPct val="100000"/>
-              </a:lnSpc>
-              <a:spcBef>
-                <a:spcPct val="0"/>
-              </a:spcBef>
-              <a:spcAft>
-                <a:spcPct val="0"/>
-              </a:spcAft>
-              <a:buClrTx/>
-              <a:buSzTx/>
-              <a:buFontTx/>
-              <a:buNone/>
-              <a:tabLst/>
-            </a:pPr>
-            <a:r>
-              <a:rPr kumimoji="1" lang="es-AR" sz="1400" b="0" i="0" u="none" strike="noStrike" cap="none" normalizeH="0" baseline="0" dirty="0">
-                <a:ln>
-                  <a:noFill/>
-                </a:ln>
-                <a:solidFill>
-                  <a:schemeClr val="tx1"/>
-                </a:solidFill>
-                <a:effectLst/>
-                <a:latin typeface="Verdana" pitchFamily="34" charset="0"/>
-                <a:ea typeface="ＭＳ Ｐゴシック" pitchFamily="50" charset="-128"/>
-              </a:rPr>
-              <a:t>Estimación ciega de parámetros acústicos de un recinto</a:t>
-            </a:r>
-          </a:p>
-        </p:txBody>
-      </p:sp>
-      <p:sp>
-        <p:nvSpPr>
-          <p:cNvPr id="9" name="Rectángulo 8">
-            <a:extLst>
-              <a:ext uri="{FF2B5EF4-FFF2-40B4-BE49-F238E27FC236}">
-                <a16:creationId xmlns:a16="http://schemas.microsoft.com/office/drawing/2014/main" id="{1BD7927E-5C50-AC36-2209-35F0904483D7}"/>
-              </a:ext>
-            </a:extLst>
-          </p:cNvPr>
-          <p:cNvSpPr/>
-          <p:nvPr/>
-        </p:nvSpPr>
-        <p:spPr bwMode="auto">
-          <a:xfrm>
-            <a:off x="7596336" y="6417331"/>
-            <a:ext cx="1152128" cy="316557"/>
-          </a:xfrm>
-          <a:prstGeom prst="rect">
-            <a:avLst/>
-          </a:prstGeom>
-          <a:solidFill>
-            <a:schemeClr val="bg1"/>
-          </a:solidFill>
-          <a:ln w="9525" cap="flat" cmpd="sng" algn="ctr">
-            <a:solidFill>
-              <a:schemeClr val="bg1"/>
-            </a:solidFill>
-            <a:prstDash val="solid"/>
-            <a:round/>
-            <a:headEnd type="none" w="med" len="med"/>
-            <a:tailEnd type="none" w="med" len="med"/>
-          </a:ln>
-          <a:effectLst/>
-        </p:spPr>
-        <p:txBody>
-          <a:bodyPr vert="horz" wrap="square" lIns="91440" tIns="45720" rIns="91440" bIns="45720" numCol="1" rtlCol="0" anchor="t" anchorCtr="0" compatLnSpc="1">
-            <a:prstTxWarp prst="textNoShape">
-              <a:avLst/>
-            </a:prstTxWarp>
-          </a:bodyPr>
-          <a:lstStyle/>
-          <a:p>
-            <a:pPr marL="0" marR="0" indent="0" algn="l" defTabSz="914400" rtl="0" eaLnBrk="1" fontAlgn="base" latinLnBrk="0" hangingPunct="1">
-              <a:lnSpc>
-                <a:spcPct val="100000"/>
-              </a:lnSpc>
-              <a:spcBef>
-                <a:spcPct val="0"/>
-              </a:spcBef>
-              <a:spcAft>
-                <a:spcPct val="0"/>
-              </a:spcAft>
-              <a:buClrTx/>
-              <a:buSzTx/>
-              <a:buFontTx/>
-              <a:buNone/>
-              <a:tabLst/>
-            </a:pPr>
-            <a:r>
-              <a:rPr kumimoji="1" lang="es-AR" sz="1400" dirty="0">
-                <a:latin typeface="Verdana" pitchFamily="34" charset="0"/>
-                <a:ea typeface="ＭＳ Ｐゴシック" pitchFamily="50" charset="-128"/>
-              </a:rPr>
-              <a:t>5</a:t>
-            </a:r>
-            <a:r>
-              <a:rPr kumimoji="1" lang="es-AR" sz="1400" b="0" i="0" u="none" strike="noStrike" cap="none" normalizeH="0" baseline="0" dirty="0">
-                <a:ln>
-                  <a:noFill/>
-                </a:ln>
-                <a:solidFill>
-                  <a:schemeClr val="tx1"/>
-                </a:solidFill>
-                <a:effectLst/>
-                <a:latin typeface="Verdana" pitchFamily="34" charset="0"/>
-                <a:ea typeface="ＭＳ Ｐゴシック" pitchFamily="50" charset="-128"/>
-              </a:rPr>
-              <a:t>/15</a:t>
-            </a:r>
           </a:p>
         </p:txBody>
       </p:sp>
@@ -11522,6 +13032,163 @@
           </a:prstGeom>
         </p:spPr>
       </p:pic>
+      <p:sp>
+        <p:nvSpPr>
+          <p:cNvPr id="3" name="Rectángulo 2">
+            <a:extLst>
+              <a:ext uri="{FF2B5EF4-FFF2-40B4-BE49-F238E27FC236}">
+                <a16:creationId xmlns:a16="http://schemas.microsoft.com/office/drawing/2014/main" id="{134DF98A-8BED-AEA4-4371-3D12097987A2}"/>
+              </a:ext>
+            </a:extLst>
+          </p:cNvPr>
+          <p:cNvSpPr/>
+          <p:nvPr/>
+        </p:nvSpPr>
+        <p:spPr bwMode="auto">
+          <a:xfrm>
+            <a:off x="7236296" y="6381327"/>
+            <a:ext cx="1691680" cy="388565"/>
+          </a:xfrm>
+          <a:prstGeom prst="rect">
+            <a:avLst/>
+          </a:prstGeom>
+          <a:solidFill>
+            <a:schemeClr val="bg1"/>
+          </a:solidFill>
+          <a:ln w="9525" cap="flat" cmpd="sng" algn="ctr">
+            <a:solidFill>
+              <a:schemeClr val="bg1"/>
+            </a:solidFill>
+            <a:prstDash val="solid"/>
+            <a:round/>
+            <a:headEnd type="none" w="med" len="med"/>
+            <a:tailEnd type="none" w="med" len="med"/>
+          </a:ln>
+          <a:effectLst/>
+        </p:spPr>
+        <p:txBody>
+          <a:bodyPr vert="horz" wrap="square" lIns="91440" tIns="45720" rIns="91440" bIns="45720" numCol="1" rtlCol="0" anchor="t" anchorCtr="0" compatLnSpc="1">
+            <a:prstTxWarp prst="textNoShape">
+              <a:avLst/>
+            </a:prstTxWarp>
+          </a:bodyPr>
+          <a:lstStyle/>
+          <a:p>
+            <a:pPr marL="0" marR="0" indent="0" algn="r" defTabSz="914400" rtl="0" eaLnBrk="1" fontAlgn="base" latinLnBrk="0" hangingPunct="1">
+              <a:lnSpc>
+                <a:spcPct val="100000"/>
+              </a:lnSpc>
+              <a:spcBef>
+                <a:spcPct val="0"/>
+              </a:spcBef>
+              <a:spcAft>
+                <a:spcPct val="0"/>
+              </a:spcAft>
+              <a:buClrTx/>
+              <a:buSzTx/>
+              <a:buFontTx/>
+              <a:buNone/>
+              <a:tabLst/>
+            </a:pPr>
+            <a:r>
+              <a:rPr kumimoji="1" lang="es-AR" sz="1400" dirty="0">
+                <a:latin typeface="Verdana" pitchFamily="34" charset="0"/>
+                <a:ea typeface="ＭＳ Ｐゴシック" pitchFamily="50" charset="-128"/>
+              </a:rPr>
+              <a:t>6</a:t>
+            </a:r>
+            <a:r>
+              <a:rPr kumimoji="1" lang="es-AR" sz="1400" b="0" i="0" u="none" strike="noStrike" cap="none" normalizeH="0" baseline="0" dirty="0">
+                <a:ln>
+                  <a:noFill/>
+                </a:ln>
+                <a:solidFill>
+                  <a:schemeClr val="tx1"/>
+                </a:solidFill>
+                <a:effectLst/>
+                <a:latin typeface="Verdana" pitchFamily="34" charset="0"/>
+                <a:ea typeface="ＭＳ Ｐゴシック" pitchFamily="50" charset="-128"/>
+              </a:rPr>
+              <a:t>/15</a:t>
+            </a:r>
+          </a:p>
+        </p:txBody>
+      </p:sp>
+      <p:sp>
+        <p:nvSpPr>
+          <p:cNvPr id="4" name="Rectángulo 3">
+            <a:extLst>
+              <a:ext uri="{FF2B5EF4-FFF2-40B4-BE49-F238E27FC236}">
+                <a16:creationId xmlns:a16="http://schemas.microsoft.com/office/drawing/2014/main" id="{FBEA258F-5D84-F15A-67D9-5DDE44B50D3B}"/>
+              </a:ext>
+            </a:extLst>
+          </p:cNvPr>
+          <p:cNvSpPr/>
+          <p:nvPr/>
+        </p:nvSpPr>
+        <p:spPr bwMode="auto">
+          <a:xfrm>
+            <a:off x="107504" y="6381328"/>
+            <a:ext cx="7128792" cy="388565"/>
+          </a:xfrm>
+          <a:prstGeom prst="rect">
+            <a:avLst/>
+          </a:prstGeom>
+          <a:solidFill>
+            <a:schemeClr val="bg1"/>
+          </a:solidFill>
+          <a:ln w="9525" cap="flat" cmpd="sng" algn="ctr">
+            <a:solidFill>
+              <a:schemeClr val="bg1"/>
+            </a:solidFill>
+            <a:prstDash val="solid"/>
+            <a:round/>
+            <a:headEnd type="none" w="med" len="med"/>
+            <a:tailEnd type="none" w="med" len="med"/>
+          </a:ln>
+          <a:effectLst/>
+        </p:spPr>
+        <p:txBody>
+          <a:bodyPr vert="horz" wrap="square" lIns="91440" tIns="45720" rIns="91440" bIns="45720" numCol="1" rtlCol="0" anchor="t" anchorCtr="0" compatLnSpc="1">
+            <a:prstTxWarp prst="textNoShape">
+              <a:avLst/>
+            </a:prstTxWarp>
+          </a:bodyPr>
+          <a:lstStyle/>
+          <a:p>
+            <a:pPr marL="0" marR="0" indent="0" algn="l" defTabSz="914400" rtl="0" eaLnBrk="1" fontAlgn="base" latinLnBrk="0" hangingPunct="1">
+              <a:lnSpc>
+                <a:spcPct val="100000"/>
+              </a:lnSpc>
+              <a:spcBef>
+                <a:spcPct val="0"/>
+              </a:spcBef>
+              <a:spcAft>
+                <a:spcPct val="0"/>
+              </a:spcAft>
+              <a:buClrTx/>
+              <a:buSzTx/>
+              <a:buFontTx/>
+              <a:buNone/>
+              <a:tabLst/>
+            </a:pPr>
+            <a:r>
+              <a:rPr kumimoji="1" lang="es-AR" sz="1400" b="0" i="0" u="none" strike="noStrike" cap="none" normalizeH="0" baseline="0" dirty="0">
+                <a:ln>
+                  <a:noFill/>
+                </a:ln>
+                <a:solidFill>
+                  <a:schemeClr val="tx1"/>
+                </a:solidFill>
+                <a:effectLst/>
+                <a:latin typeface="Verdana" pitchFamily="34" charset="0"/>
+                <a:ea typeface="ＭＳ Ｐゴシック" pitchFamily="50" charset="-128"/>
+              </a:rPr>
+              <a:t>Maximiliano Ortiz - Estimación ciega de parámetros acústicos de un recinto</a:t>
+            </a:r>
+          </a:p>
+        </p:txBody>
+      </p:sp>
     </p:spTree>
     <p:extLst>
       <p:ext uri="{BB962C8B-B14F-4D97-AF65-F5344CB8AC3E}">
@@ -11535,7 +13202,7 @@
 </p:sld>
 </file>
 
-<file path=ppt/slides/slide6.xml><?xml version="1.0" encoding="utf-8"?>
+<file path=ppt/slides/slide7.xml><?xml version="1.0" encoding="utf-8"?>
 <p:sld xmlns:a="http://schemas.openxmlformats.org/drawingml/2006/main" xmlns:r="http://schemas.openxmlformats.org/officeDocument/2006/relationships" xmlns:p="http://schemas.openxmlformats.org/presentationml/2006/main">
   <p:cSld>
     <p:spTree>
@@ -11655,8 +13322,8 @@
         </p:nvSpPr>
         <p:spPr bwMode="auto">
           <a:xfrm>
-            <a:off x="7596336" y="6417331"/>
-            <a:ext cx="1152128" cy="316557"/>
+            <a:off x="7236296" y="6381327"/>
+            <a:ext cx="1691680" cy="388565"/>
           </a:xfrm>
           <a:prstGeom prst="rect">
             <a:avLst/>
@@ -11683,7 +13350,7 @@
           </a:bodyPr>
           <a:lstStyle/>
           <a:p>
-            <a:pPr marL="0" marR="0" indent="0" algn="l" defTabSz="914400" rtl="0" eaLnBrk="1" fontAlgn="base" latinLnBrk="0" hangingPunct="1">
+            <a:pPr marL="0" marR="0" indent="0" algn="r" defTabSz="914400" rtl="0" eaLnBrk="1" fontAlgn="base" latinLnBrk="0" hangingPunct="1">
               <a:lnSpc>
                 <a:spcPct val="100000"/>
               </a:lnSpc>
@@ -11738,7 +13405,7 @@
         <p:spPr bwMode="auto">
           <a:xfrm>
             <a:off x="107504" y="6381328"/>
-            <a:ext cx="5328592" cy="388565"/>
+            <a:ext cx="7128792" cy="388565"/>
           </a:xfrm>
           <a:prstGeom prst="rect">
             <a:avLst/>
@@ -11793,7 +13460,7 @@
                 <a:latin typeface="Verdana" pitchFamily="34" charset="0"/>
                 <a:ea typeface="ＭＳ Ｐゴシック" pitchFamily="50" charset="-128"/>
               </a:rPr>
-              <a:t>Estimación ciega de parámetros acústicos de un recinto</a:t>
+              <a:t>Maximiliano Ortiz - Estimación ciega de parámetros acústicos de un recinto</a:t>
             </a:r>
           </a:p>
         </p:txBody>
@@ -11841,7 +13508,7 @@
 </p:sld>
 </file>
 
-<file path=ppt/slides/slide7.xml><?xml version="1.0" encoding="utf-8"?>
+<file path=ppt/slides/slide8.xml><?xml version="1.0" encoding="utf-8"?>
 <p:sld xmlns:a="http://schemas.openxmlformats.org/drawingml/2006/main" xmlns:r="http://schemas.openxmlformats.org/officeDocument/2006/relationships" xmlns:p="http://schemas.openxmlformats.org/presentationml/2006/main">
   <p:cSld>
     <p:spTree>
@@ -12081,10 +13748,10 @@
       </p:sp>
       <p:sp>
         <p:nvSpPr>
-          <p:cNvPr id="7" name="Rectángulo 6">
+          <p:cNvPr id="3" name="Rectángulo 2">
             <a:extLst>
               <a:ext uri="{FF2B5EF4-FFF2-40B4-BE49-F238E27FC236}">
-                <a16:creationId xmlns:a16="http://schemas.microsoft.com/office/drawing/2014/main" id="{E2E48A0F-B76E-9AF8-B47A-DF5188BB551B}"/>
+                <a16:creationId xmlns:a16="http://schemas.microsoft.com/office/drawing/2014/main" id="{AB0FA8D8-86FB-9669-8EDE-3997E2086571}"/>
               </a:ext>
             </a:extLst>
           </p:cNvPr>
@@ -12093,8 +13760,8 @@
         </p:nvSpPr>
         <p:spPr bwMode="auto">
           <a:xfrm>
-            <a:off x="7596336" y="6417331"/>
-            <a:ext cx="1152128" cy="316557"/>
+            <a:off x="7236296" y="6381327"/>
+            <a:ext cx="1691680" cy="388565"/>
           </a:xfrm>
           <a:prstGeom prst="rect">
             <a:avLst/>
@@ -12121,7 +13788,7 @@
           </a:bodyPr>
           <a:lstStyle/>
           <a:p>
-            <a:pPr marL="0" marR="0" indent="0" algn="l" defTabSz="914400" rtl="0" eaLnBrk="1" fontAlgn="base" latinLnBrk="0" hangingPunct="1">
+            <a:pPr marL="0" marR="0" indent="0" algn="r" defTabSz="914400" rtl="0" eaLnBrk="1" fontAlgn="base" latinLnBrk="0" hangingPunct="1">
               <a:lnSpc>
                 <a:spcPct val="100000"/>
               </a:lnSpc>
@@ -12142,7 +13809,7 @@
                 <a:latin typeface="Verdana" pitchFamily="34" charset="0"/>
                 <a:ea typeface="ＭＳ Ｐゴシック" pitchFamily="50" charset="-128"/>
               </a:rPr>
-              <a:t>7</a:t>
+              <a:t>6</a:t>
             </a:r>
             <a:r>
               <a:rPr kumimoji="1" lang="es-AR" sz="1400" b="0" i="0" u="none" strike="noStrike" cap="none" normalizeH="0" baseline="0" dirty="0">
@@ -12163,10 +13830,10 @@
       </p:sp>
       <p:sp>
         <p:nvSpPr>
-          <p:cNvPr id="8" name="Rectángulo 7">
+          <p:cNvPr id="4" name="Rectángulo 3">
             <a:extLst>
               <a:ext uri="{FF2B5EF4-FFF2-40B4-BE49-F238E27FC236}">
-                <a16:creationId xmlns:a16="http://schemas.microsoft.com/office/drawing/2014/main" id="{9DD52BCB-3729-6CE6-34E6-229B4CD7855B}"/>
+                <a16:creationId xmlns:a16="http://schemas.microsoft.com/office/drawing/2014/main" id="{0AAC7D00-FEEE-BA76-753A-FF2DAFA95A8C}"/>
               </a:ext>
             </a:extLst>
           </p:cNvPr>
@@ -12176,7 +13843,7 @@
         <p:spPr bwMode="auto">
           <a:xfrm>
             <a:off x="107504" y="6381328"/>
-            <a:ext cx="5328592" cy="388565"/>
+            <a:ext cx="7128792" cy="388565"/>
           </a:xfrm>
           <a:prstGeom prst="rect">
             <a:avLst/>
@@ -12231,7 +13898,7 @@
                 <a:latin typeface="Verdana" pitchFamily="34" charset="0"/>
                 <a:ea typeface="ＭＳ Ｐゴシック" pitchFamily="50" charset="-128"/>
               </a:rPr>
-              <a:t>Estimación ciega de parámetros acústicos de un recinto</a:t>
+              <a:t>Maximiliano Ortiz - Estimación ciega de parámetros acústicos de un recinto</a:t>
             </a:r>
           </a:p>
         </p:txBody>
@@ -12249,7 +13916,7 @@
 </p:sld>
 </file>
 
-<file path=ppt/slides/slide8.xml><?xml version="1.0" encoding="utf-8"?>
+<file path=ppt/slides/slide9.xml><?xml version="1.0" encoding="utf-8"?>
 <p:sld xmlns:a="http://schemas.openxmlformats.org/drawingml/2006/main" xmlns:r="http://schemas.openxmlformats.org/officeDocument/2006/relationships" xmlns:p="http://schemas.openxmlformats.org/presentationml/2006/main">
   <p:cSld>
     <p:spTree>
@@ -12424,163 +14091,6 @@
               <a:latin typeface="Verdana" pitchFamily="34" charset="0"/>
               <a:ea typeface="ＭＳ Ｐゴシック" pitchFamily="50" charset="-128"/>
             </a:endParaRPr>
-          </a:p>
-        </p:txBody>
-      </p:sp>
-      <p:sp>
-        <p:nvSpPr>
-          <p:cNvPr id="15" name="Rectángulo 14">
-            <a:extLst>
-              <a:ext uri="{FF2B5EF4-FFF2-40B4-BE49-F238E27FC236}">
-                <a16:creationId xmlns:a16="http://schemas.microsoft.com/office/drawing/2014/main" id="{831A801F-7ED6-697C-D510-D1C00F597B94}"/>
-              </a:ext>
-            </a:extLst>
-          </p:cNvPr>
-          <p:cNvSpPr/>
-          <p:nvPr/>
-        </p:nvSpPr>
-        <p:spPr bwMode="auto">
-          <a:xfrm>
-            <a:off x="7596336" y="6417331"/>
-            <a:ext cx="1152128" cy="316557"/>
-          </a:xfrm>
-          <a:prstGeom prst="rect">
-            <a:avLst/>
-          </a:prstGeom>
-          <a:solidFill>
-            <a:schemeClr val="bg1"/>
-          </a:solidFill>
-          <a:ln w="9525" cap="flat" cmpd="sng" algn="ctr">
-            <a:solidFill>
-              <a:schemeClr val="bg1"/>
-            </a:solidFill>
-            <a:prstDash val="solid"/>
-            <a:round/>
-            <a:headEnd type="none" w="med" len="med"/>
-            <a:tailEnd type="none" w="med" len="med"/>
-          </a:ln>
-          <a:effectLst/>
-        </p:spPr>
-        <p:txBody>
-          <a:bodyPr vert="horz" wrap="square" lIns="91440" tIns="45720" rIns="91440" bIns="45720" numCol="1" rtlCol="0" anchor="t" anchorCtr="0" compatLnSpc="1">
-            <a:prstTxWarp prst="textNoShape">
-              <a:avLst/>
-            </a:prstTxWarp>
-          </a:bodyPr>
-          <a:lstStyle/>
-          <a:p>
-            <a:pPr marL="0" marR="0" indent="0" algn="l" defTabSz="914400" rtl="0" eaLnBrk="1" fontAlgn="base" latinLnBrk="0" hangingPunct="1">
-              <a:lnSpc>
-                <a:spcPct val="100000"/>
-              </a:lnSpc>
-              <a:spcBef>
-                <a:spcPct val="0"/>
-              </a:spcBef>
-              <a:spcAft>
-                <a:spcPct val="0"/>
-              </a:spcAft>
-              <a:buClrTx/>
-              <a:buSzTx/>
-              <a:buFontTx/>
-              <a:buNone/>
-              <a:tabLst/>
-            </a:pPr>
-            <a:r>
-              <a:rPr kumimoji="1" lang="es-AR" sz="1400" dirty="0">
-                <a:latin typeface="Verdana" pitchFamily="34" charset="0"/>
-                <a:ea typeface="ＭＳ Ｐゴシック" pitchFamily="50" charset="-128"/>
-              </a:rPr>
-              <a:t>8</a:t>
-            </a:r>
-            <a:r>
-              <a:rPr kumimoji="1" lang="es-AR" sz="1400" b="0" i="0" u="none" strike="noStrike" cap="none" normalizeH="0" baseline="0" dirty="0">
-                <a:ln>
-                  <a:noFill/>
-                </a:ln>
-                <a:solidFill>
-                  <a:schemeClr val="tx1"/>
-                </a:solidFill>
-                <a:effectLst/>
-                <a:latin typeface="Verdana" pitchFamily="34" charset="0"/>
-                <a:ea typeface="ＭＳ Ｐゴシック" pitchFamily="50" charset="-128"/>
-              </a:rPr>
-              <a:t>/15</a:t>
-            </a:r>
-          </a:p>
-        </p:txBody>
-      </p:sp>
-      <p:sp>
-        <p:nvSpPr>
-          <p:cNvPr id="12" name="Rectángulo 11">
-            <a:extLst>
-              <a:ext uri="{FF2B5EF4-FFF2-40B4-BE49-F238E27FC236}">
-                <a16:creationId xmlns:a16="http://schemas.microsoft.com/office/drawing/2014/main" id="{01B5CAA3-0AAB-AFC9-F542-739C94F658B1}"/>
-              </a:ext>
-            </a:extLst>
-          </p:cNvPr>
-          <p:cNvSpPr/>
-          <p:nvPr/>
-        </p:nvSpPr>
-        <p:spPr bwMode="auto">
-          <a:xfrm>
-            <a:off x="107504" y="6381328"/>
-            <a:ext cx="5328592" cy="388565"/>
-          </a:xfrm>
-          <a:prstGeom prst="rect">
-            <a:avLst/>
-          </a:prstGeom>
-          <a:solidFill>
-            <a:schemeClr val="bg1"/>
-          </a:solidFill>
-          <a:ln w="9525" cap="flat" cmpd="sng" algn="ctr">
-            <a:solidFill>
-              <a:schemeClr val="bg1"/>
-            </a:solidFill>
-            <a:prstDash val="solid"/>
-            <a:round/>
-            <a:headEnd type="none" w="med" len="med"/>
-            <a:tailEnd type="none" w="med" len="med"/>
-          </a:ln>
-          <a:effectLst/>
-        </p:spPr>
-        <p:txBody>
-          <a:bodyPr vert="horz" wrap="square" lIns="91440" tIns="45720" rIns="91440" bIns="45720" numCol="1" rtlCol="0" anchor="t" anchorCtr="0" compatLnSpc="1">
-            <a:prstTxWarp prst="textNoShape">
-              <a:avLst/>
-            </a:prstTxWarp>
-          </a:bodyPr>
-          <a:lstStyle/>
-          <a:p>
-            <a:pPr marL="0" marR="0" indent="0" algn="l" defTabSz="914400" rtl="0" eaLnBrk="1" fontAlgn="base" latinLnBrk="0" hangingPunct="1">
-              <a:lnSpc>
-                <a:spcPct val="100000"/>
-              </a:lnSpc>
-              <a:spcBef>
-                <a:spcPct val="0"/>
-              </a:spcBef>
-              <a:spcAft>
-                <a:spcPct val="0"/>
-              </a:spcAft>
-              <a:buClrTx/>
-              <a:buSzTx/>
-              <a:buFontTx/>
-              <a:buNone/>
-              <a:tabLst/>
-            </a:pPr>
-            <a:r>
-              <a:rPr kumimoji="1" lang="es-AR" sz="1400" b="0" i="0" u="none" strike="noStrike" cap="none" normalizeH="0" baseline="0" dirty="0">
-                <a:ln>
-                  <a:noFill/>
-                </a:ln>
-                <a:solidFill>
-                  <a:schemeClr val="tx1"/>
-                </a:solidFill>
-                <a:effectLst/>
-                <a:latin typeface="Verdana" pitchFamily="34" charset="0"/>
-                <a:ea typeface="ＭＳ Ｐゴシック" pitchFamily="50" charset="-128"/>
-              </a:rPr>
-              <a:t>Estimación ciega de parámetros acústicos de un recinto</a:t>
-            </a:r>
           </a:p>
         </p:txBody>
       </p:sp>
@@ -12631,166 +14141,12 @@
           </a:extLst>
         </p:spPr>
       </p:pic>
-    </p:spTree>
-    <p:extLst>
-      <p:ext uri="{BB962C8B-B14F-4D97-AF65-F5344CB8AC3E}">
-        <p14:creationId xmlns:p14="http://schemas.microsoft.com/office/powerpoint/2010/main" val="833963141"/>
-      </p:ext>
-    </p:extLst>
-  </p:cSld>
-  <p:clrMapOvr>
-    <a:masterClrMapping/>
-  </p:clrMapOvr>
-</p:sld>
-</file>
-
-<file path=ppt/slides/slide9.xml><?xml version="1.0" encoding="utf-8"?>
-<p:sld xmlns:a="http://schemas.openxmlformats.org/drawingml/2006/main" xmlns:r="http://schemas.openxmlformats.org/officeDocument/2006/relationships" xmlns:p="http://schemas.openxmlformats.org/presentationml/2006/main">
-  <p:cSld>
-    <p:spTree>
-      <p:nvGrpSpPr>
-        <p:cNvPr id="1" name=""/>
-        <p:cNvGrpSpPr/>
-        <p:nvPr/>
-      </p:nvGrpSpPr>
-      <p:grpSpPr>
-        <a:xfrm>
-          <a:off x="0" y="0"/>
-          <a:ext cx="0" cy="0"/>
-          <a:chOff x="0" y="0"/>
-          <a:chExt cx="0" cy="0"/>
-        </a:xfrm>
-      </p:grpSpPr>
-      <p:sp>
-        <p:nvSpPr>
-          <p:cNvPr id="14" name="13 Marcador de contenido"/>
-          <p:cNvSpPr>
-            <a:spLocks noGrp="1"/>
-          </p:cNvSpPr>
-          <p:nvPr>
-            <p:ph idx="1"/>
-          </p:nvPr>
-        </p:nvSpPr>
-        <p:spPr/>
-        <p:txBody>
-          <a:bodyPr/>
-          <a:lstStyle/>
-          <a:p>
-            <a:r>
-              <a:rPr lang="es-ES" dirty="0"/>
-              <a:t>Estimación del T30 para la banda de 1 kHz:</a:t>
-            </a:r>
-          </a:p>
-        </p:txBody>
-      </p:sp>
-      <p:sp>
-        <p:nvSpPr>
-          <p:cNvPr id="13" name="12 Título"/>
-          <p:cNvSpPr>
-            <a:spLocks noGrp="1"/>
-          </p:cNvSpPr>
-          <p:nvPr>
-            <p:ph type="title"/>
-          </p:nvPr>
-        </p:nvSpPr>
-        <p:spPr/>
-        <p:txBody>
-          <a:bodyPr/>
-          <a:lstStyle/>
-          <a:p>
-            <a:r>
-              <a:rPr lang="es-ES" dirty="0"/>
-              <a:t>Resultados: estimación de parámetros</a:t>
-            </a:r>
-          </a:p>
-        </p:txBody>
-      </p:sp>
-      <p:sp>
-        <p:nvSpPr>
-          <p:cNvPr id="2" name="AutoShape 2">
+      <p:sp>
+        <p:nvSpPr>
+          <p:cNvPr id="3" name="Rectángulo 2">
             <a:extLst>
               <a:ext uri="{FF2B5EF4-FFF2-40B4-BE49-F238E27FC236}">
-                <a16:creationId xmlns:a16="http://schemas.microsoft.com/office/drawing/2014/main" id="{6AD68EBF-CA66-5DF2-2FA7-CB2BB497BFED}"/>
-              </a:ext>
-            </a:extLst>
-          </p:cNvPr>
-          <p:cNvSpPr>
-            <a:spLocks noChangeAspect="1" noChangeArrowheads="1"/>
-          </p:cNvSpPr>
-          <p:nvPr/>
-        </p:nvSpPr>
-        <p:spPr bwMode="auto">
-          <a:xfrm>
-            <a:off x="4419600" y="3276600"/>
-            <a:ext cx="304800" cy="304800"/>
-          </a:xfrm>
-          <a:prstGeom prst="rect">
-            <a:avLst/>
-          </a:prstGeom>
-          <a:noFill/>
-          <a:extLst>
-            <a:ext uri="{909E8E84-426E-40DD-AFC4-6F175D3DCCD1}">
-              <a14:hiddenFill xmlns:a14="http://schemas.microsoft.com/office/drawing/2010/main">
-                <a:solidFill>
-                  <a:srgbClr val="FFFFFF"/>
-                </a:solidFill>
-              </a14:hiddenFill>
-            </a:ext>
-          </a:extLst>
-        </p:spPr>
-        <p:txBody>
-          <a:bodyPr vert="horz" wrap="square" lIns="91440" tIns="45720" rIns="91440" bIns="45720" numCol="1" anchor="t" anchorCtr="0" compatLnSpc="1">
-            <a:prstTxWarp prst="textNoShape">
-              <a:avLst/>
-            </a:prstTxWarp>
-          </a:bodyPr>
-          <a:lstStyle/>
-          <a:p>
-            <a:endParaRPr lang="es-AR"/>
-          </a:p>
-        </p:txBody>
-      </p:sp>
-      <p:sp>
-        <p:nvSpPr>
-          <p:cNvPr id="10" name="CuadroTexto 9">
-            <a:extLst>
-              <a:ext uri="{FF2B5EF4-FFF2-40B4-BE49-F238E27FC236}">
-                <a16:creationId xmlns:a16="http://schemas.microsoft.com/office/drawing/2014/main" id="{49D115F4-A2BB-EB93-BDE5-D5FABE94B949}"/>
-              </a:ext>
-            </a:extLst>
-          </p:cNvPr>
-          <p:cNvSpPr txBox="1"/>
-          <p:nvPr/>
-        </p:nvSpPr>
-        <p:spPr>
-          <a:xfrm>
-            <a:off x="6211728" y="5650698"/>
-            <a:ext cx="1656184" cy="261610"/>
-          </a:xfrm>
-          <a:prstGeom prst="rect">
-            <a:avLst/>
-          </a:prstGeom>
-          <a:noFill/>
-        </p:spPr>
-        <p:txBody>
-          <a:bodyPr wrap="square" rtlCol="0">
-            <a:spAutoFit/>
-          </a:bodyPr>
-          <a:lstStyle/>
-          <a:p>
-            <a:r>
-              <a:rPr lang="es-AR" sz="1100" dirty="0"/>
-              <a:t>Diferencia</a:t>
-            </a:r>
-          </a:p>
-        </p:txBody>
-      </p:sp>
-      <p:sp>
-        <p:nvSpPr>
-          <p:cNvPr id="11" name="Rectángulo 10">
-            <a:extLst>
-              <a:ext uri="{FF2B5EF4-FFF2-40B4-BE49-F238E27FC236}">
-                <a16:creationId xmlns:a16="http://schemas.microsoft.com/office/drawing/2014/main" id="{3BDB8411-DAA6-2B56-D29F-E1E5DBA383E0}"/>
+                <a16:creationId xmlns:a16="http://schemas.microsoft.com/office/drawing/2014/main" id="{38FAFEF7-5DD7-7444-8C06-551DBFA1D622}"/>
               </a:ext>
             </a:extLst>
           </p:cNvPr>
@@ -12799,8 +14155,8 @@
         </p:nvSpPr>
         <p:spPr bwMode="auto">
           <a:xfrm>
-            <a:off x="6193298" y="5733256"/>
-            <a:ext cx="792088" cy="142599"/>
+            <a:off x="7236296" y="6381327"/>
+            <a:ext cx="1691680" cy="388565"/>
           </a:xfrm>
           <a:prstGeom prst="rect">
             <a:avLst/>
@@ -12827,7 +14183,7 @@
           </a:bodyPr>
           <a:lstStyle/>
           <a:p>
-            <a:pPr marL="0" marR="0" indent="0" algn="l" defTabSz="914400" rtl="0" eaLnBrk="1" fontAlgn="base" latinLnBrk="0" hangingPunct="1">
+            <a:pPr marL="0" marR="0" indent="0" algn="r" defTabSz="914400" rtl="0" eaLnBrk="1" fontAlgn="base" latinLnBrk="0" hangingPunct="1">
               <a:lnSpc>
                 <a:spcPct val="100000"/>
               </a:lnSpc>
@@ -12843,26 +14199,36 @@
               <a:buNone/>
               <a:tabLst/>
             </a:pPr>
-            <a:endParaRPr kumimoji="1" lang="es-AR" sz="1800" b="0" i="0" u="none" strike="noStrike" cap="none" normalizeH="0" baseline="0" dirty="0">
-              <a:ln>
-                <a:noFill/>
-              </a:ln>
-              <a:solidFill>
-                <a:schemeClr val="tx1"/>
-              </a:solidFill>
-              <a:effectLst/>
-              <a:latin typeface="Verdana" pitchFamily="34" charset="0"/>
-              <a:ea typeface="ＭＳ Ｐゴシック" pitchFamily="50" charset="-128"/>
-            </a:endParaRPr>
+            <a:r>
+              <a:rPr kumimoji="1" lang="es-AR" sz="1400" dirty="0">
+                <a:latin typeface="Verdana" pitchFamily="34" charset="0"/>
+                <a:ea typeface="ＭＳ Ｐゴシック" pitchFamily="50" charset="-128"/>
+              </a:rPr>
+              <a:t>6</a:t>
+            </a:r>
+            <a:r>
+              <a:rPr kumimoji="1" lang="es-AR" sz="1400" b="0" i="0" u="none" strike="noStrike" cap="none" normalizeH="0" baseline="0" dirty="0">
+                <a:ln>
+                  <a:noFill/>
+                </a:ln>
+                <a:solidFill>
+                  <a:schemeClr val="tx1"/>
+                </a:solidFill>
+                <a:effectLst/>
+                <a:latin typeface="Verdana" pitchFamily="34" charset="0"/>
+                <a:ea typeface="ＭＳ Ｐゴシック" pitchFamily="50" charset="-128"/>
+              </a:rPr>
+              <a:t>/15</a:t>
+            </a:r>
           </a:p>
         </p:txBody>
       </p:sp>
       <p:sp>
         <p:nvSpPr>
-          <p:cNvPr id="15" name="Rectángulo 14">
+          <p:cNvPr id="4" name="Rectángulo 3">
             <a:extLst>
               <a:ext uri="{FF2B5EF4-FFF2-40B4-BE49-F238E27FC236}">
-                <a16:creationId xmlns:a16="http://schemas.microsoft.com/office/drawing/2014/main" id="{9B6D7379-7B05-B7D3-44A4-E10C7373C3DA}"/>
+                <a16:creationId xmlns:a16="http://schemas.microsoft.com/office/drawing/2014/main" id="{EDB496EE-9678-5DD8-78F2-C8B6271FD9F1}"/>
               </a:ext>
             </a:extLst>
           </p:cNvPr>
@@ -12871,8 +14237,8 @@
         </p:nvSpPr>
         <p:spPr bwMode="auto">
           <a:xfrm>
-            <a:off x="6012160" y="1988840"/>
-            <a:ext cx="1584176" cy="261610"/>
+            <a:off x="107504" y="6381328"/>
+            <a:ext cx="7128792" cy="388565"/>
           </a:xfrm>
           <a:prstGeom prst="rect">
             <a:avLst/>
@@ -12915,78 +14281,6 @@
               <a:buNone/>
               <a:tabLst/>
             </a:pPr>
-            <a:endParaRPr kumimoji="1" lang="es-AR" sz="1800" b="0" i="0" u="none" strike="noStrike" cap="none" normalizeH="0" baseline="0">
-              <a:ln>
-                <a:noFill/>
-              </a:ln>
-              <a:solidFill>
-                <a:schemeClr val="tx1"/>
-              </a:solidFill>
-              <a:effectLst/>
-              <a:latin typeface="Verdana" pitchFamily="34" charset="0"/>
-              <a:ea typeface="ＭＳ Ｐゴシック" pitchFamily="50" charset="-128"/>
-            </a:endParaRPr>
-          </a:p>
-        </p:txBody>
-      </p:sp>
-      <p:sp>
-        <p:nvSpPr>
-          <p:cNvPr id="17" name="Rectángulo 16">
-            <a:extLst>
-              <a:ext uri="{FF2B5EF4-FFF2-40B4-BE49-F238E27FC236}">
-                <a16:creationId xmlns:a16="http://schemas.microsoft.com/office/drawing/2014/main" id="{0BA84367-D9E9-B9BD-883E-22B688BB9D7C}"/>
-              </a:ext>
-            </a:extLst>
-          </p:cNvPr>
-          <p:cNvSpPr/>
-          <p:nvPr/>
-        </p:nvSpPr>
-        <p:spPr bwMode="auto">
-          <a:xfrm>
-            <a:off x="7596336" y="6417331"/>
-            <a:ext cx="1152128" cy="316557"/>
-          </a:xfrm>
-          <a:prstGeom prst="rect">
-            <a:avLst/>
-          </a:prstGeom>
-          <a:solidFill>
-            <a:schemeClr val="bg1"/>
-          </a:solidFill>
-          <a:ln w="9525" cap="flat" cmpd="sng" algn="ctr">
-            <a:solidFill>
-              <a:schemeClr val="bg1"/>
-            </a:solidFill>
-            <a:prstDash val="solid"/>
-            <a:round/>
-            <a:headEnd type="none" w="med" len="med"/>
-            <a:tailEnd type="none" w="med" len="med"/>
-          </a:ln>
-          <a:effectLst/>
-        </p:spPr>
-        <p:txBody>
-          <a:bodyPr vert="horz" wrap="square" lIns="91440" tIns="45720" rIns="91440" bIns="45720" numCol="1" rtlCol="0" anchor="t" anchorCtr="0" compatLnSpc="1">
-            <a:prstTxWarp prst="textNoShape">
-              <a:avLst/>
-            </a:prstTxWarp>
-          </a:bodyPr>
-          <a:lstStyle/>
-          <a:p>
-            <a:pPr marL="0" marR="0" indent="0" algn="l" defTabSz="914400" rtl="0" eaLnBrk="1" fontAlgn="base" latinLnBrk="0" hangingPunct="1">
-              <a:lnSpc>
-                <a:spcPct val="100000"/>
-              </a:lnSpc>
-              <a:spcBef>
-                <a:spcPct val="0"/>
-              </a:spcBef>
-              <a:spcAft>
-                <a:spcPct val="0"/>
-              </a:spcAft>
-              <a:buClrTx/>
-              <a:buSzTx/>
-              <a:buFontTx/>
-              <a:buNone/>
-              <a:tabLst/>
-            </a:pPr>
             <a:r>
               <a:rPr kumimoji="1" lang="es-AR" sz="1400" b="0" i="0" u="none" strike="noStrike" cap="none" normalizeH="0" baseline="0" dirty="0">
                 <a:ln>
@@ -12999,184 +14293,15 @@
                 <a:latin typeface="Verdana" pitchFamily="34" charset="0"/>
                 <a:ea typeface="ＭＳ Ｐゴシック" pitchFamily="50" charset="-128"/>
               </a:rPr>
-              <a:t>9/15</a:t>
+              <a:t>Maximiliano Ortiz - Estimación ciega de parámetros acústicos de un recinto</a:t>
             </a:r>
           </a:p>
         </p:txBody>
       </p:sp>
-      <p:sp>
-        <p:nvSpPr>
-          <p:cNvPr id="18" name="Rectángulo 17">
-            <a:extLst>
-              <a:ext uri="{FF2B5EF4-FFF2-40B4-BE49-F238E27FC236}">
-                <a16:creationId xmlns:a16="http://schemas.microsoft.com/office/drawing/2014/main" id="{766EA470-71D4-F2B0-B289-D6FAD29EC2D1}"/>
-              </a:ext>
-            </a:extLst>
-          </p:cNvPr>
-          <p:cNvSpPr/>
-          <p:nvPr/>
-        </p:nvSpPr>
-        <p:spPr bwMode="auto">
-          <a:xfrm>
-            <a:off x="107504" y="6381328"/>
-            <a:ext cx="5328592" cy="388565"/>
-          </a:xfrm>
-          <a:prstGeom prst="rect">
-            <a:avLst/>
-          </a:prstGeom>
-          <a:solidFill>
-            <a:schemeClr val="bg1"/>
-          </a:solidFill>
-          <a:ln w="9525" cap="flat" cmpd="sng" algn="ctr">
-            <a:solidFill>
-              <a:schemeClr val="bg1"/>
-            </a:solidFill>
-            <a:prstDash val="solid"/>
-            <a:round/>
-            <a:headEnd type="none" w="med" len="med"/>
-            <a:tailEnd type="none" w="med" len="med"/>
-          </a:ln>
-          <a:effectLst/>
-        </p:spPr>
-        <p:txBody>
-          <a:bodyPr vert="horz" wrap="square" lIns="91440" tIns="45720" rIns="91440" bIns="45720" numCol="1" rtlCol="0" anchor="t" anchorCtr="0" compatLnSpc="1">
-            <a:prstTxWarp prst="textNoShape">
-              <a:avLst/>
-            </a:prstTxWarp>
-          </a:bodyPr>
-          <a:lstStyle/>
-          <a:p>
-            <a:pPr marL="0" marR="0" indent="0" algn="l" defTabSz="914400" rtl="0" eaLnBrk="1" fontAlgn="base" latinLnBrk="0" hangingPunct="1">
-              <a:lnSpc>
-                <a:spcPct val="100000"/>
-              </a:lnSpc>
-              <a:spcBef>
-                <a:spcPct val="0"/>
-              </a:spcBef>
-              <a:spcAft>
-                <a:spcPct val="0"/>
-              </a:spcAft>
-              <a:buClrTx/>
-              <a:buSzTx/>
-              <a:buFontTx/>
-              <a:buNone/>
-              <a:tabLst/>
-            </a:pPr>
-            <a:r>
-              <a:rPr kumimoji="1" lang="es-AR" sz="1400" b="0" i="0" u="none" strike="noStrike" cap="none" normalizeH="0" baseline="0" dirty="0">
-                <a:ln>
-                  <a:noFill/>
-                </a:ln>
-                <a:solidFill>
-                  <a:schemeClr val="tx1"/>
-                </a:solidFill>
-                <a:effectLst/>
-                <a:latin typeface="Verdana" pitchFamily="34" charset="0"/>
-                <a:ea typeface="ＭＳ Ｐゴシック" pitchFamily="50" charset="-128"/>
-              </a:rPr>
-              <a:t>Estimación ciega de parámetros acústicos de un recinto</a:t>
-            </a:r>
-          </a:p>
-        </p:txBody>
-      </p:sp>
-      <p:pic>
-        <p:nvPicPr>
-          <p:cNvPr id="2050" name="Picture 2">
-            <a:extLst>
-              <a:ext uri="{FF2B5EF4-FFF2-40B4-BE49-F238E27FC236}">
-                <a16:creationId xmlns:a16="http://schemas.microsoft.com/office/drawing/2014/main" id="{FF0055B1-6FE4-EB32-8D33-87129ECB5836}"/>
-              </a:ext>
-            </a:extLst>
-          </p:cNvPr>
-          <p:cNvPicPr>
-            <a:picLocks noChangeAspect="1" noChangeArrowheads="1"/>
-          </p:cNvPicPr>
-          <p:nvPr/>
-        </p:nvPicPr>
-        <p:blipFill>
-          <a:blip r:embed="rId3">
-            <a:extLst>
-              <a:ext uri="{28A0092B-C50C-407E-A947-70E740481C1C}">
-                <a14:useLocalDpi xmlns:a14="http://schemas.microsoft.com/office/drawing/2010/main" val="0"/>
-              </a:ext>
-            </a:extLst>
-          </a:blip>
-          <a:srcRect/>
-          <a:stretch>
-            <a:fillRect/>
-          </a:stretch>
-        </p:blipFill>
-        <p:spPr bwMode="auto">
-          <a:xfrm>
-            <a:off x="4597037" y="1949216"/>
-            <a:ext cx="4295443" cy="4176947"/>
-          </a:xfrm>
-          <a:prstGeom prst="rect">
-            <a:avLst/>
-          </a:prstGeom>
-          <a:noFill/>
-          <a:extLst>
-            <a:ext uri="{909E8E84-426E-40DD-AFC4-6F175D3DCCD1}">
-              <a14:hiddenFill xmlns:a14="http://schemas.microsoft.com/office/drawing/2010/main">
-                <a:solidFill>
-                  <a:srgbClr val="FFFFFF"/>
-                </a:solidFill>
-              </a14:hiddenFill>
-            </a:ext>
-          </a:extLst>
-        </p:spPr>
-      </p:pic>
-      <p:pic>
-        <p:nvPicPr>
-          <p:cNvPr id="2052" name="Picture 4">
-            <a:extLst>
-              <a:ext uri="{FF2B5EF4-FFF2-40B4-BE49-F238E27FC236}">
-                <a16:creationId xmlns:a16="http://schemas.microsoft.com/office/drawing/2014/main" id="{4811F066-EB59-6349-C2D7-10CF08457AB1}"/>
-              </a:ext>
-            </a:extLst>
-          </p:cNvPr>
-          <p:cNvPicPr>
-            <a:picLocks noChangeAspect="1" noChangeArrowheads="1"/>
-          </p:cNvPicPr>
-          <p:nvPr/>
-        </p:nvPicPr>
-        <p:blipFill>
-          <a:blip r:embed="rId4">
-            <a:extLst>
-              <a:ext uri="{28A0092B-C50C-407E-A947-70E740481C1C}">
-                <a14:useLocalDpi xmlns:a14="http://schemas.microsoft.com/office/drawing/2010/main" val="0"/>
-              </a:ext>
-            </a:extLst>
-          </a:blip>
-          <a:srcRect/>
-          <a:stretch>
-            <a:fillRect/>
-          </a:stretch>
-        </p:blipFill>
-        <p:spPr bwMode="auto">
-          <a:xfrm>
-            <a:off x="214928" y="1816179"/>
-            <a:ext cx="4262365" cy="4346997"/>
-          </a:xfrm>
-          <a:prstGeom prst="rect">
-            <a:avLst/>
-          </a:prstGeom>
-          <a:noFill/>
-          <a:extLst>
-            <a:ext uri="{909E8E84-426E-40DD-AFC4-6F175D3DCCD1}">
-              <a14:hiddenFill xmlns:a14="http://schemas.microsoft.com/office/drawing/2010/main">
-                <a:solidFill>
-                  <a:srgbClr val="FFFFFF"/>
-                </a:solidFill>
-              </a14:hiddenFill>
-            </a:ext>
-          </a:extLst>
-        </p:spPr>
-      </p:pic>
     </p:spTree>
     <p:extLst>
       <p:ext uri="{BB962C8B-B14F-4D97-AF65-F5344CB8AC3E}">
-        <p14:creationId xmlns:p14="http://schemas.microsoft.com/office/powerpoint/2010/main" val="2531326761"/>
+        <p14:creationId xmlns:p14="http://schemas.microsoft.com/office/powerpoint/2010/main" val="833963141"/>
       </p:ext>
     </p:extLst>
   </p:cSld>
@@ -14254,4 +15379,299 @@
   <a:objectDefaults/>
   <a:extraClrSchemeLst/>
 </a:theme>
+</file>
+
+<file path=ppt/theme/theme3.xml><?xml version="1.0" encoding="utf-8"?>
+<a:theme xmlns:a="http://schemas.openxmlformats.org/drawingml/2006/main" name="Tema de Office">
+  <a:themeElements>
+    <a:clrScheme name="Office">
+      <a:dk1>
+        <a:sysClr val="windowText" lastClr="000000"/>
+      </a:dk1>
+      <a:lt1>
+        <a:sysClr val="window" lastClr="FFFFFF"/>
+      </a:lt1>
+      <a:dk2>
+        <a:srgbClr val="44546A"/>
+      </a:dk2>
+      <a:lt2>
+        <a:srgbClr val="E7E6E6"/>
+      </a:lt2>
+      <a:accent1>
+        <a:srgbClr val="4472C4"/>
+      </a:accent1>
+      <a:accent2>
+        <a:srgbClr val="ED7D31"/>
+      </a:accent2>
+      <a:accent3>
+        <a:srgbClr val="A5A5A5"/>
+      </a:accent3>
+      <a:accent4>
+        <a:srgbClr val="FFC000"/>
+      </a:accent4>
+      <a:accent5>
+        <a:srgbClr val="5B9BD5"/>
+      </a:accent5>
+      <a:accent6>
+        <a:srgbClr val="70AD47"/>
+      </a:accent6>
+      <a:hlink>
+        <a:srgbClr val="0563C1"/>
+      </a:hlink>
+      <a:folHlink>
+        <a:srgbClr val="954F72"/>
+      </a:folHlink>
+    </a:clrScheme>
+    <a:fontScheme name="Office">
+      <a:majorFont>
+        <a:latin typeface="Calibri Light" panose="020F0302020204030204"/>
+        <a:ea typeface=""/>
+        <a:cs typeface=""/>
+        <a:font script="Jpan" typeface="游ゴシック Light"/>
+        <a:font script="Hang" typeface="맑은 고딕"/>
+        <a:font script="Hans" typeface="等线 Light"/>
+        <a:font script="Hant" typeface="新細明體"/>
+        <a:font script="Arab" typeface="Times New Roman"/>
+        <a:font script="Hebr" typeface="Times New Roman"/>
+        <a:font script="Thai" typeface="Angsana New"/>
+        <a:font script="Ethi" typeface="Nyala"/>
+        <a:font script="Beng" typeface="Vrinda"/>
+        <a:font script="Gujr" typeface="Shruti"/>
+        <a:font script="Khmr" typeface="MoolBoran"/>
+        <a:font script="Knda" typeface="Tunga"/>
+        <a:font script="Guru" typeface="Raavi"/>
+        <a:font script="Cans" typeface="Euphemia"/>
+        <a:font script="Cher" typeface="Plantagenet Cherokee"/>
+        <a:font script="Yiii" typeface="Microsoft Yi Baiti"/>
+        <a:font script="Tibt" typeface="Microsoft Himalaya"/>
+        <a:font script="Thaa" typeface="MV Boli"/>
+        <a:font script="Deva" typeface="Mangal"/>
+        <a:font script="Telu" typeface="Gautami"/>
+        <a:font script="Taml" typeface="Latha"/>
+        <a:font script="Syrc" typeface="Estrangelo Edessa"/>
+        <a:font script="Orya" typeface="Kalinga"/>
+        <a:font script="Mlym" typeface="Kartika"/>
+        <a:font script="Laoo" typeface="DokChampa"/>
+        <a:font script="Sinh" typeface="Iskoola Pota"/>
+        <a:font script="Mong" typeface="Mongolian Baiti"/>
+        <a:font script="Viet" typeface="Times New Roman"/>
+        <a:font script="Uigh" typeface="Microsoft Uighur"/>
+        <a:font script="Geor" typeface="Sylfaen"/>
+        <a:font script="Armn" typeface="Arial"/>
+        <a:font script="Bugi" typeface="Leelawadee UI"/>
+        <a:font script="Bopo" typeface="Microsoft JhengHei"/>
+        <a:font script="Java" typeface="Javanese Text"/>
+        <a:font script="Lisu" typeface="Segoe UI"/>
+        <a:font script="Mymr" typeface="Myanmar Text"/>
+        <a:font script="Nkoo" typeface="Ebrima"/>
+        <a:font script="Olck" typeface="Nirmala UI"/>
+        <a:font script="Osma" typeface="Ebrima"/>
+        <a:font script="Phag" typeface="Phagspa"/>
+        <a:font script="Syrn" typeface="Estrangelo Edessa"/>
+        <a:font script="Syrj" typeface="Estrangelo Edessa"/>
+        <a:font script="Syre" typeface="Estrangelo Edessa"/>
+        <a:font script="Sora" typeface="Nirmala UI"/>
+        <a:font script="Tale" typeface="Microsoft Tai Le"/>
+        <a:font script="Talu" typeface="Microsoft New Tai Lue"/>
+        <a:font script="Tfng" typeface="Ebrima"/>
+      </a:majorFont>
+      <a:minorFont>
+        <a:latin typeface="Calibri" panose="020F0502020204030204"/>
+        <a:ea typeface=""/>
+        <a:cs typeface=""/>
+        <a:font script="Jpan" typeface="游ゴシック"/>
+        <a:font script="Hang" typeface="맑은 고딕"/>
+        <a:font script="Hans" typeface="等线"/>
+        <a:font script="Hant" typeface="新細明體"/>
+        <a:font script="Arab" typeface="Arial"/>
+        <a:font script="Hebr" typeface="Arial"/>
+        <a:font script="Thai" typeface="Cordia New"/>
+        <a:font script="Ethi" typeface="Nyala"/>
+        <a:font script="Beng" typeface="Vrinda"/>
+        <a:font script="Gujr" typeface="Shruti"/>
+        <a:font script="Khmr" typeface="DaunPenh"/>
+        <a:font script="Knda" typeface="Tunga"/>
+        <a:font script="Guru" typeface="Raavi"/>
+        <a:font script="Cans" typeface="Euphemia"/>
+        <a:font script="Cher" typeface="Plantagenet Cherokee"/>
+        <a:font script="Yiii" typeface="Microsoft Yi Baiti"/>
+        <a:font script="Tibt" typeface="Microsoft Himalaya"/>
+        <a:font script="Thaa" typeface="MV Boli"/>
+        <a:font script="Deva" typeface="Mangal"/>
+        <a:font script="Telu" typeface="Gautami"/>
+        <a:font script="Taml" typeface="Latha"/>
+        <a:font script="Syrc" typeface="Estrangelo Edessa"/>
+        <a:font script="Orya" typeface="Kalinga"/>
+        <a:font script="Mlym" typeface="Kartika"/>
+        <a:font script="Laoo" typeface="DokChampa"/>
+        <a:font script="Sinh" typeface="Iskoola Pota"/>
+        <a:font script="Mong" typeface="Mongolian Baiti"/>
+        <a:font script="Viet" typeface="Arial"/>
+        <a:font script="Uigh" typeface="Microsoft Uighur"/>
+        <a:font script="Geor" typeface="Sylfaen"/>
+        <a:font script="Armn" typeface="Arial"/>
+        <a:font script="Bugi" typeface="Leelawadee UI"/>
+        <a:font script="Bopo" typeface="Microsoft JhengHei"/>
+        <a:font script="Java" typeface="Javanese Text"/>
+        <a:font script="Lisu" typeface="Segoe UI"/>
+        <a:font script="Mymr" typeface="Myanmar Text"/>
+        <a:font script="Nkoo" typeface="Ebrima"/>
+        <a:font script="Olck" typeface="Nirmala UI"/>
+        <a:font script="Osma" typeface="Ebrima"/>
+        <a:font script="Phag" typeface="Phagspa"/>
+        <a:font script="Syrn" typeface="Estrangelo Edessa"/>
+        <a:font script="Syrj" typeface="Estrangelo Edessa"/>
+        <a:font script="Syre" typeface="Estrangelo Edessa"/>
+        <a:font script="Sora" typeface="Nirmala UI"/>
+        <a:font script="Tale" typeface="Microsoft Tai Le"/>
+        <a:font script="Talu" typeface="Microsoft New Tai Lue"/>
+        <a:font script="Tfng" typeface="Ebrima"/>
+      </a:minorFont>
+    </a:fontScheme>
+    <a:fmtScheme name="Office">
+      <a:fillStyleLst>
+        <a:solidFill>
+          <a:schemeClr val="phClr"/>
+        </a:solidFill>
+        <a:gradFill rotWithShape="1">
+          <a:gsLst>
+            <a:gs pos="0">
+              <a:schemeClr val="phClr">
+                <a:lumMod val="110000"/>
+                <a:satMod val="105000"/>
+                <a:tint val="67000"/>
+              </a:schemeClr>
+            </a:gs>
+            <a:gs pos="50000">
+              <a:schemeClr val="phClr">
+                <a:lumMod val="105000"/>
+                <a:satMod val="103000"/>
+                <a:tint val="73000"/>
+              </a:schemeClr>
+            </a:gs>
+            <a:gs pos="100000">
+              <a:schemeClr val="phClr">
+                <a:lumMod val="105000"/>
+                <a:satMod val="109000"/>
+                <a:tint val="81000"/>
+              </a:schemeClr>
+            </a:gs>
+          </a:gsLst>
+          <a:lin ang="5400000" scaled="0"/>
+        </a:gradFill>
+        <a:gradFill rotWithShape="1">
+          <a:gsLst>
+            <a:gs pos="0">
+              <a:schemeClr val="phClr">
+                <a:satMod val="103000"/>
+                <a:lumMod val="102000"/>
+                <a:tint val="94000"/>
+              </a:schemeClr>
+            </a:gs>
+            <a:gs pos="50000">
+              <a:schemeClr val="phClr">
+                <a:satMod val="110000"/>
+                <a:lumMod val="100000"/>
+                <a:shade val="100000"/>
+              </a:schemeClr>
+            </a:gs>
+            <a:gs pos="100000">
+              <a:schemeClr val="phClr">
+                <a:lumMod val="99000"/>
+                <a:satMod val="120000"/>
+                <a:shade val="78000"/>
+              </a:schemeClr>
+            </a:gs>
+          </a:gsLst>
+          <a:lin ang="5400000" scaled="0"/>
+        </a:gradFill>
+      </a:fillStyleLst>
+      <a:lnStyleLst>
+        <a:ln w="6350" cap="flat" cmpd="sng" algn="ctr">
+          <a:solidFill>
+            <a:schemeClr val="phClr"/>
+          </a:solidFill>
+          <a:prstDash val="solid"/>
+          <a:miter lim="800000"/>
+        </a:ln>
+        <a:ln w="12700" cap="flat" cmpd="sng" algn="ctr">
+          <a:solidFill>
+            <a:schemeClr val="phClr"/>
+          </a:solidFill>
+          <a:prstDash val="solid"/>
+          <a:miter lim="800000"/>
+        </a:ln>
+        <a:ln w="19050" cap="flat" cmpd="sng" algn="ctr">
+          <a:solidFill>
+            <a:schemeClr val="phClr"/>
+          </a:solidFill>
+          <a:prstDash val="solid"/>
+          <a:miter lim="800000"/>
+        </a:ln>
+      </a:lnStyleLst>
+      <a:effectStyleLst>
+        <a:effectStyle>
+          <a:effectLst/>
+        </a:effectStyle>
+        <a:effectStyle>
+          <a:effectLst/>
+        </a:effectStyle>
+        <a:effectStyle>
+          <a:effectLst>
+            <a:outerShdw blurRad="57150" dist="19050" dir="5400000" algn="ctr" rotWithShape="0">
+              <a:srgbClr val="000000">
+                <a:alpha val="63000"/>
+              </a:srgbClr>
+            </a:outerShdw>
+          </a:effectLst>
+        </a:effectStyle>
+      </a:effectStyleLst>
+      <a:bgFillStyleLst>
+        <a:solidFill>
+          <a:schemeClr val="phClr"/>
+        </a:solidFill>
+        <a:solidFill>
+          <a:schemeClr val="phClr">
+            <a:tint val="95000"/>
+            <a:satMod val="170000"/>
+          </a:schemeClr>
+        </a:solidFill>
+        <a:gradFill rotWithShape="1">
+          <a:gsLst>
+            <a:gs pos="0">
+              <a:schemeClr val="phClr">
+                <a:tint val="93000"/>
+                <a:satMod val="150000"/>
+                <a:shade val="98000"/>
+                <a:lumMod val="102000"/>
+              </a:schemeClr>
+            </a:gs>
+            <a:gs pos="50000">
+              <a:schemeClr val="phClr">
+                <a:tint val="98000"/>
+                <a:satMod val="130000"/>
+                <a:shade val="90000"/>
+                <a:lumMod val="103000"/>
+              </a:schemeClr>
+            </a:gs>
+            <a:gs pos="100000">
+              <a:schemeClr val="phClr">
+                <a:shade val="63000"/>
+                <a:satMod val="120000"/>
+              </a:schemeClr>
+            </a:gs>
+          </a:gsLst>
+          <a:lin ang="5400000" scaled="0"/>
+        </a:gradFill>
+      </a:bgFillStyleLst>
+    </a:fmtScheme>
+  </a:themeElements>
+  <a:objectDefaults/>
+  <a:extraClrSchemeLst/>
+  <a:extLst>
+    <a:ext uri="{05A4C25C-085E-4340-85A3-A5531E510DB2}">
+      <thm15:themeFamily xmlns:thm15="http://schemas.microsoft.com/office/thememl/2012/main" name="Office Theme" id="{62F939B6-93AF-4DB8-9C6B-D6C7DFDC589F}" vid="{4A3C46E8-61CC-4603-A589-7422A47A8E4A}"/>
+    </a:ext>
+  </a:extLst>
+</a:theme>
 </file>
</xml_diff>